<commit_message>
Add smart picker assignment to presentation and plan
- Add slide 5: Smart picker task assignment
  - Assign tasks to pickers who perform better with specific products
  - Consider availability, current task completion time
  - Balance workload across pickers
- Update OR-Tools slide: optimize both forklift and picker assignments
- Update PROJECT_STATUS.md section 3.1: Picker assignment criteria
- Renumber sections 3.2-3.7

Co-Authored-By: Claude Opus 4.5 <noreply@anthropic.com>
</commit_message>
<xml_diff>
--- a/docs/WMS_Buffer_Optimization.pptx
+++ b/docs/WMS_Buffer_Optimization.pptx
@@ -16,6 +16,7 @@
     <p:sldId id="264" r:id="rId15"/>
     <p:sldId id="265" r:id="rId16"/>
     <p:sldId id="266" r:id="rId17"/>
+    <p:sldId id="267" r:id="rId18"/>
   </p:sldIdLst>
   <p:sldSz cx="9144000" cy="6858000" type="screen4x3"/>
   <p:notesSz cx="6858000" cy="9144000"/>
@@ -3250,2050 +3251,7 @@
               </a:defRPr>
             </a:pPr>
             <a:r>
-              <a:t>9. План внедрения</a:t>
-            </a:r>
-          </a:p>
-        </p:txBody>
-      </p:sp>
-      <p:graphicFrame>
-        <p:nvGraphicFramePr>
-          <p:cNvPr id="3" name="Table 2"/>
-          <p:cNvGraphicFramePr>
-            <a:graphicFrameLocks noGrp="1"/>
-          </p:cNvGraphicFramePr>
-          <p:nvPr/>
-        </p:nvGraphicFramePr>
-        <p:xfrm>
-          <a:off x="457200" y="1371600"/>
-          <a:ext cx="8229600" cy="457200"/>
-        </p:xfrm>
-        <a:graphic>
-          <a:graphicData uri="http://schemas.openxmlformats.org/drawingml/2006/table">
-            <a:tbl>
-              <a:tblPr firstRow="1" bandRow="1">
-                <a:tableStyleId>{5C22544A-7EE6-4342-B048-85BDC9FD1C3A}</a:tableStyleId>
-              </a:tblPr>
-              <a:tblGrid>
-                <a:gridCol w="2743200"/>
-                <a:gridCol w="2743200"/>
-                <a:gridCol w="2743200"/>
-              </a:tblGrid>
-              <a:tr h="76200">
-                <a:tc>
-                  <a:txBody>
-                    <a:bodyPr/>
-                    <a:lstStyle/>
-                    <a:p>
-                      <a:pPr>
-                        <a:defRPr b="1" sz="1400">
-                          <a:solidFill>
-                            <a:srgbClr val="FFFFFF"/>
-                          </a:solidFill>
-                        </a:defRPr>
-                      </a:pPr>
-                      <a:r>
-                        <a:t>Этап</a:t>
-                      </a:r>
-                    </a:p>
-                  </a:txBody>
-                  <a:tcPr>
-                    <a:solidFill>
-                      <a:srgbClr val="0070C0"/>
-                    </a:solidFill>
-                  </a:tcPr>
-                </a:tc>
-                <a:tc>
-                  <a:txBody>
-                    <a:bodyPr/>
-                    <a:lstStyle/>
-                    <a:p>
-                      <a:pPr>
-                        <a:defRPr b="1" sz="1400">
-                          <a:solidFill>
-                            <a:srgbClr val="FFFFFF"/>
-                          </a:solidFill>
-                        </a:defRPr>
-                      </a:pPr>
-                      <a:r>
-                        <a:t>Задачи</a:t>
-                      </a:r>
-                    </a:p>
-                  </a:txBody>
-                  <a:tcPr>
-                    <a:solidFill>
-                      <a:srgbClr val="0070C0"/>
-                    </a:solidFill>
-                  </a:tcPr>
-                </a:tc>
-                <a:tc>
-                  <a:txBody>
-                    <a:bodyPr/>
-                    <a:lstStyle/>
-                    <a:p>
-                      <a:pPr>
-                        <a:defRPr b="1" sz="1400">
-                          <a:solidFill>
-                            <a:srgbClr val="FFFFFF"/>
-                          </a:solidFill>
-                        </a:defRPr>
-                      </a:pPr>
-                      <a:r>
-                        <a:t>Результат</a:t>
-                      </a:r>
-                    </a:p>
-                  </a:txBody>
-                  <a:tcPr>
-                    <a:solidFill>
-                      <a:srgbClr val="0070C0"/>
-                    </a:solidFill>
-                  </a:tcPr>
-                </a:tc>
-              </a:tr>
-              <a:tr h="76200">
-                <a:tc>
-                  <a:txBody>
-                    <a:bodyPr/>
-                    <a:lstStyle/>
-                    <a:p>
-                      <a:pPr>
-                        <a:defRPr sz="1200"/>
-                      </a:pPr>
-                      <a:r>
-                        <a:t>1. ML-модели</a:t>
-                      </a:r>
-                    </a:p>
-                  </a:txBody>
-                  <a:tcPr/>
-                </a:tc>
-                <a:tc>
-                  <a:txBody>
-                    <a:bodyPr/>
-                    <a:lstStyle/>
-                    <a:p>
-                      <a:pPr>
-                        <a:defRPr sz="1200"/>
-                      </a:pPr>
-                      <a:r>
-                        <a:t>Обучение на истории</a:t>
-                      </a:r>
-                    </a:p>
-                  </a:txBody>
-                  <a:tcPr/>
-                </a:tc>
-                <a:tc>
-                  <a:txBody>
-                    <a:bodyPr/>
-                    <a:lstStyle/>
-                    <a:p>
-                      <a:pPr>
-                        <a:defRPr sz="1200"/>
-                      </a:pPr>
-                      <a:r>
-                        <a:t>Прогноз времени</a:t>
-                      </a:r>
-                    </a:p>
-                  </a:txBody>
-                  <a:tcPr/>
-                </a:tc>
-              </a:tr>
-              <a:tr h="76200">
-                <a:tc>
-                  <a:txBody>
-                    <a:bodyPr/>
-                    <a:lstStyle/>
-                    <a:p>
-                      <a:pPr>
-                        <a:defRPr sz="1200"/>
-                      </a:pPr>
-                      <a:r>
-                        <a:t>2. Тестирование</a:t>
-                      </a:r>
-                    </a:p>
-                  </a:txBody>
-                  <a:tcPr/>
-                </a:tc>
-                <a:tc>
-                  <a:txBody>
-                    <a:bodyPr/>
-                    <a:lstStyle/>
-                    <a:p>
-                      <a:pPr>
-                        <a:defRPr sz="1200"/>
-                      </a:pPr>
-                      <a:r>
-                        <a:t>Сравнение с реальностью</a:t>
-                      </a:r>
-                    </a:p>
-                  </a:txBody>
-                  <a:tcPr/>
-                </a:tc>
-                <a:tc>
-                  <a:txBody>
-                    <a:bodyPr/>
-                    <a:lstStyle/>
-                    <a:p>
-                      <a:pPr>
-                        <a:defRPr sz="1200"/>
-                      </a:pPr>
-                      <a:r>
-                        <a:t>Оценка точности</a:t>
-                      </a:r>
-                    </a:p>
-                  </a:txBody>
-                  <a:tcPr/>
-                </a:tc>
-              </a:tr>
-              <a:tr h="76200">
-                <a:tc>
-                  <a:txBody>
-                    <a:bodyPr/>
-                    <a:lstStyle/>
-                    <a:p>
-                      <a:pPr>
-                        <a:defRPr sz="1200"/>
-                      </a:pPr>
-                      <a:r>
-                        <a:t>3. OR-Tools</a:t>
-                      </a:r>
-                    </a:p>
-                  </a:txBody>
-                  <a:tcPr/>
-                </a:tc>
-                <a:tc>
-                  <a:txBody>
-                    <a:bodyPr/>
-                    <a:lstStyle/>
-                    <a:p>
-                      <a:pPr>
-                        <a:defRPr sz="1200"/>
-                      </a:pPr>
-                      <a:r>
-                        <a:t>Интеграция оптимизатора</a:t>
-                      </a:r>
-                    </a:p>
-                  </a:txBody>
-                  <a:tcPr/>
-                </a:tc>
-                <a:tc>
-                  <a:txBody>
-                    <a:bodyPr/>
-                    <a:lstStyle/>
-                    <a:p>
-                      <a:pPr>
-                        <a:defRPr sz="1200"/>
-                      </a:pPr>
-                      <a:r>
-                        <a:t>Авто-планирование</a:t>
-                      </a:r>
-                    </a:p>
-                  </a:txBody>
-                  <a:tcPr/>
-                </a:tc>
-              </a:tr>
-              <a:tr h="76200">
-                <a:tc>
-                  <a:txBody>
-                    <a:bodyPr/>
-                    <a:lstStyle/>
-                    <a:p>
-                      <a:pPr>
-                        <a:defRPr sz="1200"/>
-                      </a:pPr>
-                      <a:r>
-                        <a:t>4. Пилот</a:t>
-                      </a:r>
-                    </a:p>
-                  </a:txBody>
-                  <a:tcPr/>
-                </a:tc>
-                <a:tc>
-                  <a:txBody>
-                    <a:bodyPr/>
-                    <a:lstStyle/>
-                    <a:p>
-                      <a:pPr>
-                        <a:defRPr sz="1200"/>
-                      </a:pPr>
-                      <a:r>
-                        <a:t>Работа на реальных данных</a:t>
-                      </a:r>
-                    </a:p>
-                  </a:txBody>
-                  <a:tcPr/>
-                </a:tc>
-                <a:tc>
-                  <a:txBody>
-                    <a:bodyPr/>
-                    <a:lstStyle/>
-                    <a:p>
-                      <a:pPr>
-                        <a:defRPr sz="1200"/>
-                      </a:pPr>
-                      <a:r>
-                        <a:t>Валидация</a:t>
-                      </a:r>
-                    </a:p>
-                  </a:txBody>
-                  <a:tcPr/>
-                </a:tc>
-              </a:tr>
-              <a:tr h="76200">
-                <a:tc>
-                  <a:txBody>
-                    <a:bodyPr/>
-                    <a:lstStyle/>
-                    <a:p>
-                      <a:pPr>
-                        <a:defRPr sz="1200"/>
-                      </a:pPr>
-                      <a:r>
-                        <a:t>5. Продакшн</a:t>
-                      </a:r>
-                    </a:p>
-                  </a:txBody>
-                  <a:tcPr/>
-                </a:tc>
-                <a:tc>
-                  <a:txBody>
-                    <a:bodyPr/>
-                    <a:lstStyle/>
-                    <a:p>
-                      <a:pPr>
-                        <a:defRPr sz="1200"/>
-                      </a:pPr>
-                      <a:r>
-                        <a:t>Полная интеграция с WMS</a:t>
-                      </a:r>
-                    </a:p>
-                  </a:txBody>
-                  <a:tcPr/>
-                </a:tc>
-                <a:tc>
-                  <a:txBody>
-                    <a:bodyPr/>
-                    <a:lstStyle/>
-                    <a:p>
-                      <a:pPr>
-                        <a:defRPr sz="1200"/>
-                      </a:pPr>
-                      <a:r>
-                        <a:t>Автономная работа</a:t>
-                      </a:r>
-                    </a:p>
-                  </a:txBody>
-                  <a:tcPr/>
-                </a:tc>
-              </a:tr>
-            </a:tbl>
-          </a:graphicData>
-        </a:graphic>
-      </p:graphicFrame>
-    </p:spTree>
-  </p:cSld>
-  <p:clrMapOvr>
-    <a:masterClrMapping/>
-  </p:clrMapOvr>
-</p:sld>
-</file>
-
-<file path=ppt/slides/slide11.xml><?xml version="1.0" encoding="utf-8"?>
-<p:sld xmlns:a="http://schemas.openxmlformats.org/drawingml/2006/main" xmlns:p="http://schemas.openxmlformats.org/presentationml/2006/main" xmlns:r="http://schemas.openxmlformats.org/officeDocument/2006/relationships">
-  <p:cSld>
-    <p:spTree>
-      <p:nvGrpSpPr>
-        <p:cNvPr id="1" name=""/>
-        <p:cNvGrpSpPr/>
-        <p:nvPr/>
-      </p:nvGrpSpPr>
-      <p:grpSpPr/>
-      <p:sp>
-        <p:nvSpPr>
-          <p:cNvPr id="2" name="Rectangle 1"/>
-          <p:cNvSpPr/>
-          <p:nvPr/>
-        </p:nvSpPr>
-        <p:spPr>
-          <a:xfrm>
-            <a:off x="0" y="0"/>
-            <a:ext cx="9144000" cy="1097280"/>
-          </a:xfrm>
-          <a:prstGeom prst="rect">
-            <a:avLst/>
-          </a:prstGeom>
-          <a:solidFill>
-            <a:srgbClr val="0070C0"/>
-          </a:solidFill>
-          <a:ln>
-            <a:noFill/>
-          </a:ln>
-        </p:spPr>
-        <p:style>
-          <a:lnRef idx="1">
-            <a:schemeClr val="accent1"/>
-          </a:lnRef>
-          <a:fillRef idx="3">
-            <a:schemeClr val="accent1"/>
-          </a:fillRef>
-          <a:effectRef idx="2">
-            <a:schemeClr val="accent1"/>
-          </a:effectRef>
-          <a:fontRef idx="minor">
-            <a:schemeClr val="lt1"/>
-          </a:fontRef>
-        </p:style>
-        <p:txBody>
-          <a:bodyPr rtlCol="0" anchor="ctr" wrap="square" lIns="457200" tIns="274320"/>
-          <a:lstStyle/>
-          <a:p>
-            <a:pPr algn="l">
-              <a:defRPr sz="3200" b="1">
-                <a:solidFill>
-                  <a:srgbClr val="FFFFFF"/>
-                </a:solidFill>
-              </a:defRPr>
-            </a:pPr>
-            <a:r>
-              <a:t>10. Резюме</a:t>
-            </a:r>
-          </a:p>
-        </p:txBody>
-      </p:sp>
-      <p:sp>
-        <p:nvSpPr>
-          <p:cNvPr id="3" name="TextBox 2"/>
-          <p:cNvSpPr txBox="1"/>
-          <p:nvPr/>
-        </p:nvSpPr>
-        <p:spPr>
-          <a:xfrm>
-            <a:off x="457200" y="1371600"/>
-            <a:ext cx="8229600" cy="4572000"/>
-          </a:xfrm>
-          <a:prstGeom prst="rect">
-            <a:avLst/>
-          </a:prstGeom>
-          <a:noFill/>
-        </p:spPr>
-        <p:txBody>
-          <a:bodyPr wrap="square">
-            <a:spAutoFit/>
-          </a:bodyPr>
-          <a:lstStyle/>
-          <a:p>
-            <a:pPr>
-              <a:spcBef>
-                <a:spcPts val="1200"/>
-              </a:spcBef>
-              <a:defRPr sz="2000"/>
-            </a:pPr>
-            <a:r>
-              <a:t>Система WMS Buffer Management позволит:</a:t>
-            </a:r>
-          </a:p>
-          <a:p>
-            <a:pPr>
-              <a:spcBef>
-                <a:spcPts val="1200"/>
-              </a:spcBef>
-              <a:defRPr sz="2000"/>
-            </a:pPr>
-          </a:p>
-          <a:p>
-            <a:pPr>
-              <a:spcBef>
-                <a:spcPts val="1200"/>
-              </a:spcBef>
-              <a:defRPr sz="2000"/>
-            </a:pPr>
-            <a:r>
-              <a:t>• Прогнозировать время выполнения операций</a:t>
-            </a:r>
-          </a:p>
-          <a:p>
-            <a:pPr>
-              <a:spcBef>
-                <a:spcPts val="1200"/>
-              </a:spcBef>
-              <a:defRPr sz="2000"/>
-            </a:pPr>
-            <a:r>
-              <a:t>• Автоматически строить оптимальные планы</a:t>
-            </a:r>
-          </a:p>
-          <a:p>
-            <a:pPr>
-              <a:spcBef>
-                <a:spcPts val="1200"/>
-              </a:spcBef>
-              <a:defRPr sz="2000"/>
-            </a:pPr>
-            <a:r>
-              <a:t>• Сократить время волны на ~30%</a:t>
-            </a:r>
-          </a:p>
-          <a:p>
-            <a:pPr>
-              <a:spcBef>
-                <a:spcPts val="1200"/>
-              </a:spcBef>
-              <a:defRPr sz="2000"/>
-            </a:pPr>
-            <a:r>
-              <a:t>• Минимизировать простои персонала</a:t>
-            </a:r>
-          </a:p>
-          <a:p>
-            <a:pPr>
-              <a:spcBef>
-                <a:spcPts val="1200"/>
-              </a:spcBef>
-              <a:defRPr sz="2000"/>
-            </a:pPr>
-          </a:p>
-          <a:p>
-            <a:pPr>
-              <a:spcBef>
-                <a:spcPts val="1200"/>
-              </a:spcBef>
-              <a:defRPr sz="2000"/>
-            </a:pPr>
-            <a:r>
-              <a:t>Основа: 1.5 млн исторических записей + ML.NET + OR-Tools</a:t>
-            </a:r>
-          </a:p>
-          <a:p>
-            <a:pPr>
-              <a:spcBef>
-                <a:spcPts val="1200"/>
-              </a:spcBef>
-              <a:defRPr sz="2000"/>
-            </a:pPr>
-          </a:p>
-          <a:p>
-            <a:pPr>
-              <a:spcBef>
-                <a:spcPts val="1200"/>
-              </a:spcBef>
-              <a:defRPr sz="2000"/>
-            </a:pPr>
-            <a:r>
-              <a:t>Следующий шаг: запуск обучения ML-моделей</a:t>
-            </a:r>
-          </a:p>
-        </p:txBody>
-      </p:sp>
-    </p:spTree>
-  </p:cSld>
-  <p:clrMapOvr>
-    <a:masterClrMapping/>
-  </p:clrMapOvr>
-</p:sld>
-</file>
-
-<file path=ppt/slides/slide2.xml><?xml version="1.0" encoding="utf-8"?>
-<p:sld xmlns:a="http://schemas.openxmlformats.org/drawingml/2006/main" xmlns:p="http://schemas.openxmlformats.org/presentationml/2006/main" xmlns:r="http://schemas.openxmlformats.org/officeDocument/2006/relationships">
-  <p:cSld>
-    <p:spTree>
-      <p:nvGrpSpPr>
-        <p:cNvPr id="1" name=""/>
-        <p:cNvGrpSpPr/>
-        <p:nvPr/>
-      </p:nvGrpSpPr>
-      <p:grpSpPr/>
-      <p:sp>
-        <p:nvSpPr>
-          <p:cNvPr id="2" name="Rectangle 1"/>
-          <p:cNvSpPr/>
-          <p:nvPr/>
-        </p:nvSpPr>
-        <p:spPr>
-          <a:xfrm>
-            <a:off x="0" y="0"/>
-            <a:ext cx="9144000" cy="1097280"/>
-          </a:xfrm>
-          <a:prstGeom prst="rect">
-            <a:avLst/>
-          </a:prstGeom>
-          <a:solidFill>
-            <a:srgbClr val="0070C0"/>
-          </a:solidFill>
-          <a:ln>
-            <a:noFill/>
-          </a:ln>
-        </p:spPr>
-        <p:style>
-          <a:lnRef idx="1">
-            <a:schemeClr val="accent1"/>
-          </a:lnRef>
-          <a:fillRef idx="3">
-            <a:schemeClr val="accent1"/>
-          </a:fillRef>
-          <a:effectRef idx="2">
-            <a:schemeClr val="accent1"/>
-          </a:effectRef>
-          <a:fontRef idx="minor">
-            <a:schemeClr val="lt1"/>
-          </a:fontRef>
-        </p:style>
-        <p:txBody>
-          <a:bodyPr rtlCol="0" anchor="ctr" lIns="457200" tIns="274320"/>
-          <a:lstStyle/>
-          <a:p>
-            <a:pPr algn="ctr">
-              <a:defRPr sz="3200" b="1">
-                <a:solidFill>
-                  <a:srgbClr val="FFFFFF"/>
-                </a:solidFill>
-              </a:defRPr>
-            </a:pPr>
-            <a:r>
-              <a:t>1. Текущая ситуация</a:t>
-            </a:r>
-          </a:p>
-        </p:txBody>
-      </p:sp>
-      <p:sp>
-        <p:nvSpPr>
-          <p:cNvPr id="3" name="Rectangle 2"/>
-          <p:cNvSpPr/>
-          <p:nvPr/>
-        </p:nvSpPr>
-        <p:spPr>
-          <a:xfrm>
-            <a:off x="457200" y="1371600"/>
-            <a:ext cx="8229600" cy="2286000"/>
-          </a:xfrm>
-          <a:prstGeom prst="rect">
-            <a:avLst/>
-          </a:prstGeom>
-          <a:solidFill>
-            <a:srgbClr val="F0F0F0"/>
-          </a:solidFill>
-          <a:ln>
-            <a:solidFill>
-              <a:srgbClr val="C8C8C8"/>
-            </a:solidFill>
-          </a:ln>
-        </p:spPr>
-        <p:style>
-          <a:lnRef idx="1">
-            <a:schemeClr val="accent1"/>
-          </a:lnRef>
-          <a:fillRef idx="3">
-            <a:schemeClr val="accent1"/>
-          </a:fillRef>
-          <a:effectRef idx="2">
-            <a:schemeClr val="accent1"/>
-          </a:effectRef>
-          <a:fontRef idx="minor">
-            <a:schemeClr val="lt1"/>
-          </a:fontRef>
-        </p:style>
-        <p:txBody>
-          <a:bodyPr rtlCol="0" anchor="ctr" wrap="square" lIns="182880" tIns="182880"/>
-          <a:lstStyle/>
-          <a:p>
-            <a:pPr algn="ctr">
-              <a:defRPr sz="1400">
-                <a:latin typeface="Courier New"/>
-              </a:defRPr>
-            </a:pPr>
-            <a:r>
-              <a:t>ХРАНЕНИЕ  ──[3 карщика]──►  БУФЕР (64 ячейки)  ──[20 сборщиков]──►  СБОРКА</a:t>
-            </a:r>
-          </a:p>
-        </p:txBody>
-      </p:sp>
-      <p:sp>
-        <p:nvSpPr>
-          <p:cNvPr id="4" name="TextBox 3"/>
-          <p:cNvSpPr txBox="1"/>
-          <p:nvPr/>
-        </p:nvSpPr>
-        <p:spPr>
-          <a:xfrm>
-            <a:off x="457200" y="3840480"/>
-            <a:ext cx="8229600" cy="2286000"/>
-          </a:xfrm>
-          <a:prstGeom prst="rect">
-            <a:avLst/>
-          </a:prstGeom>
-          <a:noFill/>
-        </p:spPr>
-        <p:txBody>
-          <a:bodyPr wrap="square">
-            <a:spAutoFit/>
-          </a:bodyPr>
-          <a:lstStyle/>
-          <a:p>
-            <a:pPr>
-              <a:spcBef>
-                <a:spcPts val="800"/>
-              </a:spcBef>
-              <a:defRPr sz="1800"/>
-            </a:pPr>
-            <a:r>
-              <a:t>• 3 карщика доставляют моно-палеты из хранения в буфер</a:t>
-            </a:r>
-          </a:p>
-          <a:p>
-            <a:pPr>
-              <a:spcBef>
-                <a:spcPts val="800"/>
-              </a:spcBef>
-              <a:defRPr sz="1800"/>
-            </a:pPr>
-            <a:r>
-              <a:t>• 64 ячейки буфера — временное хранение для сборки</a:t>
-            </a:r>
-          </a:p>
-          <a:p>
-            <a:pPr>
-              <a:spcBef>
-                <a:spcPts val="800"/>
-              </a:spcBef>
-              <a:defRPr sz="1800"/>
-            </a:pPr>
-            <a:r>
-              <a:t>• 20 сборщиков забирают товары и распределяют по заказам</a:t>
-            </a:r>
-          </a:p>
-          <a:p>
-            <a:pPr>
-              <a:spcBef>
-                <a:spcPts val="800"/>
-              </a:spcBef>
-              <a:defRPr sz="1800"/>
-            </a:pPr>
-            <a:r>
-              <a:t>• Проблема: синхронизация подачи палет со скоростью сборки</a:t>
-            </a:r>
-          </a:p>
-        </p:txBody>
-      </p:sp>
-    </p:spTree>
-  </p:cSld>
-  <p:clrMapOvr>
-    <a:masterClrMapping/>
-  </p:clrMapOvr>
-</p:sld>
-</file>
-
-<file path=ppt/slides/slide3.xml><?xml version="1.0" encoding="utf-8"?>
-<p:sld xmlns:a="http://schemas.openxmlformats.org/drawingml/2006/main" xmlns:p="http://schemas.openxmlformats.org/presentationml/2006/main" xmlns:r="http://schemas.openxmlformats.org/officeDocument/2006/relationships">
-  <p:cSld>
-    <p:spTree>
-      <p:nvGrpSpPr>
-        <p:cNvPr id="1" name=""/>
-        <p:cNvGrpSpPr/>
-        <p:nvPr/>
-      </p:nvGrpSpPr>
-      <p:grpSpPr/>
-      <p:sp>
-        <p:nvSpPr>
-          <p:cNvPr id="2" name="Rectangle 1"/>
-          <p:cNvSpPr/>
-          <p:nvPr/>
-        </p:nvSpPr>
-        <p:spPr>
-          <a:xfrm>
-            <a:off x="0" y="0"/>
-            <a:ext cx="9144000" cy="1097280"/>
-          </a:xfrm>
-          <a:prstGeom prst="rect">
-            <a:avLst/>
-          </a:prstGeom>
-          <a:solidFill>
-            <a:srgbClr val="0070C0"/>
-          </a:solidFill>
-          <a:ln>
-            <a:noFill/>
-          </a:ln>
-        </p:spPr>
-        <p:style>
-          <a:lnRef idx="1">
-            <a:schemeClr val="accent1"/>
-          </a:lnRef>
-          <a:fillRef idx="3">
-            <a:schemeClr val="accent1"/>
-          </a:fillRef>
-          <a:effectRef idx="2">
-            <a:schemeClr val="accent1"/>
-          </a:effectRef>
-          <a:fontRef idx="minor">
-            <a:schemeClr val="lt1"/>
-          </a:fontRef>
-        </p:style>
-        <p:txBody>
-          <a:bodyPr rtlCol="0" anchor="ctr" lIns="457200" tIns="274320"/>
-          <a:lstStyle/>
-          <a:p>
-            <a:pPr algn="ctr">
-              <a:defRPr sz="3200" b="1">
-                <a:solidFill>
-                  <a:srgbClr val="FFFFFF"/>
-                </a:solidFill>
-              </a:defRPr>
-            </a:pPr>
-            <a:r>
-              <a:t>2. Почему это важно — потери</a:t>
-            </a:r>
-          </a:p>
-        </p:txBody>
-      </p:sp>
-      <p:graphicFrame>
-        <p:nvGraphicFramePr>
-          <p:cNvPr id="3" name="Table 2"/>
-          <p:cNvGraphicFramePr>
-            <a:graphicFrameLocks noGrp="1"/>
-          </p:cNvGraphicFramePr>
-          <p:nvPr/>
-        </p:nvGraphicFramePr>
-        <p:xfrm>
-          <a:off x="457200" y="1371600"/>
-          <a:ext cx="8229600" cy="457200"/>
-        </p:xfrm>
-        <a:graphic>
-          <a:graphicData uri="http://schemas.openxmlformats.org/drawingml/2006/table">
-            <a:tbl>
-              <a:tblPr firstRow="1" bandRow="1">
-                <a:tableStyleId>{5C22544A-7EE6-4342-B048-85BDC9FD1C3A}</a:tableStyleId>
-              </a:tblPr>
-              <a:tblGrid>
-                <a:gridCol w="4114800"/>
-                <a:gridCol w="4114800"/>
-              </a:tblGrid>
-              <a:tr h="91440">
-                <a:tc>
-                  <a:txBody>
-                    <a:bodyPr/>
-                    <a:lstStyle/>
-                    <a:p>
-                      <a:pPr>
-                        <a:defRPr b="1" sz="1400">
-                          <a:solidFill>
-                            <a:srgbClr val="FFFFFF"/>
-                          </a:solidFill>
-                        </a:defRPr>
-                      </a:pPr>
-                      <a:r>
-                        <a:t>Ситуация</a:t>
-                      </a:r>
-                    </a:p>
-                  </a:txBody>
-                  <a:tcPr>
-                    <a:solidFill>
-                      <a:srgbClr val="0070C0"/>
-                    </a:solidFill>
-                  </a:tcPr>
-                </a:tc>
-                <a:tc>
-                  <a:txBody>
-                    <a:bodyPr/>
-                    <a:lstStyle/>
-                    <a:p>
-                      <a:pPr>
-                        <a:defRPr b="1" sz="1400">
-                          <a:solidFill>
-                            <a:srgbClr val="FFFFFF"/>
-                          </a:solidFill>
-                        </a:defRPr>
-                      </a:pPr>
-                      <a:r>
-                        <a:t>Последствия</a:t>
-                      </a:r>
-                    </a:p>
-                  </a:txBody>
-                  <a:tcPr>
-                    <a:solidFill>
-                      <a:srgbClr val="0070C0"/>
-                    </a:solidFill>
-                  </a:tcPr>
-                </a:tc>
-              </a:tr>
-              <a:tr h="91440">
-                <a:tc>
-                  <a:txBody>
-                    <a:bodyPr/>
-                    <a:lstStyle/>
-                    <a:p>
-                      <a:pPr>
-                        <a:defRPr sz="1200"/>
-                      </a:pPr>
-                      <a:r>
-                        <a:t>Буфер пустой (&lt;15%)</a:t>
-                      </a:r>
-                    </a:p>
-                  </a:txBody>
-                  <a:tcPr/>
-                </a:tc>
-                <a:tc>
-                  <a:txBody>
-                    <a:bodyPr/>
-                    <a:lstStyle/>
-                    <a:p>
-                      <a:pPr>
-                        <a:defRPr sz="1200"/>
-                      </a:pPr>
-                      <a:r>
-                        <a:t>Сборщики простаивают, заказы задерживаются</a:t>
-                      </a:r>
-                    </a:p>
-                  </a:txBody>
-                  <a:tcPr/>
-                </a:tc>
-              </a:tr>
-              <a:tr h="91440">
-                <a:tc>
-                  <a:txBody>
-                    <a:bodyPr/>
-                    <a:lstStyle/>
-                    <a:p>
-                      <a:pPr>
-                        <a:defRPr sz="1200"/>
-                      </a:pPr>
-                      <a:r>
-                        <a:t>Буфер переполнен (&gt;70%)</a:t>
-                      </a:r>
-                    </a:p>
-                  </a:txBody>
-                  <a:tcPr/>
-                </a:tc>
-                <a:tc>
-                  <a:txBody>
-                    <a:bodyPr/>
-                    <a:lstStyle/>
-                    <a:p>
-                      <a:pPr>
-                        <a:defRPr sz="1200"/>
-                      </a:pPr>
-                      <a:r>
-                        <a:t>Карщики ждут освобождения ячеек</a:t>
-                      </a:r>
-                    </a:p>
-                  </a:txBody>
-                  <a:tcPr/>
-                </a:tc>
-              </a:tr>
-              <a:tr h="91440">
-                <a:tc>
-                  <a:txBody>
-                    <a:bodyPr/>
-                    <a:lstStyle/>
-                    <a:p>
-                      <a:pPr>
-                        <a:defRPr sz="1200"/>
-                      </a:pPr>
-                      <a:r>
-                        <a:t>Неравномерная нагрузка</a:t>
-                      </a:r>
-                    </a:p>
-                  </a:txBody>
-                  <a:tcPr/>
-                </a:tc>
-                <a:tc>
-                  <a:txBody>
-                    <a:bodyPr/>
-                    <a:lstStyle/>
-                    <a:p>
-                      <a:pPr>
-                        <a:defRPr sz="1200"/>
-                      </a:pPr>
-                      <a:r>
-                        <a:t>Одни перегружены, другие простаивают</a:t>
-                      </a:r>
-                    </a:p>
-                  </a:txBody>
-                  <a:tcPr/>
-                </a:tc>
-              </a:tr>
-              <a:tr h="91440">
-                <a:tc>
-                  <a:txBody>
-                    <a:bodyPr/>
-                    <a:lstStyle/>
-                    <a:p>
-                      <a:pPr>
-                        <a:defRPr sz="1200"/>
-                      </a:pPr>
-                      <a:r>
-                        <a:t>Каждый сбой потока</a:t>
-                      </a:r>
-                    </a:p>
-                  </a:txBody>
-                  <a:tcPr/>
-                </a:tc>
-                <a:tc>
-                  <a:txBody>
-                    <a:bodyPr/>
-                    <a:lstStyle/>
-                    <a:p>
-                      <a:pPr>
-                        <a:defRPr sz="1200"/>
-                      </a:pPr>
-                      <a:r>
-                        <a:t>Задержка целой волны заказов</a:t>
-                      </a:r>
-                    </a:p>
-                  </a:txBody>
-                  <a:tcPr/>
-                </a:tc>
-              </a:tr>
-            </a:tbl>
-          </a:graphicData>
-        </a:graphic>
-      </p:graphicFrame>
-    </p:spTree>
-  </p:cSld>
-  <p:clrMapOvr>
-    <a:masterClrMapping/>
-  </p:clrMapOvr>
-</p:sld>
-</file>
-
-<file path=ppt/slides/slide4.xml><?xml version="1.0" encoding="utf-8"?>
-<p:sld xmlns:a="http://schemas.openxmlformats.org/drawingml/2006/main" xmlns:p="http://schemas.openxmlformats.org/presentationml/2006/main" xmlns:r="http://schemas.openxmlformats.org/officeDocument/2006/relationships">
-  <p:cSld>
-    <p:spTree>
-      <p:nvGrpSpPr>
-        <p:cNvPr id="1" name=""/>
-        <p:cNvGrpSpPr/>
-        <p:nvPr/>
-      </p:nvGrpSpPr>
-      <p:grpSpPr/>
-      <p:sp>
-        <p:nvSpPr>
-          <p:cNvPr id="2" name="Rectangle 1"/>
-          <p:cNvSpPr/>
-          <p:nvPr/>
-        </p:nvSpPr>
-        <p:spPr>
-          <a:xfrm>
-            <a:off x="0" y="0"/>
-            <a:ext cx="9144000" cy="1097280"/>
-          </a:xfrm>
-          <a:prstGeom prst="rect">
-            <a:avLst/>
-          </a:prstGeom>
-          <a:solidFill>
-            <a:srgbClr val="0070C0"/>
-          </a:solidFill>
-          <a:ln>
-            <a:noFill/>
-          </a:ln>
-        </p:spPr>
-        <p:style>
-          <a:lnRef idx="1">
-            <a:schemeClr val="accent1"/>
-          </a:lnRef>
-          <a:fillRef idx="3">
-            <a:schemeClr val="accent1"/>
-          </a:fillRef>
-          <a:effectRef idx="2">
-            <a:schemeClr val="accent1"/>
-          </a:effectRef>
-          <a:fontRef idx="minor">
-            <a:schemeClr val="lt1"/>
-          </a:fontRef>
-        </p:style>
-        <p:txBody>
-          <a:bodyPr rtlCol="0" anchor="ctr" wrap="square" lIns="457200" tIns="274320"/>
-          <a:lstStyle/>
-          <a:p>
-            <a:pPr algn="l">
-              <a:defRPr sz="3200" b="1">
-                <a:solidFill>
-                  <a:srgbClr val="FFFFFF"/>
-                </a:solidFill>
-              </a:defRPr>
-            </a:pPr>
-            <a:r>
-              <a:t>3. Решение — 3 уровня оптимизации</a:t>
-            </a:r>
-          </a:p>
-        </p:txBody>
-      </p:sp>
-      <p:sp>
-        <p:nvSpPr>
-          <p:cNvPr id="3" name="TextBox 2"/>
-          <p:cNvSpPr txBox="1"/>
-          <p:nvPr/>
-        </p:nvSpPr>
-        <p:spPr>
-          <a:xfrm>
-            <a:off x="457200" y="1371600"/>
-            <a:ext cx="8229600" cy="4572000"/>
-          </a:xfrm>
-          <a:prstGeom prst="rect">
-            <a:avLst/>
-          </a:prstGeom>
-          <a:noFill/>
-        </p:spPr>
-        <p:txBody>
-          <a:bodyPr wrap="square">
-            <a:spAutoFit/>
-          </a:bodyPr>
-          <a:lstStyle/>
-          <a:p>
-            <a:pPr>
-              <a:spcBef>
-                <a:spcPts val="1200"/>
-              </a:spcBef>
-              <a:defRPr sz="2000"/>
-            </a:pPr>
-            <a:r>
-              <a:t>УРОВЕНЬ 3: ПРОГНОЗИРОВАНИЕ (Historical Layer)</a:t>
-            </a:r>
-          </a:p>
-          <a:p>
-            <a:pPr>
-              <a:spcBef>
-                <a:spcPts val="1200"/>
-              </a:spcBef>
-              <a:defRPr sz="2000"/>
-            </a:pPr>
-            <a:r>
-              <a:t>   → ML-модели предсказывают время выполнения задач</a:t>
-            </a:r>
-          </a:p>
-          <a:p>
-            <a:pPr>
-              <a:spcBef>
-                <a:spcPts val="1200"/>
-              </a:spcBef>
-              <a:defRPr sz="2000"/>
-            </a:pPr>
-          </a:p>
-          <a:p>
-            <a:pPr>
-              <a:spcBef>
-                <a:spcPts val="1200"/>
-              </a:spcBef>
-              <a:defRPr sz="2000"/>
-            </a:pPr>
-            <a:r>
-              <a:t>УРОВЕНЬ 2: ПЛАНИРОВАНИЕ (Tactical Layer)</a:t>
-            </a:r>
-          </a:p>
-          <a:p>
-            <a:pPr>
-              <a:spcBef>
-                <a:spcPts val="1200"/>
-              </a:spcBef>
-              <a:defRPr sz="2000"/>
-            </a:pPr>
-            <a:r>
-              <a:t>   → OR-Tools оптимизирует назначения и расписание</a:t>
-            </a:r>
-          </a:p>
-          <a:p>
-            <a:pPr>
-              <a:spcBef>
-                <a:spcPts val="1200"/>
-              </a:spcBef>
-              <a:defRPr sz="2000"/>
-            </a:pPr>
-          </a:p>
-          <a:p>
-            <a:pPr>
-              <a:spcBef>
-                <a:spcPts val="1200"/>
-              </a:spcBef>
-              <a:defRPr sz="2000"/>
-            </a:pPr>
-            <a:r>
-              <a:t>УРОВЕНЬ 1: РЕАГИРОВАНИЕ (Realtime Layer)</a:t>
-            </a:r>
-          </a:p>
-          <a:p>
-            <a:pPr>
-              <a:spcBef>
-                <a:spcPts val="1200"/>
-              </a:spcBef>
-              <a:defRPr sz="2000"/>
-            </a:pPr>
-            <a:r>
-              <a:t>   → Гистерезис-контроллер управляет уровнем буфера</a:t>
-            </a:r>
-          </a:p>
-          <a:p>
-            <a:pPr>
-              <a:spcBef>
-                <a:spcPts val="1200"/>
-              </a:spcBef>
-              <a:defRPr sz="2000"/>
-            </a:pPr>
-          </a:p>
-          <a:p>
-            <a:pPr>
-              <a:spcBef>
-                <a:spcPts val="1200"/>
-              </a:spcBef>
-              <a:defRPr sz="2000"/>
-            </a:pPr>
-            <a:r>
-              <a:t>Принцип: Прогноз → План → Исполнение → Корректировка</a:t>
-            </a:r>
-          </a:p>
-        </p:txBody>
-      </p:sp>
-    </p:spTree>
-  </p:cSld>
-  <p:clrMapOvr>
-    <a:masterClrMapping/>
-  </p:clrMapOvr>
-</p:sld>
-</file>
-
-<file path=ppt/slides/slide5.xml><?xml version="1.0" encoding="utf-8"?>
-<p:sld xmlns:a="http://schemas.openxmlformats.org/drawingml/2006/main" xmlns:p="http://schemas.openxmlformats.org/presentationml/2006/main" xmlns:r="http://schemas.openxmlformats.org/officeDocument/2006/relationships">
-  <p:cSld>
-    <p:spTree>
-      <p:nvGrpSpPr>
-        <p:cNvPr id="1" name=""/>
-        <p:cNvGrpSpPr/>
-        <p:nvPr/>
-      </p:nvGrpSpPr>
-      <p:grpSpPr/>
-      <p:sp>
-        <p:nvSpPr>
-          <p:cNvPr id="2" name="Rectangle 1"/>
-          <p:cNvSpPr/>
-          <p:nvPr/>
-        </p:nvSpPr>
-        <p:spPr>
-          <a:xfrm>
-            <a:off x="0" y="0"/>
-            <a:ext cx="9144000" cy="1097280"/>
-          </a:xfrm>
-          <a:prstGeom prst="rect">
-            <a:avLst/>
-          </a:prstGeom>
-          <a:solidFill>
-            <a:srgbClr val="0070C0"/>
-          </a:solidFill>
-          <a:ln>
-            <a:noFill/>
-          </a:ln>
-        </p:spPr>
-        <p:style>
-          <a:lnRef idx="1">
-            <a:schemeClr val="accent1"/>
-          </a:lnRef>
-          <a:fillRef idx="3">
-            <a:schemeClr val="accent1"/>
-          </a:fillRef>
-          <a:effectRef idx="2">
-            <a:schemeClr val="accent1"/>
-          </a:effectRef>
-          <a:fontRef idx="minor">
-            <a:schemeClr val="lt1"/>
-          </a:fontRef>
-        </p:style>
-        <p:txBody>
-          <a:bodyPr rtlCol="0" anchor="ctr" wrap="square" lIns="457200" tIns="274320"/>
-          <a:lstStyle/>
-          <a:p>
-            <a:pPr algn="l">
-              <a:defRPr sz="3200" b="1">
-                <a:solidFill>
-                  <a:srgbClr val="FFFFFF"/>
-                </a:solidFill>
-              </a:defRPr>
-            </a:pPr>
-            <a:r>
-              <a:t>4. ML-модели для прогнозирования</a:t>
-            </a:r>
-          </a:p>
-        </p:txBody>
-      </p:sp>
-      <p:sp>
-        <p:nvSpPr>
-          <p:cNvPr id="3" name="TextBox 2"/>
-          <p:cNvSpPr txBox="1"/>
-          <p:nvPr/>
-        </p:nvSpPr>
-        <p:spPr>
-          <a:xfrm>
-            <a:off x="457200" y="1371600"/>
-            <a:ext cx="8229600" cy="4572000"/>
-          </a:xfrm>
-          <a:prstGeom prst="rect">
-            <a:avLst/>
-          </a:prstGeom>
-          <a:noFill/>
-        </p:spPr>
-        <p:txBody>
-          <a:bodyPr wrap="square">
-            <a:spAutoFit/>
-          </a:bodyPr>
-          <a:lstStyle/>
-          <a:p>
-            <a:pPr>
-              <a:spcBef>
-                <a:spcPts val="1200"/>
-              </a:spcBef>
-              <a:defRPr sz="2000"/>
-            </a:pPr>
-            <a:r>
-              <a:t>Модель 1: Время сборки (Picker Duration)</a:t>
-            </a:r>
-          </a:p>
-          <a:p>
-            <a:pPr>
-              <a:spcBef>
-                <a:spcPts val="1200"/>
-              </a:spcBef>
-              <a:defRPr sz="2000"/>
-            </a:pPr>
-            <a:r>
-              <a:t>   Входы: ID сборщика, кол-во строк, кол-во товаров, час, день недели</a:t>
-            </a:r>
-          </a:p>
-          <a:p>
-            <a:pPr>
-              <a:spcBef>
-                <a:spcPts val="1200"/>
-              </a:spcBef>
-              <a:defRPr sz="2000"/>
-            </a:pPr>
-            <a:r>
-              <a:t>   Выход: прогноз времени выполнения задания (секунды)</a:t>
-            </a:r>
-          </a:p>
-          <a:p>
-            <a:pPr>
-              <a:spcBef>
-                <a:spcPts val="1200"/>
-              </a:spcBef>
-              <a:defRPr sz="2000"/>
-            </a:pPr>
-          </a:p>
-          <a:p>
-            <a:pPr>
-              <a:spcBef>
-                <a:spcPts val="1200"/>
-              </a:spcBef>
-              <a:defRPr sz="2000"/>
-            </a:pPr>
-            <a:r>
-              <a:t>Модель 2: Время маршрута карщика (Forklift Duration)</a:t>
-            </a:r>
-          </a:p>
-          <a:p>
-            <a:pPr>
-              <a:spcBef>
-                <a:spcPts val="1200"/>
-              </a:spcBef>
-              <a:defRPr sz="2000"/>
-            </a:pPr>
-            <a:r>
-              <a:t>   Входы: ID карщика, зона источника → зона назначения, вес палеты</a:t>
-            </a:r>
-          </a:p>
-          <a:p>
-            <a:pPr>
-              <a:spcBef>
-                <a:spcPts val="1200"/>
-              </a:spcBef>
-              <a:defRPr sz="2000"/>
-            </a:pPr>
-            <a:r>
-              <a:t>   Выход: прогноз времени доставки (секунды)</a:t>
-            </a:r>
-          </a:p>
-          <a:p>
-            <a:pPr>
-              <a:spcBef>
-                <a:spcPts val="1200"/>
-              </a:spcBef>
-              <a:defRPr sz="2000"/>
-            </a:pPr>
-          </a:p>
-          <a:p>
-            <a:pPr>
-              <a:spcBef>
-                <a:spcPts val="1200"/>
-              </a:spcBef>
-              <a:defRPr sz="2000"/>
-            </a:pPr>
-            <a:r>
-              <a:t>База для обучения: 1.5 млн исторических записей</a:t>
-            </a:r>
-          </a:p>
-        </p:txBody>
-      </p:sp>
-    </p:spTree>
-  </p:cSld>
-  <p:clrMapOvr>
-    <a:masterClrMapping/>
-  </p:clrMapOvr>
-</p:sld>
-</file>
-
-<file path=ppt/slides/slide6.xml><?xml version="1.0" encoding="utf-8"?>
-<p:sld xmlns:a="http://schemas.openxmlformats.org/drawingml/2006/main" xmlns:p="http://schemas.openxmlformats.org/presentationml/2006/main" xmlns:r="http://schemas.openxmlformats.org/officeDocument/2006/relationships">
-  <p:cSld>
-    <p:spTree>
-      <p:nvGrpSpPr>
-        <p:cNvPr id="1" name=""/>
-        <p:cNvGrpSpPr/>
-        <p:nvPr/>
-      </p:nvGrpSpPr>
-      <p:grpSpPr/>
-      <p:sp>
-        <p:nvSpPr>
-          <p:cNvPr id="2" name="Rectangle 1"/>
-          <p:cNvSpPr/>
-          <p:nvPr/>
-        </p:nvSpPr>
-        <p:spPr>
-          <a:xfrm>
-            <a:off x="0" y="0"/>
-            <a:ext cx="9144000" cy="1097280"/>
-          </a:xfrm>
-          <a:prstGeom prst="rect">
-            <a:avLst/>
-          </a:prstGeom>
-          <a:solidFill>
-            <a:srgbClr val="0070C0"/>
-          </a:solidFill>
-          <a:ln>
-            <a:noFill/>
-          </a:ln>
-        </p:spPr>
-        <p:style>
-          <a:lnRef idx="1">
-            <a:schemeClr val="accent1"/>
-          </a:lnRef>
-          <a:fillRef idx="3">
-            <a:schemeClr val="accent1"/>
-          </a:fillRef>
-          <a:effectRef idx="2">
-            <a:schemeClr val="accent1"/>
-          </a:effectRef>
-          <a:fontRef idx="minor">
-            <a:schemeClr val="lt1"/>
-          </a:fontRef>
-        </p:style>
-        <p:txBody>
-          <a:bodyPr rtlCol="0" anchor="ctr" wrap="square" lIns="457200" tIns="274320"/>
-          <a:lstStyle/>
-          <a:p>
-            <a:pPr algn="l">
-              <a:defRPr sz="3200" b="1">
-                <a:solidFill>
-                  <a:srgbClr val="FFFFFF"/>
-                </a:solidFill>
-              </a:defRPr>
-            </a:pPr>
-            <a:r>
-              <a:t>5. Оптимизация расписания (OR-Tools)</a:t>
-            </a:r>
-          </a:p>
-        </p:txBody>
-      </p:sp>
-      <p:sp>
-        <p:nvSpPr>
-          <p:cNvPr id="3" name="TextBox 2"/>
-          <p:cNvSpPr txBox="1"/>
-          <p:nvPr/>
-        </p:nvSpPr>
-        <p:spPr>
-          <a:xfrm>
-            <a:off x="457200" y="1371600"/>
-            <a:ext cx="8229600" cy="4572000"/>
-          </a:xfrm>
-          <a:prstGeom prst="rect">
-            <a:avLst/>
-          </a:prstGeom>
-          <a:noFill/>
-        </p:spPr>
-        <p:txBody>
-          <a:bodyPr wrap="square">
-            <a:spAutoFit/>
-          </a:bodyPr>
-          <a:lstStyle/>
-          <a:p>
-            <a:pPr>
-              <a:spcBef>
-                <a:spcPts val="1200"/>
-              </a:spcBef>
-              <a:defRPr sz="2000"/>
-            </a:pPr>
-            <a:r>
-              <a:t>Задача: минимизация общего времени выполнения волны</a:t>
-            </a:r>
-          </a:p>
-          <a:p>
-            <a:pPr>
-              <a:spcBef>
-                <a:spcPts val="1200"/>
-              </a:spcBef>
-              <a:defRPr sz="2000"/>
-            </a:pPr>
-          </a:p>
-          <a:p>
-            <a:pPr>
-              <a:spcBef>
-                <a:spcPts val="1200"/>
-              </a:spcBef>
-              <a:defRPr sz="2000"/>
-            </a:pPr>
-            <a:r>
-              <a:t>Дано:</a:t>
-            </a:r>
-          </a:p>
-          <a:p>
-            <a:pPr>
-              <a:spcBef>
-                <a:spcPts val="1200"/>
-              </a:spcBef>
-              <a:defRPr sz="2000"/>
-            </a:pPr>
-            <a:r>
-              <a:t>   • N заданий на сборку (с прогнозом времени)</a:t>
-            </a:r>
-          </a:p>
-          <a:p>
-            <a:pPr>
-              <a:spcBef>
-                <a:spcPts val="1200"/>
-              </a:spcBef>
-              <a:defRPr sz="2000"/>
-            </a:pPr>
-            <a:r>
-              <a:t>   • M палет для доставки (с прогнозом времени)</a:t>
-            </a:r>
-          </a:p>
-          <a:p>
-            <a:pPr>
-              <a:spcBef>
-                <a:spcPts val="1200"/>
-              </a:spcBef>
-              <a:defRPr sz="2000"/>
-            </a:pPr>
-            <a:r>
-              <a:t>   • 3 карщика, 20 сборщиков, 64 ячейки буфера</a:t>
-            </a:r>
-          </a:p>
-          <a:p>
-            <a:pPr>
-              <a:spcBef>
-                <a:spcPts val="1200"/>
-              </a:spcBef>
-              <a:defRPr sz="2000"/>
-            </a:pPr>
-          </a:p>
-          <a:p>
-            <a:pPr>
-              <a:spcBef>
-                <a:spcPts val="1200"/>
-              </a:spcBef>
-              <a:defRPr sz="2000"/>
-            </a:pPr>
-            <a:r>
-              <a:t>Найти: Какой карщик везёт какую палету? В какую ячейку? В каком порядке?</a:t>
-            </a:r>
-          </a:p>
-          <a:p>
-            <a:pPr>
-              <a:spcBef>
-                <a:spcPts val="1200"/>
-              </a:spcBef>
-              <a:defRPr sz="2000"/>
-            </a:pPr>
-          </a:p>
-          <a:p>
-            <a:pPr>
-              <a:spcBef>
-                <a:spcPts val="1200"/>
-              </a:spcBef>
-              <a:defRPr sz="2000"/>
-            </a:pPr>
-            <a:r>
-              <a:t>Ограничения: тяжёлые палеты вниз, приоритетные заказы первыми</a:t>
-            </a:r>
-          </a:p>
-        </p:txBody>
-      </p:sp>
-    </p:spTree>
-  </p:cSld>
-  <p:clrMapOvr>
-    <a:masterClrMapping/>
-  </p:clrMapOvr>
-</p:sld>
-</file>
-
-<file path=ppt/slides/slide7.xml><?xml version="1.0" encoding="utf-8"?>
-<p:sld xmlns:a="http://schemas.openxmlformats.org/drawingml/2006/main" xmlns:p="http://schemas.openxmlformats.org/presentationml/2006/main" xmlns:r="http://schemas.openxmlformats.org/officeDocument/2006/relationships">
-  <p:cSld>
-    <p:spTree>
-      <p:nvGrpSpPr>
-        <p:cNvPr id="1" name=""/>
-        <p:cNvGrpSpPr/>
-        <p:nvPr/>
-      </p:nvGrpSpPr>
-      <p:grpSpPr/>
-      <p:sp>
-        <p:nvSpPr>
-          <p:cNvPr id="2" name="Rectangle 1"/>
-          <p:cNvSpPr/>
-          <p:nvPr/>
-        </p:nvSpPr>
-        <p:spPr>
-          <a:xfrm>
-            <a:off x="0" y="0"/>
-            <a:ext cx="9144000" cy="1097280"/>
-          </a:xfrm>
-          <a:prstGeom prst="rect">
-            <a:avLst/>
-          </a:prstGeom>
-          <a:solidFill>
-            <a:srgbClr val="0070C0"/>
-          </a:solidFill>
-          <a:ln>
-            <a:noFill/>
-          </a:ln>
-        </p:spPr>
-        <p:style>
-          <a:lnRef idx="1">
-            <a:schemeClr val="accent1"/>
-          </a:lnRef>
-          <a:fillRef idx="3">
-            <a:schemeClr val="accent1"/>
-          </a:fillRef>
-          <a:effectRef idx="2">
-            <a:schemeClr val="accent1"/>
-          </a:effectRef>
-          <a:fontRef idx="minor">
-            <a:schemeClr val="lt1"/>
-          </a:fontRef>
-        </p:style>
-        <p:txBody>
-          <a:bodyPr rtlCol="0" anchor="ctr" lIns="457200" tIns="274320"/>
-          <a:lstStyle/>
-          <a:p>
-            <a:pPr algn="ctr">
-              <a:defRPr sz="3200" b="1">
-                <a:solidFill>
-                  <a:srgbClr val="FFFFFF"/>
-                </a:solidFill>
-              </a:defRPr>
-            </a:pPr>
-            <a:r>
-              <a:t>6. Цикл оптимизации (каждые 15 минут)</a:t>
-            </a:r>
-          </a:p>
-        </p:txBody>
-      </p:sp>
-      <p:sp>
-        <p:nvSpPr>
-          <p:cNvPr id="3" name="Rectangle 2"/>
-          <p:cNvSpPr/>
-          <p:nvPr/>
-        </p:nvSpPr>
-        <p:spPr>
-          <a:xfrm>
-            <a:off x="457200" y="1371600"/>
-            <a:ext cx="8229600" cy="2286000"/>
-          </a:xfrm>
-          <a:prstGeom prst="rect">
-            <a:avLst/>
-          </a:prstGeom>
-          <a:solidFill>
-            <a:srgbClr val="F0F0F0"/>
-          </a:solidFill>
-          <a:ln>
-            <a:solidFill>
-              <a:srgbClr val="C8C8C8"/>
-            </a:solidFill>
-          </a:ln>
-        </p:spPr>
-        <p:style>
-          <a:lnRef idx="1">
-            <a:schemeClr val="accent1"/>
-          </a:lnRef>
-          <a:fillRef idx="3">
-            <a:schemeClr val="accent1"/>
-          </a:fillRef>
-          <a:effectRef idx="2">
-            <a:schemeClr val="accent1"/>
-          </a:effectRef>
-          <a:fontRef idx="minor">
-            <a:schemeClr val="lt1"/>
-          </a:fontRef>
-        </p:style>
-        <p:txBody>
-          <a:bodyPr rtlCol="0" anchor="ctr" wrap="square" lIns="182880" tIns="182880"/>
-          <a:lstStyle/>
-          <a:p>
-            <a:pPr algn="ctr">
-              <a:defRPr sz="1400">
-                <a:latin typeface="Courier New"/>
-              </a:defRPr>
-            </a:pPr>
-            <a:r>
-              <a:t>Заказы (волна) → Прогноз ML.NET → OR-Tools CP-SAT → Исполнение WMS → Обратная связь</a:t>
-            </a:r>
-          </a:p>
-        </p:txBody>
-      </p:sp>
-      <p:sp>
-        <p:nvSpPr>
-          <p:cNvPr id="4" name="TextBox 3"/>
-          <p:cNvSpPr txBox="1"/>
-          <p:nvPr/>
-        </p:nvSpPr>
-        <p:spPr>
-          <a:xfrm>
-            <a:off x="457200" y="3840480"/>
-            <a:ext cx="8229600" cy="2286000"/>
-          </a:xfrm>
-          <a:prstGeom prst="rect">
-            <a:avLst/>
-          </a:prstGeom>
-          <a:noFill/>
-        </p:spPr>
-        <p:txBody>
-          <a:bodyPr wrap="square">
-            <a:spAutoFit/>
-          </a:bodyPr>
-          <a:lstStyle/>
-          <a:p>
-            <a:pPr>
-              <a:spcBef>
-                <a:spcPts val="800"/>
-              </a:spcBef>
-              <a:defRPr sz="1800"/>
-            </a:pPr>
-            <a:r>
-              <a:t>1. Получаем список заказов для сборки</a:t>
-            </a:r>
-          </a:p>
-          <a:p>
-            <a:pPr>
-              <a:spcBef>
-                <a:spcPts val="800"/>
-              </a:spcBef>
-              <a:defRPr sz="1800"/>
-            </a:pPr>
-            <a:r>
-              <a:t>2. ML предсказывает время каждой операции</a:t>
-            </a:r>
-          </a:p>
-          <a:p>
-            <a:pPr>
-              <a:spcBef>
-                <a:spcPts val="800"/>
-              </a:spcBef>
-              <a:defRPr sz="1800"/>
-            </a:pPr>
-            <a:r>
-              <a:t>3. OR-Tools строит оптимальный план</a:t>
-            </a:r>
-          </a:p>
-          <a:p>
-            <a:pPr>
-              <a:spcBef>
-                <a:spcPts val="800"/>
-              </a:spcBef>
-              <a:defRPr sz="1800"/>
-            </a:pPr>
-            <a:r>
-              <a:t>4. План отправляется в WMS для исполнения</a:t>
-            </a:r>
-          </a:p>
-          <a:p>
-            <a:pPr>
-              <a:spcBef>
-                <a:spcPts val="800"/>
-              </a:spcBef>
-              <a:defRPr sz="1800"/>
-            </a:pPr>
-            <a:r>
-              <a:t>5. Результаты используются для улучшения моделей</a:t>
-            </a:r>
-          </a:p>
-        </p:txBody>
-      </p:sp>
-    </p:spTree>
-  </p:cSld>
-  <p:clrMapOvr>
-    <a:masterClrMapping/>
-  </p:clrMapOvr>
-</p:sld>
-</file>
-
-<file path=ppt/slides/slide8.xml><?xml version="1.0" encoding="utf-8"?>
-<p:sld xmlns:a="http://schemas.openxmlformats.org/drawingml/2006/main" xmlns:p="http://schemas.openxmlformats.org/presentationml/2006/main" xmlns:r="http://schemas.openxmlformats.org/officeDocument/2006/relationships">
-  <p:cSld>
-    <p:spTree>
-      <p:nvGrpSpPr>
-        <p:cNvPr id="1" name=""/>
-        <p:cNvGrpSpPr/>
-        <p:nvPr/>
-      </p:nvGrpSpPr>
-      <p:grpSpPr/>
-      <p:sp>
-        <p:nvSpPr>
-          <p:cNvPr id="2" name="Rectangle 1"/>
-          <p:cNvSpPr/>
-          <p:nvPr/>
-        </p:nvSpPr>
-        <p:spPr>
-          <a:xfrm>
-            <a:off x="0" y="0"/>
-            <a:ext cx="9144000" cy="1097280"/>
-          </a:xfrm>
-          <a:prstGeom prst="rect">
-            <a:avLst/>
-          </a:prstGeom>
-          <a:solidFill>
-            <a:srgbClr val="0070C0"/>
-          </a:solidFill>
-          <a:ln>
-            <a:noFill/>
-          </a:ln>
-        </p:spPr>
-        <p:style>
-          <a:lnRef idx="1">
-            <a:schemeClr val="accent1"/>
-          </a:lnRef>
-          <a:fillRef idx="3">
-            <a:schemeClr val="accent1"/>
-          </a:fillRef>
-          <a:effectRef idx="2">
-            <a:schemeClr val="accent1"/>
-          </a:effectRef>
-          <a:fontRef idx="minor">
-            <a:schemeClr val="lt1"/>
-          </a:fontRef>
-        </p:style>
-        <p:txBody>
-          <a:bodyPr rtlCol="0" anchor="ctr" wrap="square" lIns="457200" tIns="274320"/>
-          <a:lstStyle/>
-          <a:p>
-            <a:pPr algn="l">
-              <a:defRPr sz="3200" b="1">
-                <a:solidFill>
-                  <a:srgbClr val="FFFFFF"/>
-                </a:solidFill>
-              </a:defRPr>
-            </a:pPr>
-            <a:r>
-              <a:t>7. Пример: волна из 50 заданий</a:t>
-            </a:r>
-          </a:p>
-        </p:txBody>
-      </p:sp>
-      <p:sp>
-        <p:nvSpPr>
-          <p:cNvPr id="3" name="TextBox 2"/>
-          <p:cNvSpPr txBox="1"/>
-          <p:nvPr/>
-        </p:nvSpPr>
-        <p:spPr>
-          <a:xfrm>
-            <a:off x="457200" y="1371600"/>
-            <a:ext cx="8229600" cy="4572000"/>
-          </a:xfrm>
-          <a:prstGeom prst="rect">
-            <a:avLst/>
-          </a:prstGeom>
-          <a:noFill/>
-        </p:spPr>
-        <p:txBody>
-          <a:bodyPr wrap="square">
-            <a:spAutoFit/>
-          </a:bodyPr>
-          <a:lstStyle/>
-          <a:p>
-            <a:pPr>
-              <a:spcBef>
-                <a:spcPts val="1200"/>
-              </a:spcBef>
-              <a:defRPr sz="2000"/>
-            </a:pPr>
-            <a:r>
-              <a:t>БЕЗ оптимизации:</a:t>
-            </a:r>
-          </a:p>
-          <a:p>
-            <a:pPr>
-              <a:spcBef>
-                <a:spcPts val="1200"/>
-              </a:spcBef>
-              <a:defRPr sz="2000"/>
-            </a:pPr>
-            <a:r>
-              <a:t>   Карщик 1: ████████████████████████ (перегружен)</a:t>
-            </a:r>
-          </a:p>
-          <a:p>
-            <a:pPr>
-              <a:spcBef>
-                <a:spcPts val="1200"/>
-              </a:spcBef>
-              <a:defRPr sz="2000"/>
-            </a:pPr>
-            <a:r>
-              <a:t>   Карщик 2: ████████░░░░░░░░░░░░░░░░ (недогружен)</a:t>
-            </a:r>
-          </a:p>
-          <a:p>
-            <a:pPr>
-              <a:spcBef>
-                <a:spcPts val="1200"/>
-              </a:spcBef>
-              <a:defRPr sz="2000"/>
-            </a:pPr>
-            <a:r>
-              <a:t>   Карщик 3: ██████████████░░░░░░░░░░ (средне)</a:t>
-            </a:r>
-          </a:p>
-          <a:p>
-            <a:pPr>
-              <a:spcBef>
-                <a:spcPts val="1200"/>
-              </a:spcBef>
-              <a:defRPr sz="2000"/>
-            </a:pPr>
-            <a:r>
-              <a:t>   Время волны: 45 минут, простои: 12%</a:t>
-            </a:r>
-          </a:p>
-          <a:p>
-            <a:pPr>
-              <a:spcBef>
-                <a:spcPts val="1200"/>
-              </a:spcBef>
-              <a:defRPr sz="2000"/>
-            </a:pPr>
-          </a:p>
-          <a:p>
-            <a:pPr>
-              <a:spcBef>
-                <a:spcPts val="1200"/>
-              </a:spcBef>
-              <a:defRPr sz="2000"/>
-            </a:pPr>
-            <a:r>
-              <a:t>С оптимизацией OR-Tools:</a:t>
-            </a:r>
-          </a:p>
-          <a:p>
-            <a:pPr>
-              <a:spcBef>
-                <a:spcPts val="1200"/>
-              </a:spcBef>
-              <a:defRPr sz="2000"/>
-            </a:pPr>
-            <a:r>
-              <a:t>   Карщик 1: ████████████████░░░░░░░░ (сбалансировано)</a:t>
-            </a:r>
-          </a:p>
-          <a:p>
-            <a:pPr>
-              <a:spcBef>
-                <a:spcPts val="1200"/>
-              </a:spcBef>
-              <a:defRPr sz="2000"/>
-            </a:pPr>
-            <a:r>
-              <a:t>   Карщик 2: ███████████████░░░░░░░░░ (сбалансировано)</a:t>
-            </a:r>
-          </a:p>
-          <a:p>
-            <a:pPr>
-              <a:spcBef>
-                <a:spcPts val="1200"/>
-              </a:spcBef>
-              <a:defRPr sz="2000"/>
-            </a:pPr>
-            <a:r>
-              <a:t>   Карщик 3: ████████████████░░░░░░░░ (сбалансировано)</a:t>
-            </a:r>
-          </a:p>
-          <a:p>
-            <a:pPr>
-              <a:spcBef>
-                <a:spcPts val="1200"/>
-              </a:spcBef>
-              <a:defRPr sz="2000"/>
-            </a:pPr>
-            <a:r>
-              <a:t>   Время волны: 32 минуты (-29%), простои: 3%</a:t>
-            </a:r>
-          </a:p>
-        </p:txBody>
-      </p:sp>
-    </p:spTree>
-  </p:cSld>
-  <p:clrMapOvr>
-    <a:masterClrMapping/>
-  </p:clrMapOvr>
-</p:sld>
-</file>
-
-<file path=ppt/slides/slide9.xml><?xml version="1.0" encoding="utf-8"?>
-<p:sld xmlns:a="http://schemas.openxmlformats.org/drawingml/2006/main" xmlns:p="http://schemas.openxmlformats.org/presentationml/2006/main" xmlns:r="http://schemas.openxmlformats.org/officeDocument/2006/relationships">
-  <p:cSld>
-    <p:spTree>
-      <p:nvGrpSpPr>
-        <p:cNvPr id="1" name=""/>
-        <p:cNvGrpSpPr/>
-        <p:nvPr/>
-      </p:nvGrpSpPr>
-      <p:grpSpPr/>
-      <p:sp>
-        <p:nvSpPr>
-          <p:cNvPr id="2" name="Rectangle 1"/>
-          <p:cNvSpPr/>
-          <p:nvPr/>
-        </p:nvSpPr>
-        <p:spPr>
-          <a:xfrm>
-            <a:off x="0" y="0"/>
-            <a:ext cx="9144000" cy="1097280"/>
-          </a:xfrm>
-          <a:prstGeom prst="rect">
-            <a:avLst/>
-          </a:prstGeom>
-          <a:solidFill>
-            <a:srgbClr val="0070C0"/>
-          </a:solidFill>
-          <a:ln>
-            <a:noFill/>
-          </a:ln>
-        </p:spPr>
-        <p:style>
-          <a:lnRef idx="1">
-            <a:schemeClr val="accent1"/>
-          </a:lnRef>
-          <a:fillRef idx="3">
-            <a:schemeClr val="accent1"/>
-          </a:fillRef>
-          <a:effectRef idx="2">
-            <a:schemeClr val="accent1"/>
-          </a:effectRef>
-          <a:fontRef idx="minor">
-            <a:schemeClr val="lt1"/>
-          </a:fontRef>
-        </p:style>
-        <p:txBody>
-          <a:bodyPr rtlCol="0" anchor="ctr" lIns="457200" tIns="274320"/>
-          <a:lstStyle/>
-          <a:p>
-            <a:pPr algn="ctr">
-              <a:defRPr sz="3200" b="1">
-                <a:solidFill>
-                  <a:srgbClr val="FFFFFF"/>
-                </a:solidFill>
-              </a:defRPr>
-            </a:pPr>
-            <a:r>
-              <a:t>8. Ожидаемые результаты</a:t>
+              <a:t>9. Ожидаемые результаты</a:t>
             </a:r>
           </a:p>
         </p:txBody>
@@ -5676,6 +3634,2276 @@
 </p:sld>
 </file>
 
+<file path=ppt/slides/slide11.xml><?xml version="1.0" encoding="utf-8"?>
+<p:sld xmlns:a="http://schemas.openxmlformats.org/drawingml/2006/main" xmlns:p="http://schemas.openxmlformats.org/presentationml/2006/main" xmlns:r="http://schemas.openxmlformats.org/officeDocument/2006/relationships">
+  <p:cSld>
+    <p:spTree>
+      <p:nvGrpSpPr>
+        <p:cNvPr id="1" name=""/>
+        <p:cNvGrpSpPr/>
+        <p:nvPr/>
+      </p:nvGrpSpPr>
+      <p:grpSpPr/>
+      <p:sp>
+        <p:nvSpPr>
+          <p:cNvPr id="2" name="Rectangle 1"/>
+          <p:cNvSpPr/>
+          <p:nvPr/>
+        </p:nvSpPr>
+        <p:spPr>
+          <a:xfrm>
+            <a:off x="0" y="0"/>
+            <a:ext cx="9144000" cy="1097280"/>
+          </a:xfrm>
+          <a:prstGeom prst="rect">
+            <a:avLst/>
+          </a:prstGeom>
+          <a:solidFill>
+            <a:srgbClr val="0070C0"/>
+          </a:solidFill>
+          <a:ln>
+            <a:noFill/>
+          </a:ln>
+        </p:spPr>
+        <p:style>
+          <a:lnRef idx="1">
+            <a:schemeClr val="accent1"/>
+          </a:lnRef>
+          <a:fillRef idx="3">
+            <a:schemeClr val="accent1"/>
+          </a:fillRef>
+          <a:effectRef idx="2">
+            <a:schemeClr val="accent1"/>
+          </a:effectRef>
+          <a:fontRef idx="minor">
+            <a:schemeClr val="lt1"/>
+          </a:fontRef>
+        </p:style>
+        <p:txBody>
+          <a:bodyPr rtlCol="0" anchor="ctr" lIns="457200" tIns="274320"/>
+          <a:lstStyle/>
+          <a:p>
+            <a:pPr algn="ctr">
+              <a:defRPr sz="3200" b="1">
+                <a:solidFill>
+                  <a:srgbClr val="FFFFFF"/>
+                </a:solidFill>
+              </a:defRPr>
+            </a:pPr>
+            <a:r>
+              <a:t>10. План внедрения</a:t>
+            </a:r>
+          </a:p>
+        </p:txBody>
+      </p:sp>
+      <p:graphicFrame>
+        <p:nvGraphicFramePr>
+          <p:cNvPr id="3" name="Table 2"/>
+          <p:cNvGraphicFramePr>
+            <a:graphicFrameLocks noGrp="1"/>
+          </p:cNvGraphicFramePr>
+          <p:nvPr/>
+        </p:nvGraphicFramePr>
+        <p:xfrm>
+          <a:off x="457200" y="1371600"/>
+          <a:ext cx="8229600" cy="457200"/>
+        </p:xfrm>
+        <a:graphic>
+          <a:graphicData uri="http://schemas.openxmlformats.org/drawingml/2006/table">
+            <a:tbl>
+              <a:tblPr firstRow="1" bandRow="1">
+                <a:tableStyleId>{5C22544A-7EE6-4342-B048-85BDC9FD1C3A}</a:tableStyleId>
+              </a:tblPr>
+              <a:tblGrid>
+                <a:gridCol w="2743200"/>
+                <a:gridCol w="2743200"/>
+                <a:gridCol w="2743200"/>
+              </a:tblGrid>
+              <a:tr h="76200">
+                <a:tc>
+                  <a:txBody>
+                    <a:bodyPr/>
+                    <a:lstStyle/>
+                    <a:p>
+                      <a:pPr>
+                        <a:defRPr b="1" sz="1400">
+                          <a:solidFill>
+                            <a:srgbClr val="FFFFFF"/>
+                          </a:solidFill>
+                        </a:defRPr>
+                      </a:pPr>
+                      <a:r>
+                        <a:t>Этап</a:t>
+                      </a:r>
+                    </a:p>
+                  </a:txBody>
+                  <a:tcPr>
+                    <a:solidFill>
+                      <a:srgbClr val="0070C0"/>
+                    </a:solidFill>
+                  </a:tcPr>
+                </a:tc>
+                <a:tc>
+                  <a:txBody>
+                    <a:bodyPr/>
+                    <a:lstStyle/>
+                    <a:p>
+                      <a:pPr>
+                        <a:defRPr b="1" sz="1400">
+                          <a:solidFill>
+                            <a:srgbClr val="FFFFFF"/>
+                          </a:solidFill>
+                        </a:defRPr>
+                      </a:pPr>
+                      <a:r>
+                        <a:t>Задачи</a:t>
+                      </a:r>
+                    </a:p>
+                  </a:txBody>
+                  <a:tcPr>
+                    <a:solidFill>
+                      <a:srgbClr val="0070C0"/>
+                    </a:solidFill>
+                  </a:tcPr>
+                </a:tc>
+                <a:tc>
+                  <a:txBody>
+                    <a:bodyPr/>
+                    <a:lstStyle/>
+                    <a:p>
+                      <a:pPr>
+                        <a:defRPr b="1" sz="1400">
+                          <a:solidFill>
+                            <a:srgbClr val="FFFFFF"/>
+                          </a:solidFill>
+                        </a:defRPr>
+                      </a:pPr>
+                      <a:r>
+                        <a:t>Результат</a:t>
+                      </a:r>
+                    </a:p>
+                  </a:txBody>
+                  <a:tcPr>
+                    <a:solidFill>
+                      <a:srgbClr val="0070C0"/>
+                    </a:solidFill>
+                  </a:tcPr>
+                </a:tc>
+              </a:tr>
+              <a:tr h="76200">
+                <a:tc>
+                  <a:txBody>
+                    <a:bodyPr/>
+                    <a:lstStyle/>
+                    <a:p>
+                      <a:pPr>
+                        <a:defRPr sz="1200"/>
+                      </a:pPr>
+                      <a:r>
+                        <a:t>1. ML-модели</a:t>
+                      </a:r>
+                    </a:p>
+                  </a:txBody>
+                  <a:tcPr/>
+                </a:tc>
+                <a:tc>
+                  <a:txBody>
+                    <a:bodyPr/>
+                    <a:lstStyle/>
+                    <a:p>
+                      <a:pPr>
+                        <a:defRPr sz="1200"/>
+                      </a:pPr>
+                      <a:r>
+                        <a:t>Обучение на истории</a:t>
+                      </a:r>
+                    </a:p>
+                  </a:txBody>
+                  <a:tcPr/>
+                </a:tc>
+                <a:tc>
+                  <a:txBody>
+                    <a:bodyPr/>
+                    <a:lstStyle/>
+                    <a:p>
+                      <a:pPr>
+                        <a:defRPr sz="1200"/>
+                      </a:pPr>
+                      <a:r>
+                        <a:t>Прогноз времени</a:t>
+                      </a:r>
+                    </a:p>
+                  </a:txBody>
+                  <a:tcPr/>
+                </a:tc>
+              </a:tr>
+              <a:tr h="76200">
+                <a:tc>
+                  <a:txBody>
+                    <a:bodyPr/>
+                    <a:lstStyle/>
+                    <a:p>
+                      <a:pPr>
+                        <a:defRPr sz="1200"/>
+                      </a:pPr>
+                      <a:r>
+                        <a:t>2. Тестирование</a:t>
+                      </a:r>
+                    </a:p>
+                  </a:txBody>
+                  <a:tcPr/>
+                </a:tc>
+                <a:tc>
+                  <a:txBody>
+                    <a:bodyPr/>
+                    <a:lstStyle/>
+                    <a:p>
+                      <a:pPr>
+                        <a:defRPr sz="1200"/>
+                      </a:pPr>
+                      <a:r>
+                        <a:t>Сравнение с реальностью</a:t>
+                      </a:r>
+                    </a:p>
+                  </a:txBody>
+                  <a:tcPr/>
+                </a:tc>
+                <a:tc>
+                  <a:txBody>
+                    <a:bodyPr/>
+                    <a:lstStyle/>
+                    <a:p>
+                      <a:pPr>
+                        <a:defRPr sz="1200"/>
+                      </a:pPr>
+                      <a:r>
+                        <a:t>Оценка точности</a:t>
+                      </a:r>
+                    </a:p>
+                  </a:txBody>
+                  <a:tcPr/>
+                </a:tc>
+              </a:tr>
+              <a:tr h="76200">
+                <a:tc>
+                  <a:txBody>
+                    <a:bodyPr/>
+                    <a:lstStyle/>
+                    <a:p>
+                      <a:pPr>
+                        <a:defRPr sz="1200"/>
+                      </a:pPr>
+                      <a:r>
+                        <a:t>3. OR-Tools</a:t>
+                      </a:r>
+                    </a:p>
+                  </a:txBody>
+                  <a:tcPr/>
+                </a:tc>
+                <a:tc>
+                  <a:txBody>
+                    <a:bodyPr/>
+                    <a:lstStyle/>
+                    <a:p>
+                      <a:pPr>
+                        <a:defRPr sz="1200"/>
+                      </a:pPr>
+                      <a:r>
+                        <a:t>Интеграция оптимизатора</a:t>
+                      </a:r>
+                    </a:p>
+                  </a:txBody>
+                  <a:tcPr/>
+                </a:tc>
+                <a:tc>
+                  <a:txBody>
+                    <a:bodyPr/>
+                    <a:lstStyle/>
+                    <a:p>
+                      <a:pPr>
+                        <a:defRPr sz="1200"/>
+                      </a:pPr>
+                      <a:r>
+                        <a:t>Авто-планирование</a:t>
+                      </a:r>
+                    </a:p>
+                  </a:txBody>
+                  <a:tcPr/>
+                </a:tc>
+              </a:tr>
+              <a:tr h="76200">
+                <a:tc>
+                  <a:txBody>
+                    <a:bodyPr/>
+                    <a:lstStyle/>
+                    <a:p>
+                      <a:pPr>
+                        <a:defRPr sz="1200"/>
+                      </a:pPr>
+                      <a:r>
+                        <a:t>4. Пилот</a:t>
+                      </a:r>
+                    </a:p>
+                  </a:txBody>
+                  <a:tcPr/>
+                </a:tc>
+                <a:tc>
+                  <a:txBody>
+                    <a:bodyPr/>
+                    <a:lstStyle/>
+                    <a:p>
+                      <a:pPr>
+                        <a:defRPr sz="1200"/>
+                      </a:pPr>
+                      <a:r>
+                        <a:t>Работа на реальных данных</a:t>
+                      </a:r>
+                    </a:p>
+                  </a:txBody>
+                  <a:tcPr/>
+                </a:tc>
+                <a:tc>
+                  <a:txBody>
+                    <a:bodyPr/>
+                    <a:lstStyle/>
+                    <a:p>
+                      <a:pPr>
+                        <a:defRPr sz="1200"/>
+                      </a:pPr>
+                      <a:r>
+                        <a:t>Валидация</a:t>
+                      </a:r>
+                    </a:p>
+                  </a:txBody>
+                  <a:tcPr/>
+                </a:tc>
+              </a:tr>
+              <a:tr h="76200">
+                <a:tc>
+                  <a:txBody>
+                    <a:bodyPr/>
+                    <a:lstStyle/>
+                    <a:p>
+                      <a:pPr>
+                        <a:defRPr sz="1200"/>
+                      </a:pPr>
+                      <a:r>
+                        <a:t>5. Продакшн</a:t>
+                      </a:r>
+                    </a:p>
+                  </a:txBody>
+                  <a:tcPr/>
+                </a:tc>
+                <a:tc>
+                  <a:txBody>
+                    <a:bodyPr/>
+                    <a:lstStyle/>
+                    <a:p>
+                      <a:pPr>
+                        <a:defRPr sz="1200"/>
+                      </a:pPr>
+                      <a:r>
+                        <a:t>Полная интеграция с WMS</a:t>
+                      </a:r>
+                    </a:p>
+                  </a:txBody>
+                  <a:tcPr/>
+                </a:tc>
+                <a:tc>
+                  <a:txBody>
+                    <a:bodyPr/>
+                    <a:lstStyle/>
+                    <a:p>
+                      <a:pPr>
+                        <a:defRPr sz="1200"/>
+                      </a:pPr>
+                      <a:r>
+                        <a:t>Автономная работа</a:t>
+                      </a:r>
+                    </a:p>
+                  </a:txBody>
+                  <a:tcPr/>
+                </a:tc>
+              </a:tr>
+            </a:tbl>
+          </a:graphicData>
+        </a:graphic>
+      </p:graphicFrame>
+    </p:spTree>
+  </p:cSld>
+  <p:clrMapOvr>
+    <a:masterClrMapping/>
+  </p:clrMapOvr>
+</p:sld>
+</file>
+
+<file path=ppt/slides/slide12.xml><?xml version="1.0" encoding="utf-8"?>
+<p:sld xmlns:a="http://schemas.openxmlformats.org/drawingml/2006/main" xmlns:p="http://schemas.openxmlformats.org/presentationml/2006/main" xmlns:r="http://schemas.openxmlformats.org/officeDocument/2006/relationships">
+  <p:cSld>
+    <p:spTree>
+      <p:nvGrpSpPr>
+        <p:cNvPr id="1" name=""/>
+        <p:cNvGrpSpPr/>
+        <p:nvPr/>
+      </p:nvGrpSpPr>
+      <p:grpSpPr/>
+      <p:sp>
+        <p:nvSpPr>
+          <p:cNvPr id="2" name="Rectangle 1"/>
+          <p:cNvSpPr/>
+          <p:nvPr/>
+        </p:nvSpPr>
+        <p:spPr>
+          <a:xfrm>
+            <a:off x="0" y="0"/>
+            <a:ext cx="9144000" cy="1097280"/>
+          </a:xfrm>
+          <a:prstGeom prst="rect">
+            <a:avLst/>
+          </a:prstGeom>
+          <a:solidFill>
+            <a:srgbClr val="0070C0"/>
+          </a:solidFill>
+          <a:ln>
+            <a:noFill/>
+          </a:ln>
+        </p:spPr>
+        <p:style>
+          <a:lnRef idx="1">
+            <a:schemeClr val="accent1"/>
+          </a:lnRef>
+          <a:fillRef idx="3">
+            <a:schemeClr val="accent1"/>
+          </a:fillRef>
+          <a:effectRef idx="2">
+            <a:schemeClr val="accent1"/>
+          </a:effectRef>
+          <a:fontRef idx="minor">
+            <a:schemeClr val="lt1"/>
+          </a:fontRef>
+        </p:style>
+        <p:txBody>
+          <a:bodyPr rtlCol="0" anchor="ctr" wrap="square" lIns="457200" tIns="274320"/>
+          <a:lstStyle/>
+          <a:p>
+            <a:pPr algn="l">
+              <a:defRPr sz="3200" b="1">
+                <a:solidFill>
+                  <a:srgbClr val="FFFFFF"/>
+                </a:solidFill>
+              </a:defRPr>
+            </a:pPr>
+            <a:r>
+              <a:t>11. Резюме</a:t>
+            </a:r>
+          </a:p>
+        </p:txBody>
+      </p:sp>
+      <p:sp>
+        <p:nvSpPr>
+          <p:cNvPr id="3" name="TextBox 2"/>
+          <p:cNvSpPr txBox="1"/>
+          <p:nvPr/>
+        </p:nvSpPr>
+        <p:spPr>
+          <a:xfrm>
+            <a:off x="457200" y="1371600"/>
+            <a:ext cx="8229600" cy="4572000"/>
+          </a:xfrm>
+          <a:prstGeom prst="rect">
+            <a:avLst/>
+          </a:prstGeom>
+          <a:noFill/>
+        </p:spPr>
+        <p:txBody>
+          <a:bodyPr wrap="square">
+            <a:spAutoFit/>
+          </a:bodyPr>
+          <a:lstStyle/>
+          <a:p>
+            <a:pPr>
+              <a:spcBef>
+                <a:spcPts val="1200"/>
+              </a:spcBef>
+              <a:defRPr sz="2000"/>
+            </a:pPr>
+            <a:r>
+              <a:t>Система WMS Buffer Management позволит:</a:t>
+            </a:r>
+          </a:p>
+          <a:p>
+            <a:pPr>
+              <a:spcBef>
+                <a:spcPts val="1200"/>
+              </a:spcBef>
+              <a:defRPr sz="2000"/>
+            </a:pPr>
+          </a:p>
+          <a:p>
+            <a:pPr>
+              <a:spcBef>
+                <a:spcPts val="1200"/>
+              </a:spcBef>
+              <a:defRPr sz="2000"/>
+            </a:pPr>
+            <a:r>
+              <a:t>• Назначать задачи лучшим исполнителям (пикер↔товар)</a:t>
+            </a:r>
+          </a:p>
+          <a:p>
+            <a:pPr>
+              <a:spcBef>
+                <a:spcPts val="1200"/>
+              </a:spcBef>
+              <a:defRPr sz="2000"/>
+            </a:pPr>
+            <a:r>
+              <a:t>• Учитывать занятость и время освобождения</a:t>
+            </a:r>
+          </a:p>
+          <a:p>
+            <a:pPr>
+              <a:spcBef>
+                <a:spcPts val="1200"/>
+              </a:spcBef>
+              <a:defRPr sz="2000"/>
+            </a:pPr>
+            <a:r>
+              <a:t>• Оптимизировать маршруты карщиков</a:t>
+            </a:r>
+          </a:p>
+          <a:p>
+            <a:pPr>
+              <a:spcBef>
+                <a:spcPts val="1200"/>
+              </a:spcBef>
+              <a:defRPr sz="2000"/>
+            </a:pPr>
+            <a:r>
+              <a:t>• Сократить время волны на ~30%</a:t>
+            </a:r>
+          </a:p>
+          <a:p>
+            <a:pPr>
+              <a:spcBef>
+                <a:spcPts val="1200"/>
+              </a:spcBef>
+              <a:defRPr sz="2000"/>
+            </a:pPr>
+            <a:r>
+              <a:t>• Минимизировать простои персонала</a:t>
+            </a:r>
+          </a:p>
+          <a:p>
+            <a:pPr>
+              <a:spcBef>
+                <a:spcPts val="1200"/>
+              </a:spcBef>
+              <a:defRPr sz="2000"/>
+            </a:pPr>
+          </a:p>
+          <a:p>
+            <a:pPr>
+              <a:spcBef>
+                <a:spcPts val="1200"/>
+              </a:spcBef>
+              <a:defRPr sz="2000"/>
+            </a:pPr>
+            <a:r>
+              <a:t>Основа: 1.5 млн записей + ML.NET + OR-Tools</a:t>
+            </a:r>
+          </a:p>
+        </p:txBody>
+      </p:sp>
+    </p:spTree>
+  </p:cSld>
+  <p:clrMapOvr>
+    <a:masterClrMapping/>
+  </p:clrMapOvr>
+</p:sld>
+</file>
+
+<file path=ppt/slides/slide2.xml><?xml version="1.0" encoding="utf-8"?>
+<p:sld xmlns:a="http://schemas.openxmlformats.org/drawingml/2006/main" xmlns:p="http://schemas.openxmlformats.org/presentationml/2006/main" xmlns:r="http://schemas.openxmlformats.org/officeDocument/2006/relationships">
+  <p:cSld>
+    <p:spTree>
+      <p:nvGrpSpPr>
+        <p:cNvPr id="1" name=""/>
+        <p:cNvGrpSpPr/>
+        <p:nvPr/>
+      </p:nvGrpSpPr>
+      <p:grpSpPr/>
+      <p:sp>
+        <p:nvSpPr>
+          <p:cNvPr id="2" name="Rectangle 1"/>
+          <p:cNvSpPr/>
+          <p:nvPr/>
+        </p:nvSpPr>
+        <p:spPr>
+          <a:xfrm>
+            <a:off x="0" y="0"/>
+            <a:ext cx="9144000" cy="1097280"/>
+          </a:xfrm>
+          <a:prstGeom prst="rect">
+            <a:avLst/>
+          </a:prstGeom>
+          <a:solidFill>
+            <a:srgbClr val="0070C0"/>
+          </a:solidFill>
+          <a:ln>
+            <a:noFill/>
+          </a:ln>
+        </p:spPr>
+        <p:style>
+          <a:lnRef idx="1">
+            <a:schemeClr val="accent1"/>
+          </a:lnRef>
+          <a:fillRef idx="3">
+            <a:schemeClr val="accent1"/>
+          </a:fillRef>
+          <a:effectRef idx="2">
+            <a:schemeClr val="accent1"/>
+          </a:effectRef>
+          <a:fontRef idx="minor">
+            <a:schemeClr val="lt1"/>
+          </a:fontRef>
+        </p:style>
+        <p:txBody>
+          <a:bodyPr rtlCol="0" anchor="ctr" lIns="457200" tIns="274320"/>
+          <a:lstStyle/>
+          <a:p>
+            <a:pPr algn="ctr">
+              <a:defRPr sz="3200" b="1">
+                <a:solidFill>
+                  <a:srgbClr val="FFFFFF"/>
+                </a:solidFill>
+              </a:defRPr>
+            </a:pPr>
+            <a:r>
+              <a:t>1. Текущая ситуация</a:t>
+            </a:r>
+          </a:p>
+        </p:txBody>
+      </p:sp>
+      <p:sp>
+        <p:nvSpPr>
+          <p:cNvPr id="3" name="Rectangle 2"/>
+          <p:cNvSpPr/>
+          <p:nvPr/>
+        </p:nvSpPr>
+        <p:spPr>
+          <a:xfrm>
+            <a:off x="457200" y="1371600"/>
+            <a:ext cx="8229600" cy="2286000"/>
+          </a:xfrm>
+          <a:prstGeom prst="rect">
+            <a:avLst/>
+          </a:prstGeom>
+          <a:solidFill>
+            <a:srgbClr val="F0F0F0"/>
+          </a:solidFill>
+          <a:ln>
+            <a:solidFill>
+              <a:srgbClr val="C8C8C8"/>
+            </a:solidFill>
+          </a:ln>
+        </p:spPr>
+        <p:style>
+          <a:lnRef idx="1">
+            <a:schemeClr val="accent1"/>
+          </a:lnRef>
+          <a:fillRef idx="3">
+            <a:schemeClr val="accent1"/>
+          </a:fillRef>
+          <a:effectRef idx="2">
+            <a:schemeClr val="accent1"/>
+          </a:effectRef>
+          <a:fontRef idx="minor">
+            <a:schemeClr val="lt1"/>
+          </a:fontRef>
+        </p:style>
+        <p:txBody>
+          <a:bodyPr rtlCol="0" anchor="ctr" wrap="square" lIns="182880" tIns="182880"/>
+          <a:lstStyle/>
+          <a:p>
+            <a:pPr algn="ctr">
+              <a:defRPr sz="1400">
+                <a:latin typeface="Courier New"/>
+              </a:defRPr>
+            </a:pPr>
+            <a:r>
+              <a:t>ХРАНЕНИЕ  ──[3 карщика]──►  БУФЕР (64 ячейки)  ──[20 сборщиков]──►  СБОРКА</a:t>
+            </a:r>
+          </a:p>
+        </p:txBody>
+      </p:sp>
+      <p:sp>
+        <p:nvSpPr>
+          <p:cNvPr id="4" name="TextBox 3"/>
+          <p:cNvSpPr txBox="1"/>
+          <p:nvPr/>
+        </p:nvSpPr>
+        <p:spPr>
+          <a:xfrm>
+            <a:off x="457200" y="3840480"/>
+            <a:ext cx="8229600" cy="2286000"/>
+          </a:xfrm>
+          <a:prstGeom prst="rect">
+            <a:avLst/>
+          </a:prstGeom>
+          <a:noFill/>
+        </p:spPr>
+        <p:txBody>
+          <a:bodyPr wrap="square">
+            <a:spAutoFit/>
+          </a:bodyPr>
+          <a:lstStyle/>
+          <a:p>
+            <a:pPr>
+              <a:spcBef>
+                <a:spcPts val="800"/>
+              </a:spcBef>
+              <a:defRPr sz="1800"/>
+            </a:pPr>
+            <a:r>
+              <a:t>• 3 карщика доставляют моно-палеты из хранения в буфер</a:t>
+            </a:r>
+          </a:p>
+          <a:p>
+            <a:pPr>
+              <a:spcBef>
+                <a:spcPts val="800"/>
+              </a:spcBef>
+              <a:defRPr sz="1800"/>
+            </a:pPr>
+            <a:r>
+              <a:t>• 64 ячейки буфера — временное хранение для сборки</a:t>
+            </a:r>
+          </a:p>
+          <a:p>
+            <a:pPr>
+              <a:spcBef>
+                <a:spcPts val="800"/>
+              </a:spcBef>
+              <a:defRPr sz="1800"/>
+            </a:pPr>
+            <a:r>
+              <a:t>• 20 сборщиков забирают товары и распределяют по заказам</a:t>
+            </a:r>
+          </a:p>
+          <a:p>
+            <a:pPr>
+              <a:spcBef>
+                <a:spcPts val="800"/>
+              </a:spcBef>
+              <a:defRPr sz="1800"/>
+            </a:pPr>
+            <a:r>
+              <a:t>• Проблема: синхронизация подачи палет со скоростью сборки</a:t>
+            </a:r>
+          </a:p>
+        </p:txBody>
+      </p:sp>
+    </p:spTree>
+  </p:cSld>
+  <p:clrMapOvr>
+    <a:masterClrMapping/>
+  </p:clrMapOvr>
+</p:sld>
+</file>
+
+<file path=ppt/slides/slide3.xml><?xml version="1.0" encoding="utf-8"?>
+<p:sld xmlns:a="http://schemas.openxmlformats.org/drawingml/2006/main" xmlns:p="http://schemas.openxmlformats.org/presentationml/2006/main" xmlns:r="http://schemas.openxmlformats.org/officeDocument/2006/relationships">
+  <p:cSld>
+    <p:spTree>
+      <p:nvGrpSpPr>
+        <p:cNvPr id="1" name=""/>
+        <p:cNvGrpSpPr/>
+        <p:nvPr/>
+      </p:nvGrpSpPr>
+      <p:grpSpPr/>
+      <p:sp>
+        <p:nvSpPr>
+          <p:cNvPr id="2" name="Rectangle 1"/>
+          <p:cNvSpPr/>
+          <p:nvPr/>
+        </p:nvSpPr>
+        <p:spPr>
+          <a:xfrm>
+            <a:off x="0" y="0"/>
+            <a:ext cx="9144000" cy="1097280"/>
+          </a:xfrm>
+          <a:prstGeom prst="rect">
+            <a:avLst/>
+          </a:prstGeom>
+          <a:solidFill>
+            <a:srgbClr val="0070C0"/>
+          </a:solidFill>
+          <a:ln>
+            <a:noFill/>
+          </a:ln>
+        </p:spPr>
+        <p:style>
+          <a:lnRef idx="1">
+            <a:schemeClr val="accent1"/>
+          </a:lnRef>
+          <a:fillRef idx="3">
+            <a:schemeClr val="accent1"/>
+          </a:fillRef>
+          <a:effectRef idx="2">
+            <a:schemeClr val="accent1"/>
+          </a:effectRef>
+          <a:fontRef idx="minor">
+            <a:schemeClr val="lt1"/>
+          </a:fontRef>
+        </p:style>
+        <p:txBody>
+          <a:bodyPr rtlCol="0" anchor="ctr" lIns="457200" tIns="274320"/>
+          <a:lstStyle/>
+          <a:p>
+            <a:pPr algn="ctr">
+              <a:defRPr sz="3200" b="1">
+                <a:solidFill>
+                  <a:srgbClr val="FFFFFF"/>
+                </a:solidFill>
+              </a:defRPr>
+            </a:pPr>
+            <a:r>
+              <a:t>2. Почему это важно — потери</a:t>
+            </a:r>
+          </a:p>
+        </p:txBody>
+      </p:sp>
+      <p:graphicFrame>
+        <p:nvGraphicFramePr>
+          <p:cNvPr id="3" name="Table 2"/>
+          <p:cNvGraphicFramePr>
+            <a:graphicFrameLocks noGrp="1"/>
+          </p:cNvGraphicFramePr>
+          <p:nvPr/>
+        </p:nvGraphicFramePr>
+        <p:xfrm>
+          <a:off x="457200" y="1371600"/>
+          <a:ext cx="8229600" cy="457200"/>
+        </p:xfrm>
+        <a:graphic>
+          <a:graphicData uri="http://schemas.openxmlformats.org/drawingml/2006/table">
+            <a:tbl>
+              <a:tblPr firstRow="1" bandRow="1">
+                <a:tableStyleId>{5C22544A-7EE6-4342-B048-85BDC9FD1C3A}</a:tableStyleId>
+              </a:tblPr>
+              <a:tblGrid>
+                <a:gridCol w="4114800"/>
+                <a:gridCol w="4114800"/>
+              </a:tblGrid>
+              <a:tr h="91440">
+                <a:tc>
+                  <a:txBody>
+                    <a:bodyPr/>
+                    <a:lstStyle/>
+                    <a:p>
+                      <a:pPr>
+                        <a:defRPr b="1" sz="1400">
+                          <a:solidFill>
+                            <a:srgbClr val="FFFFFF"/>
+                          </a:solidFill>
+                        </a:defRPr>
+                      </a:pPr>
+                      <a:r>
+                        <a:t>Ситуация</a:t>
+                      </a:r>
+                    </a:p>
+                  </a:txBody>
+                  <a:tcPr>
+                    <a:solidFill>
+                      <a:srgbClr val="0070C0"/>
+                    </a:solidFill>
+                  </a:tcPr>
+                </a:tc>
+                <a:tc>
+                  <a:txBody>
+                    <a:bodyPr/>
+                    <a:lstStyle/>
+                    <a:p>
+                      <a:pPr>
+                        <a:defRPr b="1" sz="1400">
+                          <a:solidFill>
+                            <a:srgbClr val="FFFFFF"/>
+                          </a:solidFill>
+                        </a:defRPr>
+                      </a:pPr>
+                      <a:r>
+                        <a:t>Последствия</a:t>
+                      </a:r>
+                    </a:p>
+                  </a:txBody>
+                  <a:tcPr>
+                    <a:solidFill>
+                      <a:srgbClr val="0070C0"/>
+                    </a:solidFill>
+                  </a:tcPr>
+                </a:tc>
+              </a:tr>
+              <a:tr h="91440">
+                <a:tc>
+                  <a:txBody>
+                    <a:bodyPr/>
+                    <a:lstStyle/>
+                    <a:p>
+                      <a:pPr>
+                        <a:defRPr sz="1200"/>
+                      </a:pPr>
+                      <a:r>
+                        <a:t>Буфер пустой (&lt;15%)</a:t>
+                      </a:r>
+                    </a:p>
+                  </a:txBody>
+                  <a:tcPr/>
+                </a:tc>
+                <a:tc>
+                  <a:txBody>
+                    <a:bodyPr/>
+                    <a:lstStyle/>
+                    <a:p>
+                      <a:pPr>
+                        <a:defRPr sz="1200"/>
+                      </a:pPr>
+                      <a:r>
+                        <a:t>Сборщики простаивают, заказы задерживаются</a:t>
+                      </a:r>
+                    </a:p>
+                  </a:txBody>
+                  <a:tcPr/>
+                </a:tc>
+              </a:tr>
+              <a:tr h="91440">
+                <a:tc>
+                  <a:txBody>
+                    <a:bodyPr/>
+                    <a:lstStyle/>
+                    <a:p>
+                      <a:pPr>
+                        <a:defRPr sz="1200"/>
+                      </a:pPr>
+                      <a:r>
+                        <a:t>Буфер переполнен (&gt;70%)</a:t>
+                      </a:r>
+                    </a:p>
+                  </a:txBody>
+                  <a:tcPr/>
+                </a:tc>
+                <a:tc>
+                  <a:txBody>
+                    <a:bodyPr/>
+                    <a:lstStyle/>
+                    <a:p>
+                      <a:pPr>
+                        <a:defRPr sz="1200"/>
+                      </a:pPr>
+                      <a:r>
+                        <a:t>Карщики ждут освобождения ячеек</a:t>
+                      </a:r>
+                    </a:p>
+                  </a:txBody>
+                  <a:tcPr/>
+                </a:tc>
+              </a:tr>
+              <a:tr h="91440">
+                <a:tc>
+                  <a:txBody>
+                    <a:bodyPr/>
+                    <a:lstStyle/>
+                    <a:p>
+                      <a:pPr>
+                        <a:defRPr sz="1200"/>
+                      </a:pPr>
+                      <a:r>
+                        <a:t>Неравномерная нагрузка</a:t>
+                      </a:r>
+                    </a:p>
+                  </a:txBody>
+                  <a:tcPr/>
+                </a:tc>
+                <a:tc>
+                  <a:txBody>
+                    <a:bodyPr/>
+                    <a:lstStyle/>
+                    <a:p>
+                      <a:pPr>
+                        <a:defRPr sz="1200"/>
+                      </a:pPr>
+                      <a:r>
+                        <a:t>Одни перегружены, другие простаивают</a:t>
+                      </a:r>
+                    </a:p>
+                  </a:txBody>
+                  <a:tcPr/>
+                </a:tc>
+              </a:tr>
+              <a:tr h="91440">
+                <a:tc>
+                  <a:txBody>
+                    <a:bodyPr/>
+                    <a:lstStyle/>
+                    <a:p>
+                      <a:pPr>
+                        <a:defRPr sz="1200"/>
+                      </a:pPr>
+                      <a:r>
+                        <a:t>Каждый сбой потока</a:t>
+                      </a:r>
+                    </a:p>
+                  </a:txBody>
+                  <a:tcPr/>
+                </a:tc>
+                <a:tc>
+                  <a:txBody>
+                    <a:bodyPr/>
+                    <a:lstStyle/>
+                    <a:p>
+                      <a:pPr>
+                        <a:defRPr sz="1200"/>
+                      </a:pPr>
+                      <a:r>
+                        <a:t>Задержка целой волны заказов</a:t>
+                      </a:r>
+                    </a:p>
+                  </a:txBody>
+                  <a:tcPr/>
+                </a:tc>
+              </a:tr>
+            </a:tbl>
+          </a:graphicData>
+        </a:graphic>
+      </p:graphicFrame>
+    </p:spTree>
+  </p:cSld>
+  <p:clrMapOvr>
+    <a:masterClrMapping/>
+  </p:clrMapOvr>
+</p:sld>
+</file>
+
+<file path=ppt/slides/slide4.xml><?xml version="1.0" encoding="utf-8"?>
+<p:sld xmlns:a="http://schemas.openxmlformats.org/drawingml/2006/main" xmlns:p="http://schemas.openxmlformats.org/presentationml/2006/main" xmlns:r="http://schemas.openxmlformats.org/officeDocument/2006/relationships">
+  <p:cSld>
+    <p:spTree>
+      <p:nvGrpSpPr>
+        <p:cNvPr id="1" name=""/>
+        <p:cNvGrpSpPr/>
+        <p:nvPr/>
+      </p:nvGrpSpPr>
+      <p:grpSpPr/>
+      <p:sp>
+        <p:nvSpPr>
+          <p:cNvPr id="2" name="Rectangle 1"/>
+          <p:cNvSpPr/>
+          <p:nvPr/>
+        </p:nvSpPr>
+        <p:spPr>
+          <a:xfrm>
+            <a:off x="0" y="0"/>
+            <a:ext cx="9144000" cy="1097280"/>
+          </a:xfrm>
+          <a:prstGeom prst="rect">
+            <a:avLst/>
+          </a:prstGeom>
+          <a:solidFill>
+            <a:srgbClr val="0070C0"/>
+          </a:solidFill>
+          <a:ln>
+            <a:noFill/>
+          </a:ln>
+        </p:spPr>
+        <p:style>
+          <a:lnRef idx="1">
+            <a:schemeClr val="accent1"/>
+          </a:lnRef>
+          <a:fillRef idx="3">
+            <a:schemeClr val="accent1"/>
+          </a:fillRef>
+          <a:effectRef idx="2">
+            <a:schemeClr val="accent1"/>
+          </a:effectRef>
+          <a:fontRef idx="minor">
+            <a:schemeClr val="lt1"/>
+          </a:fontRef>
+        </p:style>
+        <p:txBody>
+          <a:bodyPr rtlCol="0" anchor="ctr" wrap="square" lIns="457200" tIns="274320"/>
+          <a:lstStyle/>
+          <a:p>
+            <a:pPr algn="l">
+              <a:defRPr sz="3200" b="1">
+                <a:solidFill>
+                  <a:srgbClr val="FFFFFF"/>
+                </a:solidFill>
+              </a:defRPr>
+            </a:pPr>
+            <a:r>
+              <a:t>3. Решение — 3 уровня оптимизации</a:t>
+            </a:r>
+          </a:p>
+        </p:txBody>
+      </p:sp>
+      <p:sp>
+        <p:nvSpPr>
+          <p:cNvPr id="3" name="TextBox 2"/>
+          <p:cNvSpPr txBox="1"/>
+          <p:nvPr/>
+        </p:nvSpPr>
+        <p:spPr>
+          <a:xfrm>
+            <a:off x="457200" y="1371600"/>
+            <a:ext cx="8229600" cy="4572000"/>
+          </a:xfrm>
+          <a:prstGeom prst="rect">
+            <a:avLst/>
+          </a:prstGeom>
+          <a:noFill/>
+        </p:spPr>
+        <p:txBody>
+          <a:bodyPr wrap="square">
+            <a:spAutoFit/>
+          </a:bodyPr>
+          <a:lstStyle/>
+          <a:p>
+            <a:pPr>
+              <a:spcBef>
+                <a:spcPts val="1200"/>
+              </a:spcBef>
+              <a:defRPr sz="2000"/>
+            </a:pPr>
+            <a:r>
+              <a:t>УРОВЕНЬ 3: ПРОГНОЗИРОВАНИЕ (Historical Layer)</a:t>
+            </a:r>
+          </a:p>
+          <a:p>
+            <a:pPr>
+              <a:spcBef>
+                <a:spcPts val="1200"/>
+              </a:spcBef>
+              <a:defRPr sz="2000"/>
+            </a:pPr>
+            <a:r>
+              <a:t>   → ML-модели предсказывают время выполнения задач</a:t>
+            </a:r>
+          </a:p>
+          <a:p>
+            <a:pPr>
+              <a:spcBef>
+                <a:spcPts val="1200"/>
+              </a:spcBef>
+              <a:defRPr sz="2000"/>
+            </a:pPr>
+          </a:p>
+          <a:p>
+            <a:pPr>
+              <a:spcBef>
+                <a:spcPts val="1200"/>
+              </a:spcBef>
+              <a:defRPr sz="2000"/>
+            </a:pPr>
+            <a:r>
+              <a:t>УРОВЕНЬ 2: ПЛАНИРОВАНИЕ (Tactical Layer)</a:t>
+            </a:r>
+          </a:p>
+          <a:p>
+            <a:pPr>
+              <a:spcBef>
+                <a:spcPts val="1200"/>
+              </a:spcBef>
+              <a:defRPr sz="2000"/>
+            </a:pPr>
+            <a:r>
+              <a:t>   → OR-Tools оптимизирует назначения и расписание</a:t>
+            </a:r>
+          </a:p>
+          <a:p>
+            <a:pPr>
+              <a:spcBef>
+                <a:spcPts val="1200"/>
+              </a:spcBef>
+              <a:defRPr sz="2000"/>
+            </a:pPr>
+          </a:p>
+          <a:p>
+            <a:pPr>
+              <a:spcBef>
+                <a:spcPts val="1200"/>
+              </a:spcBef>
+              <a:defRPr sz="2000"/>
+            </a:pPr>
+            <a:r>
+              <a:t>УРОВЕНЬ 1: РЕАГИРОВАНИЕ (Realtime Layer)</a:t>
+            </a:r>
+          </a:p>
+          <a:p>
+            <a:pPr>
+              <a:spcBef>
+                <a:spcPts val="1200"/>
+              </a:spcBef>
+              <a:defRPr sz="2000"/>
+            </a:pPr>
+            <a:r>
+              <a:t>   → Гистерезис-контроллер управляет уровнем буфера</a:t>
+            </a:r>
+          </a:p>
+          <a:p>
+            <a:pPr>
+              <a:spcBef>
+                <a:spcPts val="1200"/>
+              </a:spcBef>
+              <a:defRPr sz="2000"/>
+            </a:pPr>
+          </a:p>
+          <a:p>
+            <a:pPr>
+              <a:spcBef>
+                <a:spcPts val="1200"/>
+              </a:spcBef>
+              <a:defRPr sz="2000"/>
+            </a:pPr>
+            <a:r>
+              <a:t>Принцип: Прогноз → План → Исполнение → Корректировка</a:t>
+            </a:r>
+          </a:p>
+        </p:txBody>
+      </p:sp>
+    </p:spTree>
+  </p:cSld>
+  <p:clrMapOvr>
+    <a:masterClrMapping/>
+  </p:clrMapOvr>
+</p:sld>
+</file>
+
+<file path=ppt/slides/slide5.xml><?xml version="1.0" encoding="utf-8"?>
+<p:sld xmlns:a="http://schemas.openxmlformats.org/drawingml/2006/main" xmlns:p="http://schemas.openxmlformats.org/presentationml/2006/main" xmlns:r="http://schemas.openxmlformats.org/officeDocument/2006/relationships">
+  <p:cSld>
+    <p:spTree>
+      <p:nvGrpSpPr>
+        <p:cNvPr id="1" name=""/>
+        <p:cNvGrpSpPr/>
+        <p:nvPr/>
+      </p:nvGrpSpPr>
+      <p:grpSpPr/>
+      <p:sp>
+        <p:nvSpPr>
+          <p:cNvPr id="2" name="Rectangle 1"/>
+          <p:cNvSpPr/>
+          <p:nvPr/>
+        </p:nvSpPr>
+        <p:spPr>
+          <a:xfrm>
+            <a:off x="0" y="0"/>
+            <a:ext cx="9144000" cy="1097280"/>
+          </a:xfrm>
+          <a:prstGeom prst="rect">
+            <a:avLst/>
+          </a:prstGeom>
+          <a:solidFill>
+            <a:srgbClr val="0070C0"/>
+          </a:solidFill>
+          <a:ln>
+            <a:noFill/>
+          </a:ln>
+        </p:spPr>
+        <p:style>
+          <a:lnRef idx="1">
+            <a:schemeClr val="accent1"/>
+          </a:lnRef>
+          <a:fillRef idx="3">
+            <a:schemeClr val="accent1"/>
+          </a:fillRef>
+          <a:effectRef idx="2">
+            <a:schemeClr val="accent1"/>
+          </a:effectRef>
+          <a:fontRef idx="minor">
+            <a:schemeClr val="lt1"/>
+          </a:fontRef>
+        </p:style>
+        <p:txBody>
+          <a:bodyPr rtlCol="0" anchor="ctr" wrap="square" lIns="457200" tIns="274320"/>
+          <a:lstStyle/>
+          <a:p>
+            <a:pPr algn="l">
+              <a:defRPr sz="3200" b="1">
+                <a:solidFill>
+                  <a:srgbClr val="FFFFFF"/>
+                </a:solidFill>
+              </a:defRPr>
+            </a:pPr>
+            <a:r>
+              <a:t>4. ML-модели для прогнозирования</a:t>
+            </a:r>
+          </a:p>
+        </p:txBody>
+      </p:sp>
+      <p:sp>
+        <p:nvSpPr>
+          <p:cNvPr id="3" name="TextBox 2"/>
+          <p:cNvSpPr txBox="1"/>
+          <p:nvPr/>
+        </p:nvSpPr>
+        <p:spPr>
+          <a:xfrm>
+            <a:off x="457200" y="1371600"/>
+            <a:ext cx="8229600" cy="4572000"/>
+          </a:xfrm>
+          <a:prstGeom prst="rect">
+            <a:avLst/>
+          </a:prstGeom>
+          <a:noFill/>
+        </p:spPr>
+        <p:txBody>
+          <a:bodyPr wrap="square">
+            <a:spAutoFit/>
+          </a:bodyPr>
+          <a:lstStyle/>
+          <a:p>
+            <a:pPr>
+              <a:spcBef>
+                <a:spcPts val="1200"/>
+              </a:spcBef>
+              <a:defRPr sz="2000"/>
+            </a:pPr>
+            <a:r>
+              <a:t>Модель 1: Время сборки (Picker Duration)</a:t>
+            </a:r>
+          </a:p>
+          <a:p>
+            <a:pPr>
+              <a:spcBef>
+                <a:spcPts val="1200"/>
+              </a:spcBef>
+              <a:defRPr sz="2000"/>
+            </a:pPr>
+            <a:r>
+              <a:t>   Входы: ID сборщика, кол-во строк, кол-во товаров, час, день недели</a:t>
+            </a:r>
+          </a:p>
+          <a:p>
+            <a:pPr>
+              <a:spcBef>
+                <a:spcPts val="1200"/>
+              </a:spcBef>
+              <a:defRPr sz="2000"/>
+            </a:pPr>
+            <a:r>
+              <a:t>   Выход: прогноз времени выполнения задания (секунды)</a:t>
+            </a:r>
+          </a:p>
+          <a:p>
+            <a:pPr>
+              <a:spcBef>
+                <a:spcPts val="1200"/>
+              </a:spcBef>
+              <a:defRPr sz="2000"/>
+            </a:pPr>
+          </a:p>
+          <a:p>
+            <a:pPr>
+              <a:spcBef>
+                <a:spcPts val="1200"/>
+              </a:spcBef>
+              <a:defRPr sz="2000"/>
+            </a:pPr>
+            <a:r>
+              <a:t>Модель 2: Время маршрута карщика (Forklift Duration)</a:t>
+            </a:r>
+          </a:p>
+          <a:p>
+            <a:pPr>
+              <a:spcBef>
+                <a:spcPts val="1200"/>
+              </a:spcBef>
+              <a:defRPr sz="2000"/>
+            </a:pPr>
+            <a:r>
+              <a:t>   Входы: ID карщика, зона источника → зона назначения, вес палеты</a:t>
+            </a:r>
+          </a:p>
+          <a:p>
+            <a:pPr>
+              <a:spcBef>
+                <a:spcPts val="1200"/>
+              </a:spcBef>
+              <a:defRPr sz="2000"/>
+            </a:pPr>
+            <a:r>
+              <a:t>   Выход: прогноз времени доставки (секунды)</a:t>
+            </a:r>
+          </a:p>
+          <a:p>
+            <a:pPr>
+              <a:spcBef>
+                <a:spcPts val="1200"/>
+              </a:spcBef>
+              <a:defRPr sz="2000"/>
+            </a:pPr>
+          </a:p>
+          <a:p>
+            <a:pPr>
+              <a:spcBef>
+                <a:spcPts val="1200"/>
+              </a:spcBef>
+              <a:defRPr sz="2000"/>
+            </a:pPr>
+            <a:r>
+              <a:t>База для обучения: 1.5 млн исторических записей</a:t>
+            </a:r>
+          </a:p>
+        </p:txBody>
+      </p:sp>
+    </p:spTree>
+  </p:cSld>
+  <p:clrMapOvr>
+    <a:masterClrMapping/>
+  </p:clrMapOvr>
+</p:sld>
+</file>
+
+<file path=ppt/slides/slide6.xml><?xml version="1.0" encoding="utf-8"?>
+<p:sld xmlns:a="http://schemas.openxmlformats.org/drawingml/2006/main" xmlns:p="http://schemas.openxmlformats.org/presentationml/2006/main" xmlns:r="http://schemas.openxmlformats.org/officeDocument/2006/relationships">
+  <p:cSld>
+    <p:spTree>
+      <p:nvGrpSpPr>
+        <p:cNvPr id="1" name=""/>
+        <p:cNvGrpSpPr/>
+        <p:nvPr/>
+      </p:nvGrpSpPr>
+      <p:grpSpPr/>
+      <p:sp>
+        <p:nvSpPr>
+          <p:cNvPr id="2" name="Rectangle 1"/>
+          <p:cNvSpPr/>
+          <p:nvPr/>
+        </p:nvSpPr>
+        <p:spPr>
+          <a:xfrm>
+            <a:off x="0" y="0"/>
+            <a:ext cx="9144000" cy="1097280"/>
+          </a:xfrm>
+          <a:prstGeom prst="rect">
+            <a:avLst/>
+          </a:prstGeom>
+          <a:solidFill>
+            <a:srgbClr val="0070C0"/>
+          </a:solidFill>
+          <a:ln>
+            <a:noFill/>
+          </a:ln>
+        </p:spPr>
+        <p:style>
+          <a:lnRef idx="1">
+            <a:schemeClr val="accent1"/>
+          </a:lnRef>
+          <a:fillRef idx="3">
+            <a:schemeClr val="accent1"/>
+          </a:fillRef>
+          <a:effectRef idx="2">
+            <a:schemeClr val="accent1"/>
+          </a:effectRef>
+          <a:fontRef idx="minor">
+            <a:schemeClr val="lt1"/>
+          </a:fontRef>
+        </p:style>
+        <p:txBody>
+          <a:bodyPr rtlCol="0" anchor="ctr" wrap="square" lIns="457200" tIns="274320"/>
+          <a:lstStyle/>
+          <a:p>
+            <a:pPr algn="l">
+              <a:defRPr sz="3200" b="1">
+                <a:solidFill>
+                  <a:srgbClr val="FFFFFF"/>
+                </a:solidFill>
+              </a:defRPr>
+            </a:pPr>
+            <a:r>
+              <a:t>5. Умное назначение задач пикерам</a:t>
+            </a:r>
+          </a:p>
+        </p:txBody>
+      </p:sp>
+      <p:sp>
+        <p:nvSpPr>
+          <p:cNvPr id="3" name="TextBox 2"/>
+          <p:cNvSpPr txBox="1"/>
+          <p:nvPr/>
+        </p:nvSpPr>
+        <p:spPr>
+          <a:xfrm>
+            <a:off x="457200" y="1371600"/>
+            <a:ext cx="8229600" cy="4572000"/>
+          </a:xfrm>
+          <a:prstGeom prst="rect">
+            <a:avLst/>
+          </a:prstGeom>
+          <a:noFill/>
+        </p:spPr>
+        <p:txBody>
+          <a:bodyPr wrap="square">
+            <a:spAutoFit/>
+          </a:bodyPr>
+          <a:lstStyle/>
+          <a:p>
+            <a:pPr>
+              <a:spcBef>
+                <a:spcPts val="1200"/>
+              </a:spcBef>
+              <a:defRPr sz="2000"/>
+            </a:pPr>
+            <a:r>
+              <a:t>Проблема: не все пикеры одинаково эффективны для всех товаров</a:t>
+            </a:r>
+          </a:p>
+          <a:p>
+            <a:pPr>
+              <a:spcBef>
+                <a:spcPts val="1200"/>
+              </a:spcBef>
+              <a:defRPr sz="2000"/>
+            </a:pPr>
+          </a:p>
+          <a:p>
+            <a:pPr>
+              <a:spcBef>
+                <a:spcPts val="1200"/>
+              </a:spcBef>
+              <a:defRPr sz="2000"/>
+            </a:pPr>
+            <a:r>
+              <a:t>Решение — назначаем задачу тому, кто:</a:t>
+            </a:r>
+          </a:p>
+          <a:p>
+            <a:pPr>
+              <a:spcBef>
+                <a:spcPts val="1200"/>
+              </a:spcBef>
+              <a:defRPr sz="2000"/>
+            </a:pPr>
+          </a:p>
+          <a:p>
+            <a:pPr>
+              <a:spcBef>
+                <a:spcPts val="1200"/>
+              </a:spcBef>
+              <a:defRPr sz="2000"/>
+            </a:pPr>
+            <a:r>
+              <a:t>   • Лучше справляется с данным типом товара (из истории)</a:t>
+            </a:r>
+          </a:p>
+          <a:p>
+            <a:pPr>
+              <a:spcBef>
+                <a:spcPts val="1200"/>
+              </a:spcBef>
+              <a:defRPr sz="2000"/>
+            </a:pPr>
+            <a:r>
+              <a:t>   • Сейчас свободен или скоро освободится</a:t>
+            </a:r>
+          </a:p>
+          <a:p>
+            <a:pPr>
+              <a:spcBef>
+                <a:spcPts val="1200"/>
+              </a:spcBef>
+              <a:defRPr sz="2000"/>
+            </a:pPr>
+            <a:r>
+              <a:t>   • Находится ближе к нужной зоне буфера</a:t>
+            </a:r>
+          </a:p>
+          <a:p>
+            <a:pPr>
+              <a:spcBef>
+                <a:spcPts val="1200"/>
+              </a:spcBef>
+              <a:defRPr sz="2000"/>
+            </a:pPr>
+            <a:r>
+              <a:t>   • Имеет меньшую загрузку в текущей волне</a:t>
+            </a:r>
+          </a:p>
+          <a:p>
+            <a:pPr>
+              <a:spcBef>
+                <a:spcPts val="1200"/>
+              </a:spcBef>
+              <a:defRPr sz="2000"/>
+            </a:pPr>
+          </a:p>
+          <a:p>
+            <a:pPr>
+              <a:spcBef>
+                <a:spcPts val="1200"/>
+              </a:spcBef>
+              <a:defRPr sz="2000"/>
+            </a:pPr>
+            <a:r>
+              <a:t>ML модель учитывает связку: пикер + товар + время → скорость</a:t>
+            </a:r>
+          </a:p>
+          <a:p>
+            <a:pPr>
+              <a:spcBef>
+                <a:spcPts val="1200"/>
+              </a:spcBef>
+              <a:defRPr sz="2000"/>
+            </a:pPr>
+          </a:p>
+          <a:p>
+            <a:pPr>
+              <a:spcBef>
+                <a:spcPts val="1200"/>
+              </a:spcBef>
+              <a:defRPr sz="2000"/>
+            </a:pPr>
+            <a:r>
+              <a:t>Результат: задача идёт к тому, кто выполнит её быстрее</a:t>
+            </a:r>
+          </a:p>
+        </p:txBody>
+      </p:sp>
+    </p:spTree>
+  </p:cSld>
+  <p:clrMapOvr>
+    <a:masterClrMapping/>
+  </p:clrMapOvr>
+</p:sld>
+</file>
+
+<file path=ppt/slides/slide7.xml><?xml version="1.0" encoding="utf-8"?>
+<p:sld xmlns:a="http://schemas.openxmlformats.org/drawingml/2006/main" xmlns:p="http://schemas.openxmlformats.org/presentationml/2006/main" xmlns:r="http://schemas.openxmlformats.org/officeDocument/2006/relationships">
+  <p:cSld>
+    <p:spTree>
+      <p:nvGrpSpPr>
+        <p:cNvPr id="1" name=""/>
+        <p:cNvGrpSpPr/>
+        <p:nvPr/>
+      </p:nvGrpSpPr>
+      <p:grpSpPr/>
+      <p:sp>
+        <p:nvSpPr>
+          <p:cNvPr id="2" name="Rectangle 1"/>
+          <p:cNvSpPr/>
+          <p:nvPr/>
+        </p:nvSpPr>
+        <p:spPr>
+          <a:xfrm>
+            <a:off x="0" y="0"/>
+            <a:ext cx="9144000" cy="1097280"/>
+          </a:xfrm>
+          <a:prstGeom prst="rect">
+            <a:avLst/>
+          </a:prstGeom>
+          <a:solidFill>
+            <a:srgbClr val="0070C0"/>
+          </a:solidFill>
+          <a:ln>
+            <a:noFill/>
+          </a:ln>
+        </p:spPr>
+        <p:style>
+          <a:lnRef idx="1">
+            <a:schemeClr val="accent1"/>
+          </a:lnRef>
+          <a:fillRef idx="3">
+            <a:schemeClr val="accent1"/>
+          </a:fillRef>
+          <a:effectRef idx="2">
+            <a:schemeClr val="accent1"/>
+          </a:effectRef>
+          <a:fontRef idx="minor">
+            <a:schemeClr val="lt1"/>
+          </a:fontRef>
+        </p:style>
+        <p:txBody>
+          <a:bodyPr rtlCol="0" anchor="ctr" wrap="square" lIns="457200" tIns="274320"/>
+          <a:lstStyle/>
+          <a:p>
+            <a:pPr algn="l">
+              <a:defRPr sz="3200" b="1">
+                <a:solidFill>
+                  <a:srgbClr val="FFFFFF"/>
+                </a:solidFill>
+              </a:defRPr>
+            </a:pPr>
+            <a:r>
+              <a:t>6. Оптимизация расписания (OR-Tools)</a:t>
+            </a:r>
+          </a:p>
+        </p:txBody>
+      </p:sp>
+      <p:sp>
+        <p:nvSpPr>
+          <p:cNvPr id="3" name="TextBox 2"/>
+          <p:cNvSpPr txBox="1"/>
+          <p:nvPr/>
+        </p:nvSpPr>
+        <p:spPr>
+          <a:xfrm>
+            <a:off x="457200" y="1371600"/>
+            <a:ext cx="8229600" cy="4572000"/>
+          </a:xfrm>
+          <a:prstGeom prst="rect">
+            <a:avLst/>
+          </a:prstGeom>
+          <a:noFill/>
+        </p:spPr>
+        <p:txBody>
+          <a:bodyPr wrap="square">
+            <a:spAutoFit/>
+          </a:bodyPr>
+          <a:lstStyle/>
+          <a:p>
+            <a:pPr>
+              <a:spcBef>
+                <a:spcPts val="1200"/>
+              </a:spcBef>
+              <a:defRPr sz="2000"/>
+            </a:pPr>
+            <a:r>
+              <a:t>Задача: минимизация общего времени выполнения волны</a:t>
+            </a:r>
+          </a:p>
+          <a:p>
+            <a:pPr>
+              <a:spcBef>
+                <a:spcPts val="1200"/>
+              </a:spcBef>
+              <a:defRPr sz="2000"/>
+            </a:pPr>
+          </a:p>
+          <a:p>
+            <a:pPr>
+              <a:spcBef>
+                <a:spcPts val="1200"/>
+              </a:spcBef>
+              <a:defRPr sz="2000"/>
+            </a:pPr>
+            <a:r>
+              <a:t>Оптимизируем ДВА назначения одновременно:</a:t>
+            </a:r>
+          </a:p>
+          <a:p>
+            <a:pPr>
+              <a:spcBef>
+                <a:spcPts val="1200"/>
+              </a:spcBef>
+              <a:defRPr sz="2000"/>
+            </a:pPr>
+            <a:r>
+              <a:t>   • Карщик → Палета → Ячейка буфера</a:t>
+            </a:r>
+          </a:p>
+          <a:p>
+            <a:pPr>
+              <a:spcBef>
+                <a:spcPts val="1200"/>
+              </a:spcBef>
+              <a:defRPr sz="2000"/>
+            </a:pPr>
+            <a:r>
+              <a:t>   • Пикер → Задание на сборку</a:t>
+            </a:r>
+          </a:p>
+          <a:p>
+            <a:pPr>
+              <a:spcBef>
+                <a:spcPts val="1200"/>
+              </a:spcBef>
+              <a:defRPr sz="2000"/>
+            </a:pPr>
+          </a:p>
+          <a:p>
+            <a:pPr>
+              <a:spcBef>
+                <a:spcPts val="1200"/>
+              </a:spcBef>
+              <a:defRPr sz="2000"/>
+            </a:pPr>
+            <a:r>
+              <a:t>Учитываем:</a:t>
+            </a:r>
+          </a:p>
+          <a:p>
+            <a:pPr>
+              <a:spcBef>
+                <a:spcPts val="1200"/>
+              </a:spcBef>
+              <a:defRPr sz="2000"/>
+            </a:pPr>
+            <a:r>
+              <a:t>   • Прогноз времени для каждой пары (пикер, задание)</a:t>
+            </a:r>
+          </a:p>
+          <a:p>
+            <a:pPr>
+              <a:spcBef>
+                <a:spcPts val="1200"/>
+              </a:spcBef>
+              <a:defRPr sz="2000"/>
+            </a:pPr>
+            <a:r>
+              <a:t>   • Текущую занятость и время до освобождения</a:t>
+            </a:r>
+          </a:p>
+          <a:p>
+            <a:pPr>
+              <a:spcBef>
+                <a:spcPts val="1200"/>
+              </a:spcBef>
+              <a:defRPr sz="2000"/>
+            </a:pPr>
+            <a:r>
+              <a:t>   • Балансировку нагрузки между всеми работниками</a:t>
+            </a:r>
+          </a:p>
+          <a:p>
+            <a:pPr>
+              <a:spcBef>
+                <a:spcPts val="1200"/>
+              </a:spcBef>
+              <a:defRPr sz="2000"/>
+            </a:pPr>
+          </a:p>
+          <a:p>
+            <a:pPr>
+              <a:spcBef>
+                <a:spcPts val="1200"/>
+              </a:spcBef>
+              <a:defRPr sz="2000"/>
+            </a:pPr>
+            <a:r>
+              <a:t>Ограничения: приоритеты заказов, тяжёлые палеты вниз</a:t>
+            </a:r>
+          </a:p>
+        </p:txBody>
+      </p:sp>
+    </p:spTree>
+  </p:cSld>
+  <p:clrMapOvr>
+    <a:masterClrMapping/>
+  </p:clrMapOvr>
+</p:sld>
+</file>
+
+<file path=ppt/slides/slide8.xml><?xml version="1.0" encoding="utf-8"?>
+<p:sld xmlns:a="http://schemas.openxmlformats.org/drawingml/2006/main" xmlns:p="http://schemas.openxmlformats.org/presentationml/2006/main" xmlns:r="http://schemas.openxmlformats.org/officeDocument/2006/relationships">
+  <p:cSld>
+    <p:spTree>
+      <p:nvGrpSpPr>
+        <p:cNvPr id="1" name=""/>
+        <p:cNvGrpSpPr/>
+        <p:nvPr/>
+      </p:nvGrpSpPr>
+      <p:grpSpPr/>
+      <p:sp>
+        <p:nvSpPr>
+          <p:cNvPr id="2" name="Rectangle 1"/>
+          <p:cNvSpPr/>
+          <p:nvPr/>
+        </p:nvSpPr>
+        <p:spPr>
+          <a:xfrm>
+            <a:off x="0" y="0"/>
+            <a:ext cx="9144000" cy="1097280"/>
+          </a:xfrm>
+          <a:prstGeom prst="rect">
+            <a:avLst/>
+          </a:prstGeom>
+          <a:solidFill>
+            <a:srgbClr val="0070C0"/>
+          </a:solidFill>
+          <a:ln>
+            <a:noFill/>
+          </a:ln>
+        </p:spPr>
+        <p:style>
+          <a:lnRef idx="1">
+            <a:schemeClr val="accent1"/>
+          </a:lnRef>
+          <a:fillRef idx="3">
+            <a:schemeClr val="accent1"/>
+          </a:fillRef>
+          <a:effectRef idx="2">
+            <a:schemeClr val="accent1"/>
+          </a:effectRef>
+          <a:fontRef idx="minor">
+            <a:schemeClr val="lt1"/>
+          </a:fontRef>
+        </p:style>
+        <p:txBody>
+          <a:bodyPr rtlCol="0" anchor="ctr" lIns="457200" tIns="274320"/>
+          <a:lstStyle/>
+          <a:p>
+            <a:pPr algn="ctr">
+              <a:defRPr sz="3200" b="1">
+                <a:solidFill>
+                  <a:srgbClr val="FFFFFF"/>
+                </a:solidFill>
+              </a:defRPr>
+            </a:pPr>
+            <a:r>
+              <a:t>7. Цикл оптимизации (каждые 15 минут)</a:t>
+            </a:r>
+          </a:p>
+        </p:txBody>
+      </p:sp>
+      <p:sp>
+        <p:nvSpPr>
+          <p:cNvPr id="3" name="Rectangle 2"/>
+          <p:cNvSpPr/>
+          <p:nvPr/>
+        </p:nvSpPr>
+        <p:spPr>
+          <a:xfrm>
+            <a:off x="457200" y="1371600"/>
+            <a:ext cx="8229600" cy="2286000"/>
+          </a:xfrm>
+          <a:prstGeom prst="rect">
+            <a:avLst/>
+          </a:prstGeom>
+          <a:solidFill>
+            <a:srgbClr val="F0F0F0"/>
+          </a:solidFill>
+          <a:ln>
+            <a:solidFill>
+              <a:srgbClr val="C8C8C8"/>
+            </a:solidFill>
+          </a:ln>
+        </p:spPr>
+        <p:style>
+          <a:lnRef idx="1">
+            <a:schemeClr val="accent1"/>
+          </a:lnRef>
+          <a:fillRef idx="3">
+            <a:schemeClr val="accent1"/>
+          </a:fillRef>
+          <a:effectRef idx="2">
+            <a:schemeClr val="accent1"/>
+          </a:effectRef>
+          <a:fontRef idx="minor">
+            <a:schemeClr val="lt1"/>
+          </a:fontRef>
+        </p:style>
+        <p:txBody>
+          <a:bodyPr rtlCol="0" anchor="ctr" wrap="square" lIns="182880" tIns="182880"/>
+          <a:lstStyle/>
+          <a:p>
+            <a:pPr algn="ctr">
+              <a:defRPr sz="1400">
+                <a:latin typeface="Courier New"/>
+              </a:defRPr>
+            </a:pPr>
+            <a:r>
+              <a:t>Заказы (волна) → Прогноз ML.NET → OR-Tools CP-SAT → Исполнение WMS → Обратная связь</a:t>
+            </a:r>
+          </a:p>
+        </p:txBody>
+      </p:sp>
+      <p:sp>
+        <p:nvSpPr>
+          <p:cNvPr id="4" name="TextBox 3"/>
+          <p:cNvSpPr txBox="1"/>
+          <p:nvPr/>
+        </p:nvSpPr>
+        <p:spPr>
+          <a:xfrm>
+            <a:off x="457200" y="3840480"/>
+            <a:ext cx="8229600" cy="2286000"/>
+          </a:xfrm>
+          <a:prstGeom prst="rect">
+            <a:avLst/>
+          </a:prstGeom>
+          <a:noFill/>
+        </p:spPr>
+        <p:txBody>
+          <a:bodyPr wrap="square">
+            <a:spAutoFit/>
+          </a:bodyPr>
+          <a:lstStyle/>
+          <a:p>
+            <a:pPr>
+              <a:spcBef>
+                <a:spcPts val="800"/>
+              </a:spcBef>
+              <a:defRPr sz="1800"/>
+            </a:pPr>
+            <a:r>
+              <a:t>1. Получаем список заказов для сборки</a:t>
+            </a:r>
+          </a:p>
+          <a:p>
+            <a:pPr>
+              <a:spcBef>
+                <a:spcPts val="800"/>
+              </a:spcBef>
+              <a:defRPr sz="1800"/>
+            </a:pPr>
+            <a:r>
+              <a:t>2. ML предсказывает время каждой операции</a:t>
+            </a:r>
+          </a:p>
+          <a:p>
+            <a:pPr>
+              <a:spcBef>
+                <a:spcPts val="800"/>
+              </a:spcBef>
+              <a:defRPr sz="1800"/>
+            </a:pPr>
+            <a:r>
+              <a:t>3. OR-Tools строит оптимальный план</a:t>
+            </a:r>
+          </a:p>
+          <a:p>
+            <a:pPr>
+              <a:spcBef>
+                <a:spcPts val="800"/>
+              </a:spcBef>
+              <a:defRPr sz="1800"/>
+            </a:pPr>
+            <a:r>
+              <a:t>4. План отправляется в WMS для исполнения</a:t>
+            </a:r>
+          </a:p>
+          <a:p>
+            <a:pPr>
+              <a:spcBef>
+                <a:spcPts val="800"/>
+              </a:spcBef>
+              <a:defRPr sz="1800"/>
+            </a:pPr>
+            <a:r>
+              <a:t>5. Результаты используются для улучшения моделей</a:t>
+            </a:r>
+          </a:p>
+        </p:txBody>
+      </p:sp>
+    </p:spTree>
+  </p:cSld>
+  <p:clrMapOvr>
+    <a:masterClrMapping/>
+  </p:clrMapOvr>
+</p:sld>
+</file>
+
+<file path=ppt/slides/slide9.xml><?xml version="1.0" encoding="utf-8"?>
+<p:sld xmlns:a="http://schemas.openxmlformats.org/drawingml/2006/main" xmlns:p="http://schemas.openxmlformats.org/presentationml/2006/main" xmlns:r="http://schemas.openxmlformats.org/officeDocument/2006/relationships">
+  <p:cSld>
+    <p:spTree>
+      <p:nvGrpSpPr>
+        <p:cNvPr id="1" name=""/>
+        <p:cNvGrpSpPr/>
+        <p:nvPr/>
+      </p:nvGrpSpPr>
+      <p:grpSpPr/>
+      <p:sp>
+        <p:nvSpPr>
+          <p:cNvPr id="2" name="Rectangle 1"/>
+          <p:cNvSpPr/>
+          <p:nvPr/>
+        </p:nvSpPr>
+        <p:spPr>
+          <a:xfrm>
+            <a:off x="0" y="0"/>
+            <a:ext cx="9144000" cy="1097280"/>
+          </a:xfrm>
+          <a:prstGeom prst="rect">
+            <a:avLst/>
+          </a:prstGeom>
+          <a:solidFill>
+            <a:srgbClr val="0070C0"/>
+          </a:solidFill>
+          <a:ln>
+            <a:noFill/>
+          </a:ln>
+        </p:spPr>
+        <p:style>
+          <a:lnRef idx="1">
+            <a:schemeClr val="accent1"/>
+          </a:lnRef>
+          <a:fillRef idx="3">
+            <a:schemeClr val="accent1"/>
+          </a:fillRef>
+          <a:effectRef idx="2">
+            <a:schemeClr val="accent1"/>
+          </a:effectRef>
+          <a:fontRef idx="minor">
+            <a:schemeClr val="lt1"/>
+          </a:fontRef>
+        </p:style>
+        <p:txBody>
+          <a:bodyPr rtlCol="0" anchor="ctr" wrap="square" lIns="457200" tIns="274320"/>
+          <a:lstStyle/>
+          <a:p>
+            <a:pPr algn="l">
+              <a:defRPr sz="3200" b="1">
+                <a:solidFill>
+                  <a:srgbClr val="FFFFFF"/>
+                </a:solidFill>
+              </a:defRPr>
+            </a:pPr>
+            <a:r>
+              <a:t>8. Пример: волна из 50 заданий</a:t>
+            </a:r>
+          </a:p>
+        </p:txBody>
+      </p:sp>
+      <p:sp>
+        <p:nvSpPr>
+          <p:cNvPr id="3" name="TextBox 2"/>
+          <p:cNvSpPr txBox="1"/>
+          <p:nvPr/>
+        </p:nvSpPr>
+        <p:spPr>
+          <a:xfrm>
+            <a:off x="457200" y="1371600"/>
+            <a:ext cx="8229600" cy="4572000"/>
+          </a:xfrm>
+          <a:prstGeom prst="rect">
+            <a:avLst/>
+          </a:prstGeom>
+          <a:noFill/>
+        </p:spPr>
+        <p:txBody>
+          <a:bodyPr wrap="square">
+            <a:spAutoFit/>
+          </a:bodyPr>
+          <a:lstStyle/>
+          <a:p>
+            <a:pPr>
+              <a:spcBef>
+                <a:spcPts val="1200"/>
+              </a:spcBef>
+              <a:defRPr sz="2000"/>
+            </a:pPr>
+            <a:r>
+              <a:t>БЕЗ оптимизации:</a:t>
+            </a:r>
+          </a:p>
+          <a:p>
+            <a:pPr>
+              <a:spcBef>
+                <a:spcPts val="1200"/>
+              </a:spcBef>
+              <a:defRPr sz="2000"/>
+            </a:pPr>
+            <a:r>
+              <a:t>   Карщик 1: ████████████████████████ (перегружен)</a:t>
+            </a:r>
+          </a:p>
+          <a:p>
+            <a:pPr>
+              <a:spcBef>
+                <a:spcPts val="1200"/>
+              </a:spcBef>
+              <a:defRPr sz="2000"/>
+            </a:pPr>
+            <a:r>
+              <a:t>   Карщик 2: ████████░░░░░░░░░░░░░░░░ (недогружен)</a:t>
+            </a:r>
+          </a:p>
+          <a:p>
+            <a:pPr>
+              <a:spcBef>
+                <a:spcPts val="1200"/>
+              </a:spcBef>
+              <a:defRPr sz="2000"/>
+            </a:pPr>
+            <a:r>
+              <a:t>   Карщик 3: ██████████████░░░░░░░░░░ (средне)</a:t>
+            </a:r>
+          </a:p>
+          <a:p>
+            <a:pPr>
+              <a:spcBef>
+                <a:spcPts val="1200"/>
+              </a:spcBef>
+              <a:defRPr sz="2000"/>
+            </a:pPr>
+            <a:r>
+              <a:t>   Время волны: 45 минут, простои: 12%</a:t>
+            </a:r>
+          </a:p>
+          <a:p>
+            <a:pPr>
+              <a:spcBef>
+                <a:spcPts val="1200"/>
+              </a:spcBef>
+              <a:defRPr sz="2000"/>
+            </a:pPr>
+          </a:p>
+          <a:p>
+            <a:pPr>
+              <a:spcBef>
+                <a:spcPts val="1200"/>
+              </a:spcBef>
+              <a:defRPr sz="2000"/>
+            </a:pPr>
+            <a:r>
+              <a:t>С оптимизацией OR-Tools:</a:t>
+            </a:r>
+          </a:p>
+          <a:p>
+            <a:pPr>
+              <a:spcBef>
+                <a:spcPts val="1200"/>
+              </a:spcBef>
+              <a:defRPr sz="2000"/>
+            </a:pPr>
+            <a:r>
+              <a:t>   Карщик 1: ████████████████░░░░░░░░ (сбалансировано)</a:t>
+            </a:r>
+          </a:p>
+          <a:p>
+            <a:pPr>
+              <a:spcBef>
+                <a:spcPts val="1200"/>
+              </a:spcBef>
+              <a:defRPr sz="2000"/>
+            </a:pPr>
+            <a:r>
+              <a:t>   Карщик 2: ███████████████░░░░░░░░░ (сбалансировано)</a:t>
+            </a:r>
+          </a:p>
+          <a:p>
+            <a:pPr>
+              <a:spcBef>
+                <a:spcPts val="1200"/>
+              </a:spcBef>
+              <a:defRPr sz="2000"/>
+            </a:pPr>
+            <a:r>
+              <a:t>   Карщик 3: ████████████████░░░░░░░░ (сбалансировано)</a:t>
+            </a:r>
+          </a:p>
+          <a:p>
+            <a:pPr>
+              <a:spcBef>
+                <a:spcPts val="1200"/>
+              </a:spcBef>
+              <a:defRPr sz="2000"/>
+            </a:pPr>
+            <a:r>
+              <a:t>   Время волны: 32 минуты (-29%), простои: 3%</a:t>
+            </a:r>
+          </a:p>
+        </p:txBody>
+      </p:sp>
+    </p:spTree>
+  </p:cSld>
+  <p:clrMapOvr>
+    <a:masterClrMapping/>
+  </p:clrMapOvr>
+</p:sld>
+</file>
+
 <file path=ppt/theme/theme1.xml><?xml version="1.0" encoding="utf-8"?>
 <a:theme xmlns:a="http://schemas.openxmlformats.org/drawingml/2006/main" name="Office Theme">
   <a:themeElements>

</xml_diff>

<commit_message>
Add product statistics analytics to plan and presentation
- Add slide 6: Product analytics (complexity, typical quantities, variability)
- Add section 3.2: Product statistics calculation
  - avg_distribution_time_sec per product
  - typical_qty, min/max/median qty
  - std_dev for variability detection
  - tasks_per_day frequency
- Use for: wave time forecast, problem product detection, buffer layout
- Update presentation to 13 slides

Co-Authored-By: Claude Opus 4.5 <noreply@anthropic.com>
</commit_message>
<xml_diff>
--- a/docs/WMS_Buffer_Optimization.pptx
+++ b/docs/WMS_Buffer_Optimization.pptx
@@ -17,6 +17,7 @@
     <p:sldId id="265" r:id="rId16"/>
     <p:sldId id="266" r:id="rId17"/>
     <p:sldId id="267" r:id="rId18"/>
+    <p:sldId id="268" r:id="rId19"/>
   </p:sldIdLst>
   <p:sldSz cx="9144000" cy="6858000" type="screen4x3"/>
   <p:notesSz cx="6858000" cy="9144000"/>
@@ -3240,6 +3241,217 @@
           </a:fontRef>
         </p:style>
         <p:txBody>
+          <a:bodyPr rtlCol="0" anchor="ctr" wrap="square" lIns="457200" tIns="274320"/>
+          <a:lstStyle/>
+          <a:p>
+            <a:pPr algn="l">
+              <a:defRPr sz="3200" b="1">
+                <a:solidFill>
+                  <a:srgbClr val="FFFFFF"/>
+                </a:solidFill>
+              </a:defRPr>
+            </a:pPr>
+            <a:r>
+              <a:t>9. Пример: волна из 50 заданий</a:t>
+            </a:r>
+          </a:p>
+        </p:txBody>
+      </p:sp>
+      <p:sp>
+        <p:nvSpPr>
+          <p:cNvPr id="3" name="TextBox 2"/>
+          <p:cNvSpPr txBox="1"/>
+          <p:nvPr/>
+        </p:nvSpPr>
+        <p:spPr>
+          <a:xfrm>
+            <a:off x="457200" y="1371600"/>
+            <a:ext cx="8229600" cy="4572000"/>
+          </a:xfrm>
+          <a:prstGeom prst="rect">
+            <a:avLst/>
+          </a:prstGeom>
+          <a:noFill/>
+        </p:spPr>
+        <p:txBody>
+          <a:bodyPr wrap="square">
+            <a:spAutoFit/>
+          </a:bodyPr>
+          <a:lstStyle/>
+          <a:p>
+            <a:pPr>
+              <a:spcBef>
+                <a:spcPts val="1200"/>
+              </a:spcBef>
+              <a:defRPr sz="2000"/>
+            </a:pPr>
+            <a:r>
+              <a:t>БЕЗ оптимизации:</a:t>
+            </a:r>
+          </a:p>
+          <a:p>
+            <a:pPr>
+              <a:spcBef>
+                <a:spcPts val="1200"/>
+              </a:spcBef>
+              <a:defRPr sz="2000"/>
+            </a:pPr>
+            <a:r>
+              <a:t>   Карщик 1: ████████████████████████ (перегружен)</a:t>
+            </a:r>
+          </a:p>
+          <a:p>
+            <a:pPr>
+              <a:spcBef>
+                <a:spcPts val="1200"/>
+              </a:spcBef>
+              <a:defRPr sz="2000"/>
+            </a:pPr>
+            <a:r>
+              <a:t>   Карщик 2: ████████░░░░░░░░░░░░░░░░ (недогружен)</a:t>
+            </a:r>
+          </a:p>
+          <a:p>
+            <a:pPr>
+              <a:spcBef>
+                <a:spcPts val="1200"/>
+              </a:spcBef>
+              <a:defRPr sz="2000"/>
+            </a:pPr>
+            <a:r>
+              <a:t>   Карщик 3: ██████████████░░░░░░░░░░ (средне)</a:t>
+            </a:r>
+          </a:p>
+          <a:p>
+            <a:pPr>
+              <a:spcBef>
+                <a:spcPts val="1200"/>
+              </a:spcBef>
+              <a:defRPr sz="2000"/>
+            </a:pPr>
+            <a:r>
+              <a:t>   Время волны: 45 минут, простои: 12%</a:t>
+            </a:r>
+          </a:p>
+          <a:p>
+            <a:pPr>
+              <a:spcBef>
+                <a:spcPts val="1200"/>
+              </a:spcBef>
+              <a:defRPr sz="2000"/>
+            </a:pPr>
+          </a:p>
+          <a:p>
+            <a:pPr>
+              <a:spcBef>
+                <a:spcPts val="1200"/>
+              </a:spcBef>
+              <a:defRPr sz="2000"/>
+            </a:pPr>
+            <a:r>
+              <a:t>С оптимизацией OR-Tools:</a:t>
+            </a:r>
+          </a:p>
+          <a:p>
+            <a:pPr>
+              <a:spcBef>
+                <a:spcPts val="1200"/>
+              </a:spcBef>
+              <a:defRPr sz="2000"/>
+            </a:pPr>
+            <a:r>
+              <a:t>   Карщик 1: ████████████████░░░░░░░░ (сбалансировано)</a:t>
+            </a:r>
+          </a:p>
+          <a:p>
+            <a:pPr>
+              <a:spcBef>
+                <a:spcPts val="1200"/>
+              </a:spcBef>
+              <a:defRPr sz="2000"/>
+            </a:pPr>
+            <a:r>
+              <a:t>   Карщик 2: ███████████████░░░░░░░░░ (сбалансировано)</a:t>
+            </a:r>
+          </a:p>
+          <a:p>
+            <a:pPr>
+              <a:spcBef>
+                <a:spcPts val="1200"/>
+              </a:spcBef>
+              <a:defRPr sz="2000"/>
+            </a:pPr>
+            <a:r>
+              <a:t>   Карщик 3: ████████████████░░░░░░░░ (сбалансировано)</a:t>
+            </a:r>
+          </a:p>
+          <a:p>
+            <a:pPr>
+              <a:spcBef>
+                <a:spcPts val="1200"/>
+              </a:spcBef>
+              <a:defRPr sz="2000"/>
+            </a:pPr>
+            <a:r>
+              <a:t>   Время волны: 32 минуты (-29%), простои: 3%</a:t>
+            </a:r>
+          </a:p>
+        </p:txBody>
+      </p:sp>
+    </p:spTree>
+  </p:cSld>
+  <p:clrMapOvr>
+    <a:masterClrMapping/>
+  </p:clrMapOvr>
+</p:sld>
+</file>
+
+<file path=ppt/slides/slide11.xml><?xml version="1.0" encoding="utf-8"?>
+<p:sld xmlns:a="http://schemas.openxmlformats.org/drawingml/2006/main" xmlns:p="http://schemas.openxmlformats.org/presentationml/2006/main" xmlns:r="http://schemas.openxmlformats.org/officeDocument/2006/relationships">
+  <p:cSld>
+    <p:spTree>
+      <p:nvGrpSpPr>
+        <p:cNvPr id="1" name=""/>
+        <p:cNvGrpSpPr/>
+        <p:nvPr/>
+      </p:nvGrpSpPr>
+      <p:grpSpPr/>
+      <p:sp>
+        <p:nvSpPr>
+          <p:cNvPr id="2" name="Rectangle 1"/>
+          <p:cNvSpPr/>
+          <p:nvPr/>
+        </p:nvSpPr>
+        <p:spPr>
+          <a:xfrm>
+            <a:off x="0" y="0"/>
+            <a:ext cx="9144000" cy="1097280"/>
+          </a:xfrm>
+          <a:prstGeom prst="rect">
+            <a:avLst/>
+          </a:prstGeom>
+          <a:solidFill>
+            <a:srgbClr val="0070C0"/>
+          </a:solidFill>
+          <a:ln>
+            <a:noFill/>
+          </a:ln>
+        </p:spPr>
+        <p:style>
+          <a:lnRef idx="1">
+            <a:schemeClr val="accent1"/>
+          </a:lnRef>
+          <a:fillRef idx="3">
+            <a:schemeClr val="accent1"/>
+          </a:fillRef>
+          <a:effectRef idx="2">
+            <a:schemeClr val="accent1"/>
+          </a:effectRef>
+          <a:fontRef idx="minor">
+            <a:schemeClr val="lt1"/>
+          </a:fontRef>
+        </p:style>
+        <p:txBody>
           <a:bodyPr rtlCol="0" anchor="ctr" lIns="457200" tIns="274320"/>
           <a:lstStyle/>
           <a:p>
@@ -3251,7 +3463,7 @@
               </a:defRPr>
             </a:pPr>
             <a:r>
-              <a:t>9. Ожидаемые результаты</a:t>
+              <a:t>10. Ожидаемые результаты</a:t>
             </a:r>
           </a:p>
         </p:txBody>
@@ -3634,7 +3846,7 @@
 </p:sld>
 </file>
 
-<file path=ppt/slides/slide11.xml><?xml version="1.0" encoding="utf-8"?>
+<file path=ppt/slides/slide12.xml><?xml version="1.0" encoding="utf-8"?>
 <p:sld xmlns:a="http://schemas.openxmlformats.org/drawingml/2006/main" xmlns:p="http://schemas.openxmlformats.org/presentationml/2006/main" xmlns:r="http://schemas.openxmlformats.org/officeDocument/2006/relationships">
   <p:cSld>
     <p:spTree>
@@ -3691,7 +3903,7 @@
               </a:defRPr>
             </a:pPr>
             <a:r>
-              <a:t>10. План внедрения</a:t>
+              <a:t>11. План внедрения</a:t>
             </a:r>
           </a:p>
         </p:txBody>
@@ -4037,7 +4249,7 @@
 </p:sld>
 </file>
 
-<file path=ppt/slides/slide12.xml><?xml version="1.0" encoding="utf-8"?>
+<file path=ppt/slides/slide13.xml><?xml version="1.0" encoding="utf-8"?>
 <p:sld xmlns:a="http://schemas.openxmlformats.org/drawingml/2006/main" xmlns:p="http://schemas.openxmlformats.org/presentationml/2006/main" xmlns:r="http://schemas.openxmlformats.org/officeDocument/2006/relationships">
   <p:cSld>
     <p:spTree>
@@ -4094,7 +4306,7 @@
               </a:defRPr>
             </a:pPr>
             <a:r>
-              <a:t>11. Резюме</a:t>
+              <a:t>12. Резюме</a:t>
             </a:r>
           </a:p>
         </p:txBody>
@@ -5245,26 +5457,7 @@
               <a:defRPr sz="2000"/>
             </a:pPr>
             <a:r>
-              <a:t>ML модель учитывает связку: пикер + товар + время → скорость</a:t>
-            </a:r>
-          </a:p>
-          <a:p>
-            <a:pPr>
-              <a:spcBef>
-                <a:spcPts val="1200"/>
-              </a:spcBef>
-              <a:defRPr sz="2000"/>
-            </a:pPr>
-          </a:p>
-          <a:p>
-            <a:pPr>
-              <a:spcBef>
-                <a:spcPts val="1200"/>
-              </a:spcBef>
-              <a:defRPr sz="2000"/>
-            </a:pPr>
-            <a:r>
-              <a:t>Результат: задача идёт к тому, кто выполнит её быстрее</a:t>
+              <a:t>ML модель учитывает связку: пикер + товар + объём → время</a:t>
             </a:r>
           </a:p>
         </p:txBody>
@@ -5334,7 +5527,7 @@
               </a:defRPr>
             </a:pPr>
             <a:r>
-              <a:t>6. Оптимизация расписания (OR-Tools)</a:t>
+              <a:t>6. Аналитика по товарам</a:t>
             </a:r>
           </a:p>
         </p:txBody>
@@ -5368,119 +5561,111 @@
               <a:defRPr sz="2000"/>
             </a:pPr>
             <a:r>
-              <a:t>Задача: минимизация общего времени выполнения волны</a:t>
-            </a:r>
-          </a:p>
-          <a:p>
-            <a:pPr>
-              <a:spcBef>
-                <a:spcPts val="1200"/>
-              </a:spcBef>
-              <a:defRPr sz="2000"/>
-            </a:pPr>
-          </a:p>
-          <a:p>
-            <a:pPr>
-              <a:spcBef>
-                <a:spcPts val="1200"/>
-              </a:spcBef>
-              <a:defRPr sz="2000"/>
-            </a:pPr>
-            <a:r>
-              <a:t>Оптимизируем ДВА назначения одновременно:</a:t>
-            </a:r>
-          </a:p>
-          <a:p>
-            <a:pPr>
-              <a:spcBef>
-                <a:spcPts val="1200"/>
-              </a:spcBef>
-              <a:defRPr sz="2000"/>
-            </a:pPr>
-            <a:r>
-              <a:t>   • Карщик → Палета → Ячейка буфера</a:t>
-            </a:r>
-          </a:p>
-          <a:p>
-            <a:pPr>
-              <a:spcBef>
-                <a:spcPts val="1200"/>
-              </a:spcBef>
-              <a:defRPr sz="2000"/>
-            </a:pPr>
-            <a:r>
-              <a:t>   • Пикер → Задание на сборку</a:t>
-            </a:r>
-          </a:p>
-          <a:p>
-            <a:pPr>
-              <a:spcBef>
-                <a:spcPts val="1200"/>
-              </a:spcBef>
-              <a:defRPr sz="2000"/>
-            </a:pPr>
-          </a:p>
-          <a:p>
-            <a:pPr>
-              <a:spcBef>
-                <a:spcPts val="1200"/>
-              </a:spcBef>
-              <a:defRPr sz="2000"/>
-            </a:pPr>
-            <a:r>
-              <a:t>Учитываем:</a:t>
-            </a:r>
-          </a:p>
-          <a:p>
-            <a:pPr>
-              <a:spcBef>
-                <a:spcPts val="1200"/>
-              </a:spcBef>
-              <a:defRPr sz="2000"/>
-            </a:pPr>
-            <a:r>
-              <a:t>   • Прогноз времени для каждой пары (пикер, задание)</a:t>
-            </a:r>
-          </a:p>
-          <a:p>
-            <a:pPr>
-              <a:spcBef>
-                <a:spcPts val="1200"/>
-              </a:spcBef>
-              <a:defRPr sz="2000"/>
-            </a:pPr>
-            <a:r>
-              <a:t>   • Текущую занятость и время до освобождения</a:t>
-            </a:r>
-          </a:p>
-          <a:p>
-            <a:pPr>
-              <a:spcBef>
-                <a:spcPts val="1200"/>
-              </a:spcBef>
-              <a:defRPr sz="2000"/>
-            </a:pPr>
-            <a:r>
-              <a:t>   • Балансировку нагрузки между всеми работниками</a:t>
-            </a:r>
-          </a:p>
-          <a:p>
-            <a:pPr>
-              <a:spcBef>
-                <a:spcPts val="1200"/>
-              </a:spcBef>
-              <a:defRPr sz="2000"/>
-            </a:pPr>
-          </a:p>
-          <a:p>
-            <a:pPr>
-              <a:spcBef>
-                <a:spcPts val="1200"/>
-              </a:spcBef>
-              <a:defRPr sz="2000"/>
-            </a:pPr>
-            <a:r>
-              <a:t>Ограничения: приоритеты заказов, тяжёлые палеты вниз</a:t>
+              <a:t>Для каждого товара рассчитываем:</a:t>
+            </a:r>
+          </a:p>
+          <a:p>
+            <a:pPr>
+              <a:spcBef>
+                <a:spcPts val="1200"/>
+              </a:spcBef>
+              <a:defRPr sz="2000"/>
+            </a:pPr>
+          </a:p>
+          <a:p>
+            <a:pPr>
+              <a:spcBef>
+                <a:spcPts val="1200"/>
+              </a:spcBef>
+              <a:defRPr sz="2000"/>
+            </a:pPr>
+            <a:r>
+              <a:t>   • Среднее время распределения (сложность товара)</a:t>
+            </a:r>
+          </a:p>
+          <a:p>
+            <a:pPr>
+              <a:spcBef>
+                <a:spcPts val="1200"/>
+              </a:spcBef>
+              <a:defRPr sz="2000"/>
+            </a:pPr>
+            <a:r>
+              <a:t>   • Типичное количество в задании (мин, макс, медиана)</a:t>
+            </a:r>
+          </a:p>
+          <a:p>
+            <a:pPr>
+              <a:spcBef>
+                <a:spcPts val="1200"/>
+              </a:spcBef>
+              <a:defRPr sz="2000"/>
+            </a:pPr>
+            <a:r>
+              <a:t>   • Вариативность времени (стабильность)</a:t>
+            </a:r>
+          </a:p>
+          <a:p>
+            <a:pPr>
+              <a:spcBef>
+                <a:spcPts val="1200"/>
+              </a:spcBef>
+              <a:defRPr sz="2000"/>
+            </a:pPr>
+            <a:r>
+              <a:t>   • Частота появления (приоритет оптимизации)</a:t>
+            </a:r>
+          </a:p>
+          <a:p>
+            <a:pPr>
+              <a:spcBef>
+                <a:spcPts val="1200"/>
+              </a:spcBef>
+              <a:defRPr sz="2000"/>
+            </a:pPr>
+          </a:p>
+          <a:p>
+            <a:pPr>
+              <a:spcBef>
+                <a:spcPts val="1200"/>
+              </a:spcBef>
+              <a:defRPr sz="2000"/>
+            </a:pPr>
+            <a:r>
+              <a:t>Использование:</a:t>
+            </a:r>
+          </a:p>
+          <a:p>
+            <a:pPr>
+              <a:spcBef>
+                <a:spcPts val="1200"/>
+              </a:spcBef>
+              <a:defRPr sz="2000"/>
+            </a:pPr>
+            <a:r>
+              <a:t>   • Прогноз времени волны = Σ (кол-во × время на единицу)</a:t>
+            </a:r>
+          </a:p>
+          <a:p>
+            <a:pPr>
+              <a:spcBef>
+                <a:spcPts val="1200"/>
+              </a:spcBef>
+              <a:defRPr sz="2000"/>
+            </a:pPr>
+            <a:r>
+              <a:t>   • Выявление 'проблемных' товаров</a:t>
+            </a:r>
+          </a:p>
+          <a:p>
+            <a:pPr>
+              <a:spcBef>
+                <a:spcPts val="1200"/>
+              </a:spcBef>
+              <a:defRPr sz="2000"/>
+            </a:pPr>
+            <a:r>
+              <a:t>   • Частые товары → ближе к выходу из буфера</a:t>
             </a:r>
           </a:p>
         </p:txBody>
@@ -5539,6 +5724,222 @@
           </a:fontRef>
         </p:style>
         <p:txBody>
+          <a:bodyPr rtlCol="0" anchor="ctr" wrap="square" lIns="457200" tIns="274320"/>
+          <a:lstStyle/>
+          <a:p>
+            <a:pPr algn="l">
+              <a:defRPr sz="3200" b="1">
+                <a:solidFill>
+                  <a:srgbClr val="FFFFFF"/>
+                </a:solidFill>
+              </a:defRPr>
+            </a:pPr>
+            <a:r>
+              <a:t>7. Оптимизация расписания (OR-Tools)</a:t>
+            </a:r>
+          </a:p>
+        </p:txBody>
+      </p:sp>
+      <p:sp>
+        <p:nvSpPr>
+          <p:cNvPr id="3" name="TextBox 2"/>
+          <p:cNvSpPr txBox="1"/>
+          <p:nvPr/>
+        </p:nvSpPr>
+        <p:spPr>
+          <a:xfrm>
+            <a:off x="457200" y="1371600"/>
+            <a:ext cx="8229600" cy="4572000"/>
+          </a:xfrm>
+          <a:prstGeom prst="rect">
+            <a:avLst/>
+          </a:prstGeom>
+          <a:noFill/>
+        </p:spPr>
+        <p:txBody>
+          <a:bodyPr wrap="square">
+            <a:spAutoFit/>
+          </a:bodyPr>
+          <a:lstStyle/>
+          <a:p>
+            <a:pPr>
+              <a:spcBef>
+                <a:spcPts val="1200"/>
+              </a:spcBef>
+              <a:defRPr sz="2000"/>
+            </a:pPr>
+            <a:r>
+              <a:t>Задача: минимизация общего времени выполнения волны</a:t>
+            </a:r>
+          </a:p>
+          <a:p>
+            <a:pPr>
+              <a:spcBef>
+                <a:spcPts val="1200"/>
+              </a:spcBef>
+              <a:defRPr sz="2000"/>
+            </a:pPr>
+          </a:p>
+          <a:p>
+            <a:pPr>
+              <a:spcBef>
+                <a:spcPts val="1200"/>
+              </a:spcBef>
+              <a:defRPr sz="2000"/>
+            </a:pPr>
+            <a:r>
+              <a:t>Оптимизируем ДВА назначения одновременно:</a:t>
+            </a:r>
+          </a:p>
+          <a:p>
+            <a:pPr>
+              <a:spcBef>
+                <a:spcPts val="1200"/>
+              </a:spcBef>
+              <a:defRPr sz="2000"/>
+            </a:pPr>
+            <a:r>
+              <a:t>   • Карщик → Палета → Ячейка буфера</a:t>
+            </a:r>
+          </a:p>
+          <a:p>
+            <a:pPr>
+              <a:spcBef>
+                <a:spcPts val="1200"/>
+              </a:spcBef>
+              <a:defRPr sz="2000"/>
+            </a:pPr>
+            <a:r>
+              <a:t>   • Пикер → Задание на сборку</a:t>
+            </a:r>
+          </a:p>
+          <a:p>
+            <a:pPr>
+              <a:spcBef>
+                <a:spcPts val="1200"/>
+              </a:spcBef>
+              <a:defRPr sz="2000"/>
+            </a:pPr>
+          </a:p>
+          <a:p>
+            <a:pPr>
+              <a:spcBef>
+                <a:spcPts val="1200"/>
+              </a:spcBef>
+              <a:defRPr sz="2000"/>
+            </a:pPr>
+            <a:r>
+              <a:t>Учитываем:</a:t>
+            </a:r>
+          </a:p>
+          <a:p>
+            <a:pPr>
+              <a:spcBef>
+                <a:spcPts val="1200"/>
+              </a:spcBef>
+              <a:defRPr sz="2000"/>
+            </a:pPr>
+            <a:r>
+              <a:t>   • Прогноз времени для каждой пары (пикер, задание)</a:t>
+            </a:r>
+          </a:p>
+          <a:p>
+            <a:pPr>
+              <a:spcBef>
+                <a:spcPts val="1200"/>
+              </a:spcBef>
+              <a:defRPr sz="2000"/>
+            </a:pPr>
+            <a:r>
+              <a:t>   • Текущую занятость и время до освобождения</a:t>
+            </a:r>
+          </a:p>
+          <a:p>
+            <a:pPr>
+              <a:spcBef>
+                <a:spcPts val="1200"/>
+              </a:spcBef>
+              <a:defRPr sz="2000"/>
+            </a:pPr>
+            <a:r>
+              <a:t>   • Балансировку нагрузки между всеми работниками</a:t>
+            </a:r>
+          </a:p>
+          <a:p>
+            <a:pPr>
+              <a:spcBef>
+                <a:spcPts val="1200"/>
+              </a:spcBef>
+              <a:defRPr sz="2000"/>
+            </a:pPr>
+          </a:p>
+          <a:p>
+            <a:pPr>
+              <a:spcBef>
+                <a:spcPts val="1200"/>
+              </a:spcBef>
+              <a:defRPr sz="2000"/>
+            </a:pPr>
+            <a:r>
+              <a:t>Ограничения: приоритеты заказов, тяжёлые палеты вниз</a:t>
+            </a:r>
+          </a:p>
+        </p:txBody>
+      </p:sp>
+    </p:spTree>
+  </p:cSld>
+  <p:clrMapOvr>
+    <a:masterClrMapping/>
+  </p:clrMapOvr>
+</p:sld>
+</file>
+
+<file path=ppt/slides/slide9.xml><?xml version="1.0" encoding="utf-8"?>
+<p:sld xmlns:a="http://schemas.openxmlformats.org/drawingml/2006/main" xmlns:p="http://schemas.openxmlformats.org/presentationml/2006/main" xmlns:r="http://schemas.openxmlformats.org/officeDocument/2006/relationships">
+  <p:cSld>
+    <p:spTree>
+      <p:nvGrpSpPr>
+        <p:cNvPr id="1" name=""/>
+        <p:cNvGrpSpPr/>
+        <p:nvPr/>
+      </p:nvGrpSpPr>
+      <p:grpSpPr/>
+      <p:sp>
+        <p:nvSpPr>
+          <p:cNvPr id="2" name="Rectangle 1"/>
+          <p:cNvSpPr/>
+          <p:nvPr/>
+        </p:nvSpPr>
+        <p:spPr>
+          <a:xfrm>
+            <a:off x="0" y="0"/>
+            <a:ext cx="9144000" cy="1097280"/>
+          </a:xfrm>
+          <a:prstGeom prst="rect">
+            <a:avLst/>
+          </a:prstGeom>
+          <a:solidFill>
+            <a:srgbClr val="0070C0"/>
+          </a:solidFill>
+          <a:ln>
+            <a:noFill/>
+          </a:ln>
+        </p:spPr>
+        <p:style>
+          <a:lnRef idx="1">
+            <a:schemeClr val="accent1"/>
+          </a:lnRef>
+          <a:fillRef idx="3">
+            <a:schemeClr val="accent1"/>
+          </a:fillRef>
+          <a:effectRef idx="2">
+            <a:schemeClr val="accent1"/>
+          </a:effectRef>
+          <a:fontRef idx="minor">
+            <a:schemeClr val="lt1"/>
+          </a:fontRef>
+        </p:style>
+        <p:txBody>
           <a:bodyPr rtlCol="0" anchor="ctr" lIns="457200" tIns="274320"/>
           <a:lstStyle/>
           <a:p>
@@ -5550,7 +5951,7 @@
               </a:defRPr>
             </a:pPr>
             <a:r>
-              <a:t>7. Цикл оптимизации (каждые 15 минут)</a:t>
+              <a:t>8. Цикл оптимизации (каждые 15 минут)</a:t>
             </a:r>
           </a:p>
         </p:txBody>
@@ -5681,217 +6082,6 @@
             </a:pPr>
             <a:r>
               <a:t>5. Результаты используются для улучшения моделей</a:t>
-            </a:r>
-          </a:p>
-        </p:txBody>
-      </p:sp>
-    </p:spTree>
-  </p:cSld>
-  <p:clrMapOvr>
-    <a:masterClrMapping/>
-  </p:clrMapOvr>
-</p:sld>
-</file>
-
-<file path=ppt/slides/slide9.xml><?xml version="1.0" encoding="utf-8"?>
-<p:sld xmlns:a="http://schemas.openxmlformats.org/drawingml/2006/main" xmlns:p="http://schemas.openxmlformats.org/presentationml/2006/main" xmlns:r="http://schemas.openxmlformats.org/officeDocument/2006/relationships">
-  <p:cSld>
-    <p:spTree>
-      <p:nvGrpSpPr>
-        <p:cNvPr id="1" name=""/>
-        <p:cNvGrpSpPr/>
-        <p:nvPr/>
-      </p:nvGrpSpPr>
-      <p:grpSpPr/>
-      <p:sp>
-        <p:nvSpPr>
-          <p:cNvPr id="2" name="Rectangle 1"/>
-          <p:cNvSpPr/>
-          <p:nvPr/>
-        </p:nvSpPr>
-        <p:spPr>
-          <a:xfrm>
-            <a:off x="0" y="0"/>
-            <a:ext cx="9144000" cy="1097280"/>
-          </a:xfrm>
-          <a:prstGeom prst="rect">
-            <a:avLst/>
-          </a:prstGeom>
-          <a:solidFill>
-            <a:srgbClr val="0070C0"/>
-          </a:solidFill>
-          <a:ln>
-            <a:noFill/>
-          </a:ln>
-        </p:spPr>
-        <p:style>
-          <a:lnRef idx="1">
-            <a:schemeClr val="accent1"/>
-          </a:lnRef>
-          <a:fillRef idx="3">
-            <a:schemeClr val="accent1"/>
-          </a:fillRef>
-          <a:effectRef idx="2">
-            <a:schemeClr val="accent1"/>
-          </a:effectRef>
-          <a:fontRef idx="minor">
-            <a:schemeClr val="lt1"/>
-          </a:fontRef>
-        </p:style>
-        <p:txBody>
-          <a:bodyPr rtlCol="0" anchor="ctr" wrap="square" lIns="457200" tIns="274320"/>
-          <a:lstStyle/>
-          <a:p>
-            <a:pPr algn="l">
-              <a:defRPr sz="3200" b="1">
-                <a:solidFill>
-                  <a:srgbClr val="FFFFFF"/>
-                </a:solidFill>
-              </a:defRPr>
-            </a:pPr>
-            <a:r>
-              <a:t>8. Пример: волна из 50 заданий</a:t>
-            </a:r>
-          </a:p>
-        </p:txBody>
-      </p:sp>
-      <p:sp>
-        <p:nvSpPr>
-          <p:cNvPr id="3" name="TextBox 2"/>
-          <p:cNvSpPr txBox="1"/>
-          <p:nvPr/>
-        </p:nvSpPr>
-        <p:spPr>
-          <a:xfrm>
-            <a:off x="457200" y="1371600"/>
-            <a:ext cx="8229600" cy="4572000"/>
-          </a:xfrm>
-          <a:prstGeom prst="rect">
-            <a:avLst/>
-          </a:prstGeom>
-          <a:noFill/>
-        </p:spPr>
-        <p:txBody>
-          <a:bodyPr wrap="square">
-            <a:spAutoFit/>
-          </a:bodyPr>
-          <a:lstStyle/>
-          <a:p>
-            <a:pPr>
-              <a:spcBef>
-                <a:spcPts val="1200"/>
-              </a:spcBef>
-              <a:defRPr sz="2000"/>
-            </a:pPr>
-            <a:r>
-              <a:t>БЕЗ оптимизации:</a:t>
-            </a:r>
-          </a:p>
-          <a:p>
-            <a:pPr>
-              <a:spcBef>
-                <a:spcPts val="1200"/>
-              </a:spcBef>
-              <a:defRPr sz="2000"/>
-            </a:pPr>
-            <a:r>
-              <a:t>   Карщик 1: ████████████████████████ (перегружен)</a:t>
-            </a:r>
-          </a:p>
-          <a:p>
-            <a:pPr>
-              <a:spcBef>
-                <a:spcPts val="1200"/>
-              </a:spcBef>
-              <a:defRPr sz="2000"/>
-            </a:pPr>
-            <a:r>
-              <a:t>   Карщик 2: ████████░░░░░░░░░░░░░░░░ (недогружен)</a:t>
-            </a:r>
-          </a:p>
-          <a:p>
-            <a:pPr>
-              <a:spcBef>
-                <a:spcPts val="1200"/>
-              </a:spcBef>
-              <a:defRPr sz="2000"/>
-            </a:pPr>
-            <a:r>
-              <a:t>   Карщик 3: ██████████████░░░░░░░░░░ (средне)</a:t>
-            </a:r>
-          </a:p>
-          <a:p>
-            <a:pPr>
-              <a:spcBef>
-                <a:spcPts val="1200"/>
-              </a:spcBef>
-              <a:defRPr sz="2000"/>
-            </a:pPr>
-            <a:r>
-              <a:t>   Время волны: 45 минут, простои: 12%</a:t>
-            </a:r>
-          </a:p>
-          <a:p>
-            <a:pPr>
-              <a:spcBef>
-                <a:spcPts val="1200"/>
-              </a:spcBef>
-              <a:defRPr sz="2000"/>
-            </a:pPr>
-          </a:p>
-          <a:p>
-            <a:pPr>
-              <a:spcBef>
-                <a:spcPts val="1200"/>
-              </a:spcBef>
-              <a:defRPr sz="2000"/>
-            </a:pPr>
-            <a:r>
-              <a:t>С оптимизацией OR-Tools:</a:t>
-            </a:r>
-          </a:p>
-          <a:p>
-            <a:pPr>
-              <a:spcBef>
-                <a:spcPts val="1200"/>
-              </a:spcBef>
-              <a:defRPr sz="2000"/>
-            </a:pPr>
-            <a:r>
-              <a:t>   Карщик 1: ████████████████░░░░░░░░ (сбалансировано)</a:t>
-            </a:r>
-          </a:p>
-          <a:p>
-            <a:pPr>
-              <a:spcBef>
-                <a:spcPts val="1200"/>
-              </a:spcBef>
-              <a:defRPr sz="2000"/>
-            </a:pPr>
-            <a:r>
-              <a:t>   Карщик 2: ███████████████░░░░░░░░░ (сбалансировано)</a:t>
-            </a:r>
-          </a:p>
-          <a:p>
-            <a:pPr>
-              <a:spcBef>
-                <a:spcPts val="1200"/>
-              </a:spcBef>
-              <a:defRPr sz="2000"/>
-            </a:pPr>
-            <a:r>
-              <a:t>   Карщик 3: ████████████████░░░░░░░░ (сбалансировано)</a:t>
-            </a:r>
-          </a:p>
-          <a:p>
-            <a:pPr>
-              <a:spcBef>
-                <a:spcPts val="1200"/>
-              </a:spcBef>
-              <a:defRPr sz="2000"/>
-            </a:pPr>
-            <a:r>
-              <a:t>   Время волны: 32 минуты (-29%), простои: 3%</a:t>
             </a:r>
           </a:p>
         </p:txBody>

</xml_diff>

<commit_message>
Fix white text on white background, add picker example slide
- Fix text color in diagram slides (black on light gray)
- Add slide 10: Picker example (assignment by efficiency)
  - Shows before/after with smart task assignment
  - Picker A gets product Y (his best), Picker B gets product X (his best)
- Separate forklift and picker examples into two slides
- Update presentation to 14 slides

Co-Authored-By: Claude Opus 4.5 <noreply@anthropic.com>
</commit_message>
<xml_diff>
--- a/docs/WMS_Buffer_Optimization.pptx
+++ b/docs/WMS_Buffer_Optimization.pptx
@@ -18,6 +18,7 @@
     <p:sldId id="266" r:id="rId17"/>
     <p:sldId id="267" r:id="rId18"/>
     <p:sldId id="268" r:id="rId19"/>
+    <p:sldId id="269" r:id="rId20"/>
   </p:sldIdLst>
   <p:sldSz cx="9144000" cy="6858000" type="screen4x3"/>
   <p:notesSz cx="6858000" cy="9144000"/>
@@ -3252,7 +3253,7 @@
               </a:defRPr>
             </a:pPr>
             <a:r>
-              <a:t>9. Пример: волна из 50 заданий</a:t>
+              <a:t>9. Пример: карщики (волна 50 заданий)</a:t>
             </a:r>
           </a:p>
         </p:txBody>
@@ -3329,17 +3330,6 @@
               </a:spcBef>
               <a:defRPr sz="2000"/>
             </a:pPr>
-            <a:r>
-              <a:t>   Время волны: 45 минут, простои: 12%</a:t>
-            </a:r>
-          </a:p>
-          <a:p>
-            <a:pPr>
-              <a:spcBef>
-                <a:spcPts val="1200"/>
-              </a:spcBef>
-              <a:defRPr sz="2000"/>
-            </a:pPr>
           </a:p>
           <a:p>
             <a:pPr>
@@ -3392,8 +3382,16 @@
               </a:spcBef>
               <a:defRPr sz="2000"/>
             </a:pPr>
-            <a:r>
-              <a:t>   Время волны: 32 минуты (-29%), простои: 3%</a:t>
+          </a:p>
+          <a:p>
+            <a:pPr>
+              <a:spcBef>
+                <a:spcPts val="1200"/>
+              </a:spcBef>
+              <a:defRPr sz="2000"/>
+            </a:pPr>
+            <a:r>
+              <a:t>Результат: время волны 45→32 мин (-29%)</a:t>
             </a:r>
           </a:p>
         </p:txBody>
@@ -3452,6 +3450,211 @@
           </a:fontRef>
         </p:style>
         <p:txBody>
+          <a:bodyPr rtlCol="0" anchor="ctr" wrap="square" lIns="457200" tIns="274320"/>
+          <a:lstStyle/>
+          <a:p>
+            <a:pPr algn="l">
+              <a:defRPr sz="3200" b="1">
+                <a:solidFill>
+                  <a:srgbClr val="FFFFFF"/>
+                </a:solidFill>
+              </a:defRPr>
+            </a:pPr>
+            <a:r>
+              <a:t>10. Пример: пикеры (назначение по эффективности)</a:t>
+            </a:r>
+          </a:p>
+        </p:txBody>
+      </p:sp>
+      <p:sp>
+        <p:nvSpPr>
+          <p:cNvPr id="3" name="TextBox 2"/>
+          <p:cNvSpPr txBox="1"/>
+          <p:nvPr/>
+        </p:nvSpPr>
+        <p:spPr>
+          <a:xfrm>
+            <a:off x="457200" y="1371600"/>
+            <a:ext cx="8229600" cy="4572000"/>
+          </a:xfrm>
+          <a:prstGeom prst="rect">
+            <a:avLst/>
+          </a:prstGeom>
+          <a:noFill/>
+        </p:spPr>
+        <p:txBody>
+          <a:bodyPr wrap="square">
+            <a:spAutoFit/>
+          </a:bodyPr>
+          <a:lstStyle/>
+          <a:p>
+            <a:pPr>
+              <a:spcBef>
+                <a:spcPts val="1200"/>
+              </a:spcBef>
+              <a:defRPr sz="2000"/>
+            </a:pPr>
+            <a:r>
+              <a:t>БЕЗ оптимизации (случайное назначение):</a:t>
+            </a:r>
+          </a:p>
+          <a:p>
+            <a:pPr>
+              <a:spcBef>
+                <a:spcPts val="1200"/>
+              </a:spcBef>
+              <a:defRPr sz="2000"/>
+            </a:pPr>
+            <a:r>
+              <a:t>   Пикер А берёт товар X → 8 мин (не его специализация)</a:t>
+            </a:r>
+          </a:p>
+          <a:p>
+            <a:pPr>
+              <a:spcBef>
+                <a:spcPts val="1200"/>
+              </a:spcBef>
+              <a:defRPr sz="2000"/>
+            </a:pPr>
+            <a:r>
+              <a:t>   Пикер Б берёт товар Y → 10 мин (не его специализация)</a:t>
+            </a:r>
+          </a:p>
+          <a:p>
+            <a:pPr>
+              <a:spcBef>
+                <a:spcPts val="1200"/>
+              </a:spcBef>
+              <a:defRPr sz="2000"/>
+            </a:pPr>
+          </a:p>
+          <a:p>
+            <a:pPr>
+              <a:spcBef>
+                <a:spcPts val="1200"/>
+              </a:spcBef>
+              <a:defRPr sz="2000"/>
+            </a:pPr>
+            <a:r>
+              <a:t>С оптимизацией (ML + OR-Tools):</a:t>
+            </a:r>
+          </a:p>
+          <a:p>
+            <a:pPr>
+              <a:spcBef>
+                <a:spcPts val="1200"/>
+              </a:spcBef>
+              <a:defRPr sz="2000"/>
+            </a:pPr>
+            <a:r>
+              <a:t>   Пикер А берёт товар Y → 5 мин (его лучший товар)</a:t>
+            </a:r>
+          </a:p>
+          <a:p>
+            <a:pPr>
+              <a:spcBef>
+                <a:spcPts val="1200"/>
+              </a:spcBef>
+              <a:defRPr sz="2000"/>
+            </a:pPr>
+            <a:r>
+              <a:t>   Пикер Б берёт товар X → 4 мин (его лучший товар)</a:t>
+            </a:r>
+          </a:p>
+          <a:p>
+            <a:pPr>
+              <a:spcBef>
+                <a:spcPts val="1200"/>
+              </a:spcBef>
+              <a:defRPr sz="2000"/>
+            </a:pPr>
+          </a:p>
+          <a:p>
+            <a:pPr>
+              <a:spcBef>
+                <a:spcPts val="1200"/>
+              </a:spcBef>
+              <a:defRPr sz="2000"/>
+            </a:pPr>
+            <a:r>
+              <a:t>Учитываем: кто скоро освободится, кто ближе к ячейке</a:t>
+            </a:r>
+          </a:p>
+          <a:p>
+            <a:pPr>
+              <a:spcBef>
+                <a:spcPts val="1200"/>
+              </a:spcBef>
+              <a:defRPr sz="2000"/>
+            </a:pPr>
+          </a:p>
+          <a:p>
+            <a:pPr>
+              <a:spcBef>
+                <a:spcPts val="1200"/>
+              </a:spcBef>
+              <a:defRPr sz="2000"/>
+            </a:pPr>
+            <a:r>
+              <a:t>Результат: простои пикеров 12%→3% (-75%)</a:t>
+            </a:r>
+          </a:p>
+        </p:txBody>
+      </p:sp>
+    </p:spTree>
+  </p:cSld>
+  <p:clrMapOvr>
+    <a:masterClrMapping/>
+  </p:clrMapOvr>
+</p:sld>
+</file>
+
+<file path=ppt/slides/slide12.xml><?xml version="1.0" encoding="utf-8"?>
+<p:sld xmlns:a="http://schemas.openxmlformats.org/drawingml/2006/main" xmlns:p="http://schemas.openxmlformats.org/presentationml/2006/main" xmlns:r="http://schemas.openxmlformats.org/officeDocument/2006/relationships">
+  <p:cSld>
+    <p:spTree>
+      <p:nvGrpSpPr>
+        <p:cNvPr id="1" name=""/>
+        <p:cNvGrpSpPr/>
+        <p:nvPr/>
+      </p:nvGrpSpPr>
+      <p:grpSpPr/>
+      <p:sp>
+        <p:nvSpPr>
+          <p:cNvPr id="2" name="Rectangle 1"/>
+          <p:cNvSpPr/>
+          <p:nvPr/>
+        </p:nvSpPr>
+        <p:spPr>
+          <a:xfrm>
+            <a:off x="0" y="0"/>
+            <a:ext cx="9144000" cy="1097280"/>
+          </a:xfrm>
+          <a:prstGeom prst="rect">
+            <a:avLst/>
+          </a:prstGeom>
+          <a:solidFill>
+            <a:srgbClr val="0070C0"/>
+          </a:solidFill>
+          <a:ln>
+            <a:noFill/>
+          </a:ln>
+        </p:spPr>
+        <p:style>
+          <a:lnRef idx="1">
+            <a:schemeClr val="accent1"/>
+          </a:lnRef>
+          <a:fillRef idx="3">
+            <a:schemeClr val="accent1"/>
+          </a:fillRef>
+          <a:effectRef idx="2">
+            <a:schemeClr val="accent1"/>
+          </a:effectRef>
+          <a:fontRef idx="minor">
+            <a:schemeClr val="lt1"/>
+          </a:fontRef>
+        </p:style>
+        <p:txBody>
           <a:bodyPr rtlCol="0" anchor="ctr" lIns="457200" tIns="274320"/>
           <a:lstStyle/>
           <a:p>
@@ -3463,7 +3666,7 @@
               </a:defRPr>
             </a:pPr>
             <a:r>
-              <a:t>10. Ожидаемые результаты</a:t>
+              <a:t>11. Ожидаемые результаты</a:t>
             </a:r>
           </a:p>
         </p:txBody>
@@ -3846,7 +4049,7 @@
 </p:sld>
 </file>
 
-<file path=ppt/slides/slide12.xml><?xml version="1.0" encoding="utf-8"?>
+<file path=ppt/slides/slide13.xml><?xml version="1.0" encoding="utf-8"?>
 <p:sld xmlns:a="http://schemas.openxmlformats.org/drawingml/2006/main" xmlns:p="http://schemas.openxmlformats.org/presentationml/2006/main" xmlns:r="http://schemas.openxmlformats.org/officeDocument/2006/relationships">
   <p:cSld>
     <p:spTree>
@@ -3903,7 +4106,7 @@
               </a:defRPr>
             </a:pPr>
             <a:r>
-              <a:t>11. План внедрения</a:t>
+              <a:t>12. План внедрения</a:t>
             </a:r>
           </a:p>
         </p:txBody>
@@ -4249,7 +4452,7 @@
 </p:sld>
 </file>
 
-<file path=ppt/slides/slide13.xml><?xml version="1.0" encoding="utf-8"?>
+<file path=ppt/slides/slide14.xml><?xml version="1.0" encoding="utf-8"?>
 <p:sld xmlns:a="http://schemas.openxmlformats.org/drawingml/2006/main" xmlns:p="http://schemas.openxmlformats.org/presentationml/2006/main" xmlns:r="http://schemas.openxmlformats.org/officeDocument/2006/relationships">
   <p:cSld>
     <p:spTree>
@@ -4306,7 +4509,7 @@
               </a:defRPr>
             </a:pPr>
             <a:r>
-              <a:t>12. Резюме</a:t>
+              <a:t>13. Резюме</a:t>
             </a:r>
           </a:p>
         </p:txBody>
@@ -4540,6 +4743,9 @@
           <a:p>
             <a:pPr algn="ctr">
               <a:defRPr sz="1400">
+                <a:solidFill>
+                  <a:srgbClr val="000000"/>
+                </a:solidFill>
                 <a:latin typeface="Courier New"/>
               </a:defRPr>
             </a:pPr>
@@ -4575,7 +4781,11 @@
               <a:spcBef>
                 <a:spcPts val="800"/>
               </a:spcBef>
-              <a:defRPr sz="1800"/>
+              <a:defRPr sz="1800">
+                <a:solidFill>
+                  <a:srgbClr val="000000"/>
+                </a:solidFill>
+              </a:defRPr>
             </a:pPr>
             <a:r>
               <a:t>• 3 карщика доставляют моно-палеты из хранения в буфер</a:t>
@@ -4586,7 +4796,11 @@
               <a:spcBef>
                 <a:spcPts val="800"/>
               </a:spcBef>
-              <a:defRPr sz="1800"/>
+              <a:defRPr sz="1800">
+                <a:solidFill>
+                  <a:srgbClr val="000000"/>
+                </a:solidFill>
+              </a:defRPr>
             </a:pPr>
             <a:r>
               <a:t>• 64 ячейки буфера — временное хранение для сборки</a:t>
@@ -4597,7 +4811,11 @@
               <a:spcBef>
                 <a:spcPts val="800"/>
               </a:spcBef>
-              <a:defRPr sz="1800"/>
+              <a:defRPr sz="1800">
+                <a:solidFill>
+                  <a:srgbClr val="000000"/>
+                </a:solidFill>
+              </a:defRPr>
             </a:pPr>
             <a:r>
               <a:t>• 20 сборщиков забирают товары и распределяют по заказам</a:t>
@@ -4608,7 +4826,11 @@
               <a:spcBef>
                 <a:spcPts val="800"/>
               </a:spcBef>
-              <a:defRPr sz="1800"/>
+              <a:defRPr sz="1800">
+                <a:solidFill>
+                  <a:srgbClr val="000000"/>
+                </a:solidFill>
+              </a:defRPr>
             </a:pPr>
             <a:r>
               <a:t>• Проблема: синхронизация подачи палет со скоростью сборки</a:t>
@@ -5999,6 +6221,9 @@
           <a:p>
             <a:pPr algn="ctr">
               <a:defRPr sz="1400">
+                <a:solidFill>
+                  <a:srgbClr val="000000"/>
+                </a:solidFill>
                 <a:latin typeface="Courier New"/>
               </a:defRPr>
             </a:pPr>
@@ -6034,7 +6259,11 @@
               <a:spcBef>
                 <a:spcPts val="800"/>
               </a:spcBef>
-              <a:defRPr sz="1800"/>
+              <a:defRPr sz="1800">
+                <a:solidFill>
+                  <a:srgbClr val="000000"/>
+                </a:solidFill>
+              </a:defRPr>
             </a:pPr>
             <a:r>
               <a:t>1. Получаем список заказов для сборки</a:t>
@@ -6045,7 +6274,11 @@
               <a:spcBef>
                 <a:spcPts val="800"/>
               </a:spcBef>
-              <a:defRPr sz="1800"/>
+              <a:defRPr sz="1800">
+                <a:solidFill>
+                  <a:srgbClr val="000000"/>
+                </a:solidFill>
+              </a:defRPr>
             </a:pPr>
             <a:r>
               <a:t>2. ML предсказывает время каждой операции</a:t>
@@ -6056,7 +6289,11 @@
               <a:spcBef>
                 <a:spcPts val="800"/>
               </a:spcBef>
-              <a:defRPr sz="1800"/>
+              <a:defRPr sz="1800">
+                <a:solidFill>
+                  <a:srgbClr val="000000"/>
+                </a:solidFill>
+              </a:defRPr>
             </a:pPr>
             <a:r>
               <a:t>3. OR-Tools строит оптимальный план</a:t>
@@ -6067,7 +6304,11 @@
               <a:spcBef>
                 <a:spcPts val="800"/>
               </a:spcBef>
-              <a:defRPr sz="1800"/>
+              <a:defRPr sz="1800">
+                <a:solidFill>
+                  <a:srgbClr val="000000"/>
+                </a:solidFill>
+              </a:defRPr>
             </a:pPr>
             <a:r>
               <a:t>4. План отправляется в WMS для исполнения</a:t>
@@ -6078,7 +6319,11 @@
               <a:spcBef>
                 <a:spcPts val="800"/>
               </a:spcBef>
-              <a:defRPr sz="1800"/>
+              <a:defRPr sz="1800">
+                <a:solidFill>
+                  <a:srgbClr val="000000"/>
+                </a:solidFill>
+              </a:defRPr>
             </a:pPr>
             <a:r>
               <a:t>5. Результаты используются для улучшения моделей</a:t>

</xml_diff>

<commit_message>
Add product complexity score (1-10) to plan and presentation
Propose custom complexity classification based on real statistics:
- 40% avg time + 30% variability + 20% qty + 10% rarity
- Categories 1-3: easy products → any picker
- Categories 4-6: standard → normal assignment
- Categories 7-10: complex → experienced pickers

Benefits: independent of reference data, based on actual behavior

Co-Authored-By: Claude Opus 4.5 <noreply@anthropic.com>
</commit_message>
<xml_diff>
--- a/docs/WMS_Buffer_Optimization.pptx
+++ b/docs/WMS_Buffer_Optimization.pptx
@@ -5802,18 +5802,7 @@
               <a:defRPr sz="2000"/>
             </a:pPr>
             <a:r>
-              <a:t>   • Среднее время распределения (сложность товара)</a:t>
-            </a:r>
-          </a:p>
-          <a:p>
-            <a:pPr>
-              <a:spcBef>
-                <a:spcPts val="1200"/>
-              </a:spcBef>
-              <a:defRPr sz="2000"/>
-            </a:pPr>
-            <a:r>
-              <a:t>   • Типичное количество в задании (мин, макс, медиана)</a:t>
+              <a:t>   • Среднее время распределения</a:t>
             </a:r>
           </a:p>
           <a:p>
@@ -5835,59 +5824,89 @@
               <a:defRPr sz="2000"/>
             </a:pPr>
             <a:r>
-              <a:t>   • Частота появления (приоритет оптимизации)</a:t>
-            </a:r>
-          </a:p>
-          <a:p>
-            <a:pPr>
-              <a:spcBef>
-                <a:spcPts val="1200"/>
-              </a:spcBef>
-              <a:defRPr sz="2000"/>
-            </a:pPr>
-          </a:p>
-          <a:p>
-            <a:pPr>
-              <a:spcBef>
-                <a:spcPts val="1200"/>
-              </a:spcBef>
-              <a:defRPr sz="2000"/>
-            </a:pPr>
-            <a:r>
-              <a:t>Использование:</a:t>
-            </a:r>
-          </a:p>
-          <a:p>
-            <a:pPr>
-              <a:spcBef>
-                <a:spcPts val="1200"/>
-              </a:spcBef>
-              <a:defRPr sz="2000"/>
-            </a:pPr>
-            <a:r>
-              <a:t>   • Прогноз времени волны = Σ (кол-во × время на единицу)</a:t>
-            </a:r>
-          </a:p>
-          <a:p>
-            <a:pPr>
-              <a:spcBef>
-                <a:spcPts val="1200"/>
-              </a:spcBef>
-              <a:defRPr sz="2000"/>
-            </a:pPr>
-            <a:r>
-              <a:t>   • Выявление 'проблемных' товаров</a:t>
-            </a:r>
-          </a:p>
-          <a:p>
-            <a:pPr>
-              <a:spcBef>
-                <a:spcPts val="1200"/>
-              </a:spcBef>
-              <a:defRPr sz="2000"/>
-            </a:pPr>
-            <a:r>
-              <a:t>   • Частые товары → ближе к выходу из буфера</a:t>
+              <a:t>   • Типичное количество в задании</a:t>
+            </a:r>
+          </a:p>
+          <a:p>
+            <a:pPr>
+              <a:spcBef>
+                <a:spcPts val="1200"/>
+              </a:spcBef>
+              <a:defRPr sz="2000"/>
+            </a:pPr>
+            <a:r>
+              <a:t>   • Частота появления</a:t>
+            </a:r>
+          </a:p>
+          <a:p>
+            <a:pPr>
+              <a:spcBef>
+                <a:spcPts val="1200"/>
+              </a:spcBef>
+              <a:defRPr sz="2000"/>
+            </a:pPr>
+          </a:p>
+          <a:p>
+            <a:pPr>
+              <a:spcBef>
+                <a:spcPts val="1200"/>
+              </a:spcBef>
+              <a:defRPr sz="2000"/>
+            </a:pPr>
+            <a:r>
+              <a:t>Классификация сложности товара (1-10):</a:t>
+            </a:r>
+          </a:p>
+          <a:p>
+            <a:pPr>
+              <a:spcBef>
+                <a:spcPts val="1200"/>
+              </a:spcBef>
+              <a:defRPr sz="2000"/>
+            </a:pPr>
+            <a:r>
+              <a:t>   complexity = 0.4×время + 0.3×вариативность + 0.2×qty + 0.1×редкость</a:t>
+            </a:r>
+          </a:p>
+          <a:p>
+            <a:pPr>
+              <a:spcBef>
+                <a:spcPts val="1200"/>
+              </a:spcBef>
+              <a:defRPr sz="2000"/>
+            </a:pPr>
+          </a:p>
+          <a:p>
+            <a:pPr>
+              <a:spcBef>
+                <a:spcPts val="1200"/>
+              </a:spcBef>
+              <a:defRPr sz="2000"/>
+            </a:pPr>
+            <a:r>
+              <a:t>   1-3: лёгкие товары → любой пикер</a:t>
+            </a:r>
+          </a:p>
+          <a:p>
+            <a:pPr>
+              <a:spcBef>
+                <a:spcPts val="1200"/>
+              </a:spcBef>
+              <a:defRPr sz="2000"/>
+            </a:pPr>
+            <a:r>
+              <a:t>   4-6: средние → стандартное назначение</a:t>
+            </a:r>
+          </a:p>
+          <a:p>
+            <a:pPr>
+              <a:spcBef>
+                <a:spcPts val="1200"/>
+              </a:spcBef>
+              <a:defRPr sz="2000"/>
+            </a:pPr>
+            <a:r>
+              <a:t>   7-10: сложные → опытным пикерам</a:t>
             </a:r>
           </a:p>
         </p:txBody>

</xml_diff>

<commit_message>
Fix presentation: reduce font size, shorten long texts
</commit_message>
<xml_diff>
--- a/docs/WMS_Buffer_Optimization.pptx
+++ b/docs/WMS_Buffer_Optimization.pptx
@@ -3282,9 +3282,9 @@
           <a:p>
             <a:pPr>
               <a:spcBef>
-                <a:spcPts val="1200"/>
-              </a:spcBef>
-              <a:defRPr sz="2000"/>
+                <a:spcPts val="600"/>
+              </a:spcBef>
+              <a:defRPr sz="1600"/>
             </a:pPr>
             <a:r>
               <a:t>БЕЗ оптимизации:</a:t>
@@ -3293,9 +3293,9 @@
           <a:p>
             <a:pPr>
               <a:spcBef>
-                <a:spcPts val="1200"/>
-              </a:spcBef>
-              <a:defRPr sz="2000"/>
+                <a:spcPts val="600"/>
+              </a:spcBef>
+              <a:defRPr sz="1600"/>
             </a:pPr>
             <a:r>
               <a:t>   Карщик 1: ████████████████████████ (перегружен)</a:t>
@@ -3304,9 +3304,9 @@
           <a:p>
             <a:pPr>
               <a:spcBef>
-                <a:spcPts val="1200"/>
-              </a:spcBef>
-              <a:defRPr sz="2000"/>
+                <a:spcPts val="600"/>
+              </a:spcBef>
+              <a:defRPr sz="1600"/>
             </a:pPr>
             <a:r>
               <a:t>   Карщик 2: ████████░░░░░░░░░░░░░░░░ (недогружен)</a:t>
@@ -3315,9 +3315,9 @@
           <a:p>
             <a:pPr>
               <a:spcBef>
-                <a:spcPts val="1200"/>
-              </a:spcBef>
-              <a:defRPr sz="2000"/>
+                <a:spcPts val="600"/>
+              </a:spcBef>
+              <a:defRPr sz="1600"/>
             </a:pPr>
             <a:r>
               <a:t>   Карщик 3: ██████████████░░░░░░░░░░ (средне)</a:t>
@@ -3326,17 +3326,17 @@
           <a:p>
             <a:pPr>
               <a:spcBef>
-                <a:spcPts val="1200"/>
-              </a:spcBef>
-              <a:defRPr sz="2000"/>
-            </a:pPr>
-          </a:p>
-          <a:p>
-            <a:pPr>
-              <a:spcBef>
-                <a:spcPts val="1200"/>
-              </a:spcBef>
-              <a:defRPr sz="2000"/>
+                <a:spcPts val="600"/>
+              </a:spcBef>
+              <a:defRPr sz="1600"/>
+            </a:pPr>
+          </a:p>
+          <a:p>
+            <a:pPr>
+              <a:spcBef>
+                <a:spcPts val="600"/>
+              </a:spcBef>
+              <a:defRPr sz="1600"/>
             </a:pPr>
             <a:r>
               <a:t>С оптимизацией OR-Tools:</a:t>
@@ -3345,9 +3345,9 @@
           <a:p>
             <a:pPr>
               <a:spcBef>
-                <a:spcPts val="1200"/>
-              </a:spcBef>
-              <a:defRPr sz="2000"/>
+                <a:spcPts val="600"/>
+              </a:spcBef>
+              <a:defRPr sz="1600"/>
             </a:pPr>
             <a:r>
               <a:t>   Карщик 1: ████████████████░░░░░░░░ (сбалансировано)</a:t>
@@ -3356,9 +3356,9 @@
           <a:p>
             <a:pPr>
               <a:spcBef>
-                <a:spcPts val="1200"/>
-              </a:spcBef>
-              <a:defRPr sz="2000"/>
+                <a:spcPts val="600"/>
+              </a:spcBef>
+              <a:defRPr sz="1600"/>
             </a:pPr>
             <a:r>
               <a:t>   Карщик 2: ███████████████░░░░░░░░░ (сбалансировано)</a:t>
@@ -3367,9 +3367,9 @@
           <a:p>
             <a:pPr>
               <a:spcBef>
-                <a:spcPts val="1200"/>
-              </a:spcBef>
-              <a:defRPr sz="2000"/>
+                <a:spcPts val="600"/>
+              </a:spcBef>
+              <a:defRPr sz="1600"/>
             </a:pPr>
             <a:r>
               <a:t>   Карщик 3: ████████████████░░░░░░░░ (сбалансировано)</a:t>
@@ -3378,17 +3378,17 @@
           <a:p>
             <a:pPr>
               <a:spcBef>
-                <a:spcPts val="1200"/>
-              </a:spcBef>
-              <a:defRPr sz="2000"/>
-            </a:pPr>
-          </a:p>
-          <a:p>
-            <a:pPr>
-              <a:spcBef>
-                <a:spcPts val="1200"/>
-              </a:spcBef>
-              <a:defRPr sz="2000"/>
+                <a:spcPts val="600"/>
+              </a:spcBef>
+              <a:defRPr sz="1600"/>
+            </a:pPr>
+          </a:p>
+          <a:p>
+            <a:pPr>
+              <a:spcBef>
+                <a:spcPts val="600"/>
+              </a:spcBef>
+              <a:defRPr sz="1600"/>
             </a:pPr>
             <a:r>
               <a:t>Результат: время волны 45→32 мин (-29%)</a:t>
@@ -3490,9 +3490,9 @@
           <a:p>
             <a:pPr>
               <a:spcBef>
-                <a:spcPts val="1200"/>
-              </a:spcBef>
-              <a:defRPr sz="2000"/>
+                <a:spcPts val="600"/>
+              </a:spcBef>
+              <a:defRPr sz="1600"/>
             </a:pPr>
             <a:r>
               <a:t>БЕЗ оптимизации (случайное назначение):</a:t>
@@ -3501,9 +3501,9 @@
           <a:p>
             <a:pPr>
               <a:spcBef>
-                <a:spcPts val="1200"/>
-              </a:spcBef>
-              <a:defRPr sz="2000"/>
+                <a:spcPts val="600"/>
+              </a:spcBef>
+              <a:defRPr sz="1600"/>
             </a:pPr>
             <a:r>
               <a:t>   Пикер А берёт товар X → 8 мин (не его специализация)</a:t>
@@ -3512,9 +3512,9 @@
           <a:p>
             <a:pPr>
               <a:spcBef>
-                <a:spcPts val="1200"/>
-              </a:spcBef>
-              <a:defRPr sz="2000"/>
+                <a:spcPts val="600"/>
+              </a:spcBef>
+              <a:defRPr sz="1600"/>
             </a:pPr>
             <a:r>
               <a:t>   Пикер Б берёт товар Y → 10 мин (не его специализация)</a:t>
@@ -3523,17 +3523,17 @@
           <a:p>
             <a:pPr>
               <a:spcBef>
-                <a:spcPts val="1200"/>
-              </a:spcBef>
-              <a:defRPr sz="2000"/>
-            </a:pPr>
-          </a:p>
-          <a:p>
-            <a:pPr>
-              <a:spcBef>
-                <a:spcPts val="1200"/>
-              </a:spcBef>
-              <a:defRPr sz="2000"/>
+                <a:spcPts val="600"/>
+              </a:spcBef>
+              <a:defRPr sz="1600"/>
+            </a:pPr>
+          </a:p>
+          <a:p>
+            <a:pPr>
+              <a:spcBef>
+                <a:spcPts val="600"/>
+              </a:spcBef>
+              <a:defRPr sz="1600"/>
             </a:pPr>
             <a:r>
               <a:t>С оптимизацией (ML + OR-Tools):</a:t>
@@ -3542,9 +3542,9 @@
           <a:p>
             <a:pPr>
               <a:spcBef>
-                <a:spcPts val="1200"/>
-              </a:spcBef>
-              <a:defRPr sz="2000"/>
+                <a:spcPts val="600"/>
+              </a:spcBef>
+              <a:defRPr sz="1600"/>
             </a:pPr>
             <a:r>
               <a:t>   Пикер А берёт товар Y → 5 мин (его лучший товар)</a:t>
@@ -3553,9 +3553,9 @@
           <a:p>
             <a:pPr>
               <a:spcBef>
-                <a:spcPts val="1200"/>
-              </a:spcBef>
-              <a:defRPr sz="2000"/>
+                <a:spcPts val="600"/>
+              </a:spcBef>
+              <a:defRPr sz="1600"/>
             </a:pPr>
             <a:r>
               <a:t>   Пикер Б берёт товар X → 4 мин (его лучший товар)</a:t>
@@ -3564,17 +3564,17 @@
           <a:p>
             <a:pPr>
               <a:spcBef>
-                <a:spcPts val="1200"/>
-              </a:spcBef>
-              <a:defRPr sz="2000"/>
-            </a:pPr>
-          </a:p>
-          <a:p>
-            <a:pPr>
-              <a:spcBef>
-                <a:spcPts val="1200"/>
-              </a:spcBef>
-              <a:defRPr sz="2000"/>
+                <a:spcPts val="600"/>
+              </a:spcBef>
+              <a:defRPr sz="1600"/>
+            </a:pPr>
+          </a:p>
+          <a:p>
+            <a:pPr>
+              <a:spcBef>
+                <a:spcPts val="600"/>
+              </a:spcBef>
+              <a:defRPr sz="1600"/>
             </a:pPr>
             <a:r>
               <a:t>Учитываем: кто скоро освободится, кто ближе к ячейке</a:t>
@@ -3583,17 +3583,17 @@
           <a:p>
             <a:pPr>
               <a:spcBef>
-                <a:spcPts val="1200"/>
-              </a:spcBef>
-              <a:defRPr sz="2000"/>
-            </a:pPr>
-          </a:p>
-          <a:p>
-            <a:pPr>
-              <a:spcBef>
-                <a:spcPts val="1200"/>
-              </a:spcBef>
-              <a:defRPr sz="2000"/>
+                <a:spcPts val="600"/>
+              </a:spcBef>
+              <a:defRPr sz="1600"/>
+            </a:pPr>
+          </a:p>
+          <a:p>
+            <a:pPr>
+              <a:spcBef>
+                <a:spcPts val="600"/>
+              </a:spcBef>
+              <a:defRPr sz="1600"/>
             </a:pPr>
             <a:r>
               <a:t>Результат: простои пикеров 12%→3% (-75%)</a:t>
@@ -4538,9 +4538,9 @@
           <a:p>
             <a:pPr>
               <a:spcBef>
-                <a:spcPts val="1200"/>
-              </a:spcBef>
-              <a:defRPr sz="2000"/>
+                <a:spcPts val="600"/>
+              </a:spcBef>
+              <a:defRPr sz="1600"/>
             </a:pPr>
             <a:r>
               <a:t>Система WMS Buffer Management позволит:</a:t>
@@ -4549,17 +4549,17 @@
           <a:p>
             <a:pPr>
               <a:spcBef>
-                <a:spcPts val="1200"/>
-              </a:spcBef>
-              <a:defRPr sz="2000"/>
-            </a:pPr>
-          </a:p>
-          <a:p>
-            <a:pPr>
-              <a:spcBef>
-                <a:spcPts val="1200"/>
-              </a:spcBef>
-              <a:defRPr sz="2000"/>
+                <a:spcPts val="600"/>
+              </a:spcBef>
+              <a:defRPr sz="1600"/>
+            </a:pPr>
+          </a:p>
+          <a:p>
+            <a:pPr>
+              <a:spcBef>
+                <a:spcPts val="600"/>
+              </a:spcBef>
+              <a:defRPr sz="1600"/>
             </a:pPr>
             <a:r>
               <a:t>• Назначать задачи лучшим исполнителям (пикер↔товар)</a:t>
@@ -4568,9 +4568,9 @@
           <a:p>
             <a:pPr>
               <a:spcBef>
-                <a:spcPts val="1200"/>
-              </a:spcBef>
-              <a:defRPr sz="2000"/>
+                <a:spcPts val="600"/>
+              </a:spcBef>
+              <a:defRPr sz="1600"/>
             </a:pPr>
             <a:r>
               <a:t>• Учитывать занятость и время освобождения</a:t>
@@ -4579,9 +4579,9 @@
           <a:p>
             <a:pPr>
               <a:spcBef>
-                <a:spcPts val="1200"/>
-              </a:spcBef>
-              <a:defRPr sz="2000"/>
+                <a:spcPts val="600"/>
+              </a:spcBef>
+              <a:defRPr sz="1600"/>
             </a:pPr>
             <a:r>
               <a:t>• Оптимизировать маршруты карщиков</a:t>
@@ -4590,9 +4590,9 @@
           <a:p>
             <a:pPr>
               <a:spcBef>
-                <a:spcPts val="1200"/>
-              </a:spcBef>
-              <a:defRPr sz="2000"/>
+                <a:spcPts val="600"/>
+              </a:spcBef>
+              <a:defRPr sz="1600"/>
             </a:pPr>
             <a:r>
               <a:t>• Сократить время волны на ~30%</a:t>
@@ -4601,9 +4601,9 @@
           <a:p>
             <a:pPr>
               <a:spcBef>
-                <a:spcPts val="1200"/>
-              </a:spcBef>
-              <a:defRPr sz="2000"/>
+                <a:spcPts val="600"/>
+              </a:spcBef>
+              <a:defRPr sz="1600"/>
             </a:pPr>
             <a:r>
               <a:t>• Минимизировать простои персонала</a:t>
@@ -4612,17 +4612,17 @@
           <a:p>
             <a:pPr>
               <a:spcBef>
-                <a:spcPts val="1200"/>
-              </a:spcBef>
-              <a:defRPr sz="2000"/>
-            </a:pPr>
-          </a:p>
-          <a:p>
-            <a:pPr>
-              <a:spcBef>
-                <a:spcPts val="1200"/>
-              </a:spcBef>
-              <a:defRPr sz="2000"/>
+                <a:spcPts val="600"/>
+              </a:spcBef>
+              <a:defRPr sz="1600"/>
+            </a:pPr>
+          </a:p>
+          <a:p>
+            <a:pPr>
+              <a:spcBef>
+                <a:spcPts val="600"/>
+              </a:spcBef>
+              <a:defRPr sz="1600"/>
             </a:pPr>
             <a:r>
               <a:t>Основа: 1.5 млн записей + ML.NET + OR-Tools</a:t>
@@ -4779,9 +4779,9 @@
           <a:p>
             <a:pPr>
               <a:spcBef>
-                <a:spcPts val="800"/>
-              </a:spcBef>
-              <a:defRPr sz="1800">
+                <a:spcPts val="400"/>
+              </a:spcBef>
+              <a:defRPr sz="1400">
                 <a:solidFill>
                   <a:srgbClr val="000000"/>
                 </a:solidFill>
@@ -4794,9 +4794,9 @@
           <a:p>
             <a:pPr>
               <a:spcBef>
-                <a:spcPts val="800"/>
-              </a:spcBef>
-              <a:defRPr sz="1800">
+                <a:spcPts val="400"/>
+              </a:spcBef>
+              <a:defRPr sz="1400">
                 <a:solidFill>
                   <a:srgbClr val="000000"/>
                 </a:solidFill>
@@ -4809,9 +4809,9 @@
           <a:p>
             <a:pPr>
               <a:spcBef>
-                <a:spcPts val="800"/>
-              </a:spcBef>
-              <a:defRPr sz="1800">
+                <a:spcPts val="400"/>
+              </a:spcBef>
+              <a:defRPr sz="1400">
                 <a:solidFill>
                   <a:srgbClr val="000000"/>
                 </a:solidFill>
@@ -4824,9 +4824,9 @@
           <a:p>
             <a:pPr>
               <a:spcBef>
-                <a:spcPts val="800"/>
-              </a:spcBef>
-              <a:defRPr sz="1800">
+                <a:spcPts val="400"/>
+              </a:spcBef>
+              <a:defRPr sz="1400">
                 <a:solidFill>
                   <a:srgbClr val="000000"/>
                 </a:solidFill>
@@ -5204,9 +5204,9 @@
           <a:p>
             <a:pPr>
               <a:spcBef>
-                <a:spcPts val="1200"/>
-              </a:spcBef>
-              <a:defRPr sz="2000"/>
+                <a:spcPts val="600"/>
+              </a:spcBef>
+              <a:defRPr sz="1600"/>
             </a:pPr>
             <a:r>
               <a:t>УРОВЕНЬ 3: ПРОГНОЗИРОВАНИЕ (Historical Layer)</a:t>
@@ -5215,9 +5215,9 @@
           <a:p>
             <a:pPr>
               <a:spcBef>
-                <a:spcPts val="1200"/>
-              </a:spcBef>
-              <a:defRPr sz="2000"/>
+                <a:spcPts val="600"/>
+              </a:spcBef>
+              <a:defRPr sz="1600"/>
             </a:pPr>
             <a:r>
               <a:t>   → ML-модели предсказывают время выполнения задач</a:t>
@@ -5226,17 +5226,17 @@
           <a:p>
             <a:pPr>
               <a:spcBef>
-                <a:spcPts val="1200"/>
-              </a:spcBef>
-              <a:defRPr sz="2000"/>
-            </a:pPr>
-          </a:p>
-          <a:p>
-            <a:pPr>
-              <a:spcBef>
-                <a:spcPts val="1200"/>
-              </a:spcBef>
-              <a:defRPr sz="2000"/>
+                <a:spcPts val="600"/>
+              </a:spcBef>
+              <a:defRPr sz="1600"/>
+            </a:pPr>
+          </a:p>
+          <a:p>
+            <a:pPr>
+              <a:spcBef>
+                <a:spcPts val="600"/>
+              </a:spcBef>
+              <a:defRPr sz="1600"/>
             </a:pPr>
             <a:r>
               <a:t>УРОВЕНЬ 2: ПЛАНИРОВАНИЕ (Tactical Layer)</a:t>
@@ -5245,9 +5245,9 @@
           <a:p>
             <a:pPr>
               <a:spcBef>
-                <a:spcPts val="1200"/>
-              </a:spcBef>
-              <a:defRPr sz="2000"/>
+                <a:spcPts val="600"/>
+              </a:spcBef>
+              <a:defRPr sz="1600"/>
             </a:pPr>
             <a:r>
               <a:t>   → OR-Tools оптимизирует назначения и расписание</a:t>
@@ -5256,17 +5256,17 @@
           <a:p>
             <a:pPr>
               <a:spcBef>
-                <a:spcPts val="1200"/>
-              </a:spcBef>
-              <a:defRPr sz="2000"/>
-            </a:pPr>
-          </a:p>
-          <a:p>
-            <a:pPr>
-              <a:spcBef>
-                <a:spcPts val="1200"/>
-              </a:spcBef>
-              <a:defRPr sz="2000"/>
+                <a:spcPts val="600"/>
+              </a:spcBef>
+              <a:defRPr sz="1600"/>
+            </a:pPr>
+          </a:p>
+          <a:p>
+            <a:pPr>
+              <a:spcBef>
+                <a:spcPts val="600"/>
+              </a:spcBef>
+              <a:defRPr sz="1600"/>
             </a:pPr>
             <a:r>
               <a:t>УРОВЕНЬ 1: РЕАГИРОВАНИЕ (Realtime Layer)</a:t>
@@ -5275,9 +5275,9 @@
           <a:p>
             <a:pPr>
               <a:spcBef>
-                <a:spcPts val="1200"/>
-              </a:spcBef>
-              <a:defRPr sz="2000"/>
+                <a:spcPts val="600"/>
+              </a:spcBef>
+              <a:defRPr sz="1600"/>
             </a:pPr>
             <a:r>
               <a:t>   → Гистерезис-контроллер управляет уровнем буфера</a:t>
@@ -5286,17 +5286,17 @@
           <a:p>
             <a:pPr>
               <a:spcBef>
-                <a:spcPts val="1200"/>
-              </a:spcBef>
-              <a:defRPr sz="2000"/>
-            </a:pPr>
-          </a:p>
-          <a:p>
-            <a:pPr>
-              <a:spcBef>
-                <a:spcPts val="1200"/>
-              </a:spcBef>
-              <a:defRPr sz="2000"/>
+                <a:spcPts val="600"/>
+              </a:spcBef>
+              <a:defRPr sz="1600"/>
+            </a:pPr>
+          </a:p>
+          <a:p>
+            <a:pPr>
+              <a:spcBef>
+                <a:spcPts val="600"/>
+              </a:spcBef>
+              <a:defRPr sz="1600"/>
             </a:pPr>
             <a:r>
               <a:t>Принцип: Прогноз → План → Исполнение → Корректировка</a:t>
@@ -5398,9 +5398,9 @@
           <a:p>
             <a:pPr>
               <a:spcBef>
-                <a:spcPts val="1200"/>
-              </a:spcBef>
-              <a:defRPr sz="2000"/>
+                <a:spcPts val="600"/>
+              </a:spcBef>
+              <a:defRPr sz="1600"/>
             </a:pPr>
             <a:r>
               <a:t>Модель 1: Время сборки (Picker Duration)</a:t>
@@ -5409,9 +5409,9 @@
           <a:p>
             <a:pPr>
               <a:spcBef>
-                <a:spcPts val="1200"/>
-              </a:spcBef>
-              <a:defRPr sz="2000"/>
+                <a:spcPts val="600"/>
+              </a:spcBef>
+              <a:defRPr sz="1600"/>
             </a:pPr>
             <a:r>
               <a:t>   Входы: ID сборщика, кол-во строк, кол-во товаров, час, день недели</a:t>
@@ -5420,9 +5420,9 @@
           <a:p>
             <a:pPr>
               <a:spcBef>
-                <a:spcPts val="1200"/>
-              </a:spcBef>
-              <a:defRPr sz="2000"/>
+                <a:spcPts val="600"/>
+              </a:spcBef>
+              <a:defRPr sz="1600"/>
             </a:pPr>
             <a:r>
               <a:t>   Выход: прогноз времени выполнения задания (секунды)</a:t>
@@ -5431,17 +5431,17 @@
           <a:p>
             <a:pPr>
               <a:spcBef>
-                <a:spcPts val="1200"/>
-              </a:spcBef>
-              <a:defRPr sz="2000"/>
-            </a:pPr>
-          </a:p>
-          <a:p>
-            <a:pPr>
-              <a:spcBef>
-                <a:spcPts val="1200"/>
-              </a:spcBef>
-              <a:defRPr sz="2000"/>
+                <a:spcPts val="600"/>
+              </a:spcBef>
+              <a:defRPr sz="1600"/>
+            </a:pPr>
+          </a:p>
+          <a:p>
+            <a:pPr>
+              <a:spcBef>
+                <a:spcPts val="600"/>
+              </a:spcBef>
+              <a:defRPr sz="1600"/>
             </a:pPr>
             <a:r>
               <a:t>Модель 2: Время маршрута карщика (Forklift Duration)</a:t>
@@ -5450,9 +5450,9 @@
           <a:p>
             <a:pPr>
               <a:spcBef>
-                <a:spcPts val="1200"/>
-              </a:spcBef>
-              <a:defRPr sz="2000"/>
+                <a:spcPts val="600"/>
+              </a:spcBef>
+              <a:defRPr sz="1600"/>
             </a:pPr>
             <a:r>
               <a:t>   Входы: ID карщика, зона источника → зона назначения, вес палеты</a:t>
@@ -5461,9 +5461,9 @@
           <a:p>
             <a:pPr>
               <a:spcBef>
-                <a:spcPts val="1200"/>
-              </a:spcBef>
-              <a:defRPr sz="2000"/>
+                <a:spcPts val="600"/>
+              </a:spcBef>
+              <a:defRPr sz="1600"/>
             </a:pPr>
             <a:r>
               <a:t>   Выход: прогноз времени доставки (секунды)</a:t>
@@ -5472,17 +5472,17 @@
           <a:p>
             <a:pPr>
               <a:spcBef>
-                <a:spcPts val="1200"/>
-              </a:spcBef>
-              <a:defRPr sz="2000"/>
-            </a:pPr>
-          </a:p>
-          <a:p>
-            <a:pPr>
-              <a:spcBef>
-                <a:spcPts val="1200"/>
-              </a:spcBef>
-              <a:defRPr sz="2000"/>
+                <a:spcPts val="600"/>
+              </a:spcBef>
+              <a:defRPr sz="1600"/>
+            </a:pPr>
+          </a:p>
+          <a:p>
+            <a:pPr>
+              <a:spcBef>
+                <a:spcPts val="600"/>
+              </a:spcBef>
+              <a:defRPr sz="1600"/>
             </a:pPr>
             <a:r>
               <a:t>База для обучения: 1.5 млн исторических записей</a:t>
@@ -5584,9 +5584,9 @@
           <a:p>
             <a:pPr>
               <a:spcBef>
-                <a:spcPts val="1200"/>
-              </a:spcBef>
-              <a:defRPr sz="2000"/>
+                <a:spcPts val="600"/>
+              </a:spcBef>
+              <a:defRPr sz="1600"/>
             </a:pPr>
             <a:r>
               <a:t>Проблема: не все пикеры одинаково эффективны для всех товаров</a:t>
@@ -5595,17 +5595,17 @@
           <a:p>
             <a:pPr>
               <a:spcBef>
-                <a:spcPts val="1200"/>
-              </a:spcBef>
-              <a:defRPr sz="2000"/>
-            </a:pPr>
-          </a:p>
-          <a:p>
-            <a:pPr>
-              <a:spcBef>
-                <a:spcPts val="1200"/>
-              </a:spcBef>
-              <a:defRPr sz="2000"/>
+                <a:spcPts val="600"/>
+              </a:spcBef>
+              <a:defRPr sz="1600"/>
+            </a:pPr>
+          </a:p>
+          <a:p>
+            <a:pPr>
+              <a:spcBef>
+                <a:spcPts val="600"/>
+              </a:spcBef>
+              <a:defRPr sz="1600"/>
             </a:pPr>
             <a:r>
               <a:t>Решение — назначаем задачу тому, кто:</a:t>
@@ -5614,17 +5614,17 @@
           <a:p>
             <a:pPr>
               <a:spcBef>
-                <a:spcPts val="1200"/>
-              </a:spcBef>
-              <a:defRPr sz="2000"/>
-            </a:pPr>
-          </a:p>
-          <a:p>
-            <a:pPr>
-              <a:spcBef>
-                <a:spcPts val="1200"/>
-              </a:spcBef>
-              <a:defRPr sz="2000"/>
+                <a:spcPts val="600"/>
+              </a:spcBef>
+              <a:defRPr sz="1600"/>
+            </a:pPr>
+          </a:p>
+          <a:p>
+            <a:pPr>
+              <a:spcBef>
+                <a:spcPts val="600"/>
+              </a:spcBef>
+              <a:defRPr sz="1600"/>
             </a:pPr>
             <a:r>
               <a:t>   • Лучше справляется с данным типом товара (из истории)</a:t>
@@ -5633,9 +5633,9 @@
           <a:p>
             <a:pPr>
               <a:spcBef>
-                <a:spcPts val="1200"/>
-              </a:spcBef>
-              <a:defRPr sz="2000"/>
+                <a:spcPts val="600"/>
+              </a:spcBef>
+              <a:defRPr sz="1600"/>
             </a:pPr>
             <a:r>
               <a:t>   • Сейчас свободен или скоро освободится</a:t>
@@ -5644,9 +5644,9 @@
           <a:p>
             <a:pPr>
               <a:spcBef>
-                <a:spcPts val="1200"/>
-              </a:spcBef>
-              <a:defRPr sz="2000"/>
+                <a:spcPts val="600"/>
+              </a:spcBef>
+              <a:defRPr sz="1600"/>
             </a:pPr>
             <a:r>
               <a:t>   • Находится ближе к нужной зоне буфера</a:t>
@@ -5655,9 +5655,9 @@
           <a:p>
             <a:pPr>
               <a:spcBef>
-                <a:spcPts val="1200"/>
-              </a:spcBef>
-              <a:defRPr sz="2000"/>
+                <a:spcPts val="600"/>
+              </a:spcBef>
+              <a:defRPr sz="1600"/>
             </a:pPr>
             <a:r>
               <a:t>   • Имеет меньшую загрузку в текущей волне</a:t>
@@ -5666,17 +5666,17 @@
           <a:p>
             <a:pPr>
               <a:spcBef>
-                <a:spcPts val="1200"/>
-              </a:spcBef>
-              <a:defRPr sz="2000"/>
-            </a:pPr>
-          </a:p>
-          <a:p>
-            <a:pPr>
-              <a:spcBef>
-                <a:spcPts val="1200"/>
-              </a:spcBef>
-              <a:defRPr sz="2000"/>
+                <a:spcPts val="600"/>
+              </a:spcBef>
+              <a:defRPr sz="1600"/>
+            </a:pPr>
+          </a:p>
+          <a:p>
+            <a:pPr>
+              <a:spcBef>
+                <a:spcPts val="600"/>
+              </a:spcBef>
+              <a:defRPr sz="1600"/>
             </a:pPr>
             <a:r>
               <a:t>ML модель учитывает связку: пикер + товар + объём → время</a:t>
@@ -5778,9 +5778,9 @@
           <a:p>
             <a:pPr>
               <a:spcBef>
-                <a:spcPts val="1200"/>
-              </a:spcBef>
-              <a:defRPr sz="2000"/>
+                <a:spcPts val="600"/>
+              </a:spcBef>
+              <a:defRPr sz="1600"/>
             </a:pPr>
             <a:r>
               <a:t>Для каждого товара рассчитываем:</a:t>
@@ -5789,17 +5789,17 @@
           <a:p>
             <a:pPr>
               <a:spcBef>
-                <a:spcPts val="1200"/>
-              </a:spcBef>
-              <a:defRPr sz="2000"/>
-            </a:pPr>
-          </a:p>
-          <a:p>
-            <a:pPr>
-              <a:spcBef>
-                <a:spcPts val="1200"/>
-              </a:spcBef>
-              <a:defRPr sz="2000"/>
+                <a:spcPts val="600"/>
+              </a:spcBef>
+              <a:defRPr sz="1600"/>
+            </a:pPr>
+          </a:p>
+          <a:p>
+            <a:pPr>
+              <a:spcBef>
+                <a:spcPts val="600"/>
+              </a:spcBef>
+              <a:defRPr sz="1600"/>
             </a:pPr>
             <a:r>
               <a:t>   • Среднее время распределения</a:t>
@@ -5808,9 +5808,9 @@
           <a:p>
             <a:pPr>
               <a:spcBef>
-                <a:spcPts val="1200"/>
-              </a:spcBef>
-              <a:defRPr sz="2000"/>
+                <a:spcPts val="600"/>
+              </a:spcBef>
+              <a:defRPr sz="1600"/>
             </a:pPr>
             <a:r>
               <a:t>   • Вариативность времени (стабильность)</a:t>
@@ -5819,9 +5819,9 @@
           <a:p>
             <a:pPr>
               <a:spcBef>
-                <a:spcPts val="1200"/>
-              </a:spcBef>
-              <a:defRPr sz="2000"/>
+                <a:spcPts val="600"/>
+              </a:spcBef>
+              <a:defRPr sz="1600"/>
             </a:pPr>
             <a:r>
               <a:t>   • Типичное количество в задании</a:t>
@@ -5830,9 +5830,9 @@
           <a:p>
             <a:pPr>
               <a:spcBef>
-                <a:spcPts val="1200"/>
-              </a:spcBef>
-              <a:defRPr sz="2000"/>
+                <a:spcPts val="600"/>
+              </a:spcBef>
+              <a:defRPr sz="1600"/>
             </a:pPr>
             <a:r>
               <a:t>   • Частота появления</a:t>
@@ -5841,17 +5841,17 @@
           <a:p>
             <a:pPr>
               <a:spcBef>
-                <a:spcPts val="1200"/>
-              </a:spcBef>
-              <a:defRPr sz="2000"/>
-            </a:pPr>
-          </a:p>
-          <a:p>
-            <a:pPr>
-              <a:spcBef>
-                <a:spcPts val="1200"/>
-              </a:spcBef>
-              <a:defRPr sz="2000"/>
+                <a:spcPts val="600"/>
+              </a:spcBef>
+              <a:defRPr sz="1600"/>
+            </a:pPr>
+          </a:p>
+          <a:p>
+            <a:pPr>
+              <a:spcBef>
+                <a:spcPts val="600"/>
+              </a:spcBef>
+              <a:defRPr sz="1600"/>
             </a:pPr>
             <a:r>
               <a:t>Классификация сложности товара (1-10):</a:t>
@@ -5860,9 +5860,9 @@
           <a:p>
             <a:pPr>
               <a:spcBef>
-                <a:spcPts val="1200"/>
-              </a:spcBef>
-              <a:defRPr sz="2000"/>
+                <a:spcPts val="600"/>
+              </a:spcBef>
+              <a:defRPr sz="1600"/>
             </a:pPr>
             <a:r>
               <a:t>   complexity = 0.4×время + 0.3×вариативность + 0.2×qty + 0.1×редкость</a:t>
@@ -5871,17 +5871,17 @@
           <a:p>
             <a:pPr>
               <a:spcBef>
-                <a:spcPts val="1200"/>
-              </a:spcBef>
-              <a:defRPr sz="2000"/>
-            </a:pPr>
-          </a:p>
-          <a:p>
-            <a:pPr>
-              <a:spcBef>
-                <a:spcPts val="1200"/>
-              </a:spcBef>
-              <a:defRPr sz="2000"/>
+                <a:spcPts val="600"/>
+              </a:spcBef>
+              <a:defRPr sz="1600"/>
+            </a:pPr>
+          </a:p>
+          <a:p>
+            <a:pPr>
+              <a:spcBef>
+                <a:spcPts val="600"/>
+              </a:spcBef>
+              <a:defRPr sz="1600"/>
             </a:pPr>
             <a:r>
               <a:t>   1-3: лёгкие товары → любой пикер</a:t>
@@ -5890,9 +5890,9 @@
           <a:p>
             <a:pPr>
               <a:spcBef>
-                <a:spcPts val="1200"/>
-              </a:spcBef>
-              <a:defRPr sz="2000"/>
+                <a:spcPts val="600"/>
+              </a:spcBef>
+              <a:defRPr sz="1600"/>
             </a:pPr>
             <a:r>
               <a:t>   4-6: средние → стандартное назначение</a:t>
@@ -5901,9 +5901,9 @@
           <a:p>
             <a:pPr>
               <a:spcBef>
-                <a:spcPts val="1200"/>
-              </a:spcBef>
-              <a:defRPr sz="2000"/>
+                <a:spcPts val="600"/>
+              </a:spcBef>
+              <a:defRPr sz="1600"/>
             </a:pPr>
             <a:r>
               <a:t>   7-10: сложные → опытным пикерам</a:t>
@@ -6005,9 +6005,9 @@
           <a:p>
             <a:pPr>
               <a:spcBef>
-                <a:spcPts val="1200"/>
-              </a:spcBef>
-              <a:defRPr sz="2000"/>
+                <a:spcPts val="600"/>
+              </a:spcBef>
+              <a:defRPr sz="1600"/>
             </a:pPr>
             <a:r>
               <a:t>Задача: минимизация общего времени выполнения волны</a:t>
@@ -6016,17 +6016,17 @@
           <a:p>
             <a:pPr>
               <a:spcBef>
-                <a:spcPts val="1200"/>
-              </a:spcBef>
-              <a:defRPr sz="2000"/>
-            </a:pPr>
-          </a:p>
-          <a:p>
-            <a:pPr>
-              <a:spcBef>
-                <a:spcPts val="1200"/>
-              </a:spcBef>
-              <a:defRPr sz="2000"/>
+                <a:spcPts val="600"/>
+              </a:spcBef>
+              <a:defRPr sz="1600"/>
+            </a:pPr>
+          </a:p>
+          <a:p>
+            <a:pPr>
+              <a:spcBef>
+                <a:spcPts val="600"/>
+              </a:spcBef>
+              <a:defRPr sz="1600"/>
             </a:pPr>
             <a:r>
               <a:t>Оптимизируем ДВА назначения одновременно:</a:t>
@@ -6035,9 +6035,9 @@
           <a:p>
             <a:pPr>
               <a:spcBef>
-                <a:spcPts val="1200"/>
-              </a:spcBef>
-              <a:defRPr sz="2000"/>
+                <a:spcPts val="600"/>
+              </a:spcBef>
+              <a:defRPr sz="1600"/>
             </a:pPr>
             <a:r>
               <a:t>   • Карщик → Палета → Ячейка буфера</a:t>
@@ -6046,9 +6046,9 @@
           <a:p>
             <a:pPr>
               <a:spcBef>
-                <a:spcPts val="1200"/>
-              </a:spcBef>
-              <a:defRPr sz="2000"/>
+                <a:spcPts val="600"/>
+              </a:spcBef>
+              <a:defRPr sz="1600"/>
             </a:pPr>
             <a:r>
               <a:t>   • Пикер → Задание на сборку</a:t>
@@ -6057,17 +6057,17 @@
           <a:p>
             <a:pPr>
               <a:spcBef>
-                <a:spcPts val="1200"/>
-              </a:spcBef>
-              <a:defRPr sz="2000"/>
-            </a:pPr>
-          </a:p>
-          <a:p>
-            <a:pPr>
-              <a:spcBef>
-                <a:spcPts val="1200"/>
-              </a:spcBef>
-              <a:defRPr sz="2000"/>
+                <a:spcPts val="600"/>
+              </a:spcBef>
+              <a:defRPr sz="1600"/>
+            </a:pPr>
+          </a:p>
+          <a:p>
+            <a:pPr>
+              <a:spcBef>
+                <a:spcPts val="600"/>
+              </a:spcBef>
+              <a:defRPr sz="1600"/>
             </a:pPr>
             <a:r>
               <a:t>Учитываем:</a:t>
@@ -6076,9 +6076,9 @@
           <a:p>
             <a:pPr>
               <a:spcBef>
-                <a:spcPts val="1200"/>
-              </a:spcBef>
-              <a:defRPr sz="2000"/>
+                <a:spcPts val="600"/>
+              </a:spcBef>
+              <a:defRPr sz="1600"/>
             </a:pPr>
             <a:r>
               <a:t>   • Прогноз времени для каждой пары (пикер, задание)</a:t>
@@ -6087,9 +6087,9 @@
           <a:p>
             <a:pPr>
               <a:spcBef>
-                <a:spcPts val="1200"/>
-              </a:spcBef>
-              <a:defRPr sz="2000"/>
+                <a:spcPts val="600"/>
+              </a:spcBef>
+              <a:defRPr sz="1600"/>
             </a:pPr>
             <a:r>
               <a:t>   • Текущую занятость и время до освобождения</a:t>
@@ -6098,9 +6098,9 @@
           <a:p>
             <a:pPr>
               <a:spcBef>
-                <a:spcPts val="1200"/>
-              </a:spcBef>
-              <a:defRPr sz="2000"/>
+                <a:spcPts val="600"/>
+              </a:spcBef>
+              <a:defRPr sz="1600"/>
             </a:pPr>
             <a:r>
               <a:t>   • Балансировку нагрузки между всеми работниками</a:t>
@@ -6109,17 +6109,17 @@
           <a:p>
             <a:pPr>
               <a:spcBef>
-                <a:spcPts val="1200"/>
-              </a:spcBef>
-              <a:defRPr sz="2000"/>
-            </a:pPr>
-          </a:p>
-          <a:p>
-            <a:pPr>
-              <a:spcBef>
-                <a:spcPts val="1200"/>
-              </a:spcBef>
-              <a:defRPr sz="2000"/>
+                <a:spcPts val="600"/>
+              </a:spcBef>
+              <a:defRPr sz="1600"/>
+            </a:pPr>
+          </a:p>
+          <a:p>
+            <a:pPr>
+              <a:spcBef>
+                <a:spcPts val="600"/>
+              </a:spcBef>
+              <a:defRPr sz="1600"/>
             </a:pPr>
             <a:r>
               <a:t>Ограничения: приоритеты заказов, тяжёлые палеты вниз</a:t>
@@ -6192,7 +6192,7 @@
               </a:defRPr>
             </a:pPr>
             <a:r>
-              <a:t>8. Цикл оптимизации (каждые 15 минут)</a:t>
+              <a:t>8. Цикл оптимизации (15 мин)</a:t>
             </a:r>
           </a:p>
         </p:txBody>
@@ -6247,7 +6247,7 @@
               </a:defRPr>
             </a:pPr>
             <a:r>
-              <a:t>Заказы (волна) → Прогноз ML.NET → OR-Tools CP-SAT → Исполнение WMS → Обратная связь</a:t>
+              <a:t>Заказы → ML.NET → OR-Tools → WMS → Обратная связь</a:t>
             </a:r>
           </a:p>
         </p:txBody>
@@ -6276,9 +6276,9 @@
           <a:p>
             <a:pPr>
               <a:spcBef>
-                <a:spcPts val="800"/>
-              </a:spcBef>
-              <a:defRPr sz="1800">
+                <a:spcPts val="400"/>
+              </a:spcBef>
+              <a:defRPr sz="1400">
                 <a:solidFill>
                   <a:srgbClr val="000000"/>
                 </a:solidFill>
@@ -6291,9 +6291,9 @@
           <a:p>
             <a:pPr>
               <a:spcBef>
-                <a:spcPts val="800"/>
-              </a:spcBef>
-              <a:defRPr sz="1800">
+                <a:spcPts val="400"/>
+              </a:spcBef>
+              <a:defRPr sz="1400">
                 <a:solidFill>
                   <a:srgbClr val="000000"/>
                 </a:solidFill>
@@ -6306,9 +6306,9 @@
           <a:p>
             <a:pPr>
               <a:spcBef>
-                <a:spcPts val="800"/>
-              </a:spcBef>
-              <a:defRPr sz="1800">
+                <a:spcPts val="400"/>
+              </a:spcBef>
+              <a:defRPr sz="1400">
                 <a:solidFill>
                   <a:srgbClr val="000000"/>
                 </a:solidFill>
@@ -6321,9 +6321,9 @@
           <a:p>
             <a:pPr>
               <a:spcBef>
-                <a:spcPts val="800"/>
-              </a:spcBef>
-              <a:defRPr sz="1800">
+                <a:spcPts val="400"/>
+              </a:spcBef>
+              <a:defRPr sz="1400">
                 <a:solidFill>
                   <a:srgbClr val="000000"/>
                 </a:solidFill>
@@ -6336,9 +6336,9 @@
           <a:p>
             <a:pPr>
               <a:spcBef>
-                <a:spcPts val="800"/>
-              </a:spcBef>
-              <a:defRPr sz="1800">
+                <a:spcPts val="400"/>
+              </a:spcBef>
+              <a:defRPr sz="1400">
                 <a:solidFill>
                   <a:srgbClr val="000000"/>
                 </a:solidFill>

</xml_diff>